<commit_message>
Deployed fef2dc6 with MkDocs version: 1.3.1
</commit_message>
<xml_diff>
--- a/python/DataStructure/assets/tmp.pptx
+++ b/python/DataStructure/assets/tmp.pptx
@@ -5,18 +5,19 @@
     <p:sldMasterId id="2147483733" r:id="rId8"/>
   </p:sldMasterIdLst>
   <p:notesMasterIdLst>
-    <p:notesMasterId r:id="rId10"/>
+    <p:notesMasterId r:id="rId11"/>
   </p:notesMasterIdLst>
   <p:handoutMasterIdLst>
-    <p:handoutMasterId r:id="rId11"/>
+    <p:handoutMasterId r:id="rId12"/>
   </p:handoutMasterIdLst>
   <p:sldIdLst>
     <p:sldId id="364" r:id="rId9"/>
+    <p:sldId id="365" r:id="rId10"/>
   </p:sldIdLst>
   <p:sldSz cx="12195175" cy="6858000"/>
   <p:notesSz cx="6858000" cy="9144000"/>
   <p:custDataLst>
-    <p:tags r:id="rId12"/>
+    <p:tags r:id="rId13"/>
   </p:custDataLst>
   <p:defaultTextStyle>
     <a:defPPr>
@@ -16177,6 +16178,3296 @@
 </p:sld>
 </file>
 
+<file path=ppt/slides/slide2.xml><?xml version="1.0" encoding="utf-8"?>
+<p:sld xmlns:a="http://schemas.openxmlformats.org/drawingml/2006/main" xmlns:r="http://schemas.openxmlformats.org/officeDocument/2006/relationships" xmlns:p="http://schemas.openxmlformats.org/presentationml/2006/main">
+  <p:cSld>
+    <p:spTree>
+      <p:nvGrpSpPr>
+        <p:cNvPr id="1" name=""/>
+        <p:cNvGrpSpPr/>
+        <p:nvPr/>
+      </p:nvGrpSpPr>
+      <p:grpSpPr>
+        <a:xfrm>
+          <a:off x="0" y="0"/>
+          <a:ext cx="0" cy="0"/>
+          <a:chOff x="0" y="0"/>
+          <a:chExt cx="0" cy="0"/>
+        </a:xfrm>
+      </p:grpSpPr>
+      <p:sp>
+        <p:nvSpPr>
+          <p:cNvPr id="4" name="Rectangle 3">
+            <a:extLst>
+              <a:ext uri="{FF2B5EF4-FFF2-40B4-BE49-F238E27FC236}">
+                <a16:creationId xmlns:a16="http://schemas.microsoft.com/office/drawing/2014/main" id="{0D762371-0567-A1CF-4F92-5C3A57CB79B6}"/>
+              </a:ext>
+            </a:extLst>
+          </p:cNvPr>
+          <p:cNvSpPr/>
+          <p:nvPr/>
+        </p:nvSpPr>
+        <p:spPr bwMode="gray">
+          <a:xfrm>
+            <a:off x="5938046" y="1376674"/>
+            <a:ext cx="360757" cy="300729"/>
+          </a:xfrm>
+          <a:prstGeom prst="rect">
+            <a:avLst/>
+          </a:prstGeom>
+          <a:solidFill>
+            <a:schemeClr val="accent4">
+              <a:lumMod val="40000"/>
+              <a:lumOff val="60000"/>
+            </a:schemeClr>
+          </a:solidFill>
+          <a:ln w="25400" algn="ctr">
+            <a:noFill/>
+            <a:miter lim="800000"/>
+            <a:headEnd/>
+            <a:tailEnd/>
+          </a:ln>
+        </p:spPr>
+        <p:txBody>
+          <a:bodyPr lIns="90000" tIns="72000" rIns="90000" bIns="72000" rtlCol="0" anchor="ctr"/>
+          <a:lstStyle/>
+          <a:p>
+            <a:pPr marR="0" algn="ctr" defTabSz="914400" eaLnBrk="1" fontAlgn="base" latinLnBrk="0" hangingPunct="1">
+              <a:lnSpc>
+                <a:spcPct val="100000"/>
+              </a:lnSpc>
+              <a:spcBef>
+                <a:spcPct val="50000"/>
+              </a:spcBef>
+              <a:spcAft>
+                <a:spcPct val="0"/>
+              </a:spcAft>
+              <a:buClr>
+                <a:srgbClr val="F0AB00"/>
+              </a:buClr>
+              <a:buSzPct val="80000"/>
+              <a:tabLst/>
+            </a:pPr>
+            <a:r>
+              <a:rPr kumimoji="0" lang="en-CN" sz="1800" b="0" i="0" u="none" strike="noStrike" kern="0" cap="none" spc="0" normalizeH="0" baseline="0" noProof="0" dirty="0">
+                <a:ln>
+                  <a:noFill/>
+                </a:ln>
+                <a:effectLst/>
+                <a:uLnTx/>
+                <a:uFillTx/>
+                <a:ea typeface="Arial Unicode MS" pitchFamily="34" charset="-128"/>
+                <a:cs typeface="Arial Unicode MS" pitchFamily="34" charset="-128"/>
+              </a:rPr>
+              <a:t>6</a:t>
+            </a:r>
+          </a:p>
+        </p:txBody>
+      </p:sp>
+      <p:sp>
+        <p:nvSpPr>
+          <p:cNvPr id="5" name="Rectangle 4">
+            <a:extLst>
+              <a:ext uri="{FF2B5EF4-FFF2-40B4-BE49-F238E27FC236}">
+                <a16:creationId xmlns:a16="http://schemas.microsoft.com/office/drawing/2014/main" id="{790616F4-1684-082A-A8CF-0894341F0C06}"/>
+              </a:ext>
+            </a:extLst>
+          </p:cNvPr>
+          <p:cNvSpPr/>
+          <p:nvPr/>
+        </p:nvSpPr>
+        <p:spPr bwMode="gray">
+          <a:xfrm>
+            <a:off x="4259655" y="1874703"/>
+            <a:ext cx="360757" cy="300729"/>
+          </a:xfrm>
+          <a:prstGeom prst="rect">
+            <a:avLst/>
+          </a:prstGeom>
+          <a:solidFill>
+            <a:schemeClr val="accent4">
+              <a:lumMod val="40000"/>
+              <a:lumOff val="60000"/>
+            </a:schemeClr>
+          </a:solidFill>
+          <a:ln w="25400" algn="ctr">
+            <a:noFill/>
+            <a:miter lim="800000"/>
+            <a:headEnd/>
+            <a:tailEnd/>
+          </a:ln>
+        </p:spPr>
+        <p:txBody>
+          <a:bodyPr lIns="90000" tIns="72000" rIns="90000" bIns="72000" rtlCol="0" anchor="ctr"/>
+          <a:lstStyle/>
+          <a:p>
+            <a:pPr marR="0" algn="ctr" defTabSz="914400" eaLnBrk="1" fontAlgn="base" latinLnBrk="0" hangingPunct="1">
+              <a:lnSpc>
+                <a:spcPct val="100000"/>
+              </a:lnSpc>
+              <a:spcBef>
+                <a:spcPct val="50000"/>
+              </a:spcBef>
+              <a:spcAft>
+                <a:spcPct val="0"/>
+              </a:spcAft>
+              <a:buClr>
+                <a:srgbClr val="F0AB00"/>
+              </a:buClr>
+              <a:buSzPct val="80000"/>
+              <a:tabLst/>
+            </a:pPr>
+            <a:r>
+              <a:rPr kumimoji="0" lang="en-CN" sz="1800" b="0" i="0" u="none" strike="noStrike" kern="0" cap="none" spc="0" normalizeH="0" baseline="0" noProof="0" dirty="0">
+                <a:ln>
+                  <a:noFill/>
+                </a:ln>
+                <a:effectLst/>
+                <a:uLnTx/>
+                <a:uFillTx/>
+                <a:ea typeface="Arial Unicode MS" pitchFamily="34" charset="-128"/>
+                <a:cs typeface="Arial Unicode MS" pitchFamily="34" charset="-128"/>
+              </a:rPr>
+              <a:t>5</a:t>
+            </a:r>
+          </a:p>
+        </p:txBody>
+      </p:sp>
+      <p:sp>
+        <p:nvSpPr>
+          <p:cNvPr id="6" name="Rectangle 5">
+            <a:extLst>
+              <a:ext uri="{FF2B5EF4-FFF2-40B4-BE49-F238E27FC236}">
+                <a16:creationId xmlns:a16="http://schemas.microsoft.com/office/drawing/2014/main" id="{C5461F97-9304-364E-7545-883593056BDD}"/>
+              </a:ext>
+            </a:extLst>
+          </p:cNvPr>
+          <p:cNvSpPr/>
+          <p:nvPr/>
+        </p:nvSpPr>
+        <p:spPr bwMode="gray">
+          <a:xfrm>
+            <a:off x="8625566" y="2364522"/>
+            <a:ext cx="360757" cy="300729"/>
+          </a:xfrm>
+          <a:prstGeom prst="rect">
+            <a:avLst/>
+          </a:prstGeom>
+          <a:solidFill>
+            <a:schemeClr val="accent4">
+              <a:lumMod val="40000"/>
+              <a:lumOff val="60000"/>
+            </a:schemeClr>
+          </a:solidFill>
+          <a:ln w="25400" algn="ctr">
+            <a:noFill/>
+            <a:miter lim="800000"/>
+            <a:headEnd/>
+            <a:tailEnd/>
+          </a:ln>
+        </p:spPr>
+        <p:txBody>
+          <a:bodyPr lIns="90000" tIns="72000" rIns="90000" bIns="72000" rtlCol="0" anchor="ctr"/>
+          <a:lstStyle/>
+          <a:p>
+            <a:pPr marR="0" algn="ctr" defTabSz="914400" eaLnBrk="1" fontAlgn="base" latinLnBrk="0" hangingPunct="1">
+              <a:lnSpc>
+                <a:spcPct val="100000"/>
+              </a:lnSpc>
+              <a:spcBef>
+                <a:spcPct val="50000"/>
+              </a:spcBef>
+              <a:spcAft>
+                <a:spcPct val="0"/>
+              </a:spcAft>
+              <a:buClr>
+                <a:srgbClr val="F0AB00"/>
+              </a:buClr>
+              <a:buSzPct val="80000"/>
+              <a:tabLst/>
+            </a:pPr>
+            <a:r>
+              <a:rPr kumimoji="0" lang="en-CN" sz="1800" b="0" i="0" u="none" strike="noStrike" kern="0" cap="none" spc="0" normalizeH="0" baseline="0" noProof="0" dirty="0">
+                <a:ln>
+                  <a:noFill/>
+                </a:ln>
+                <a:effectLst/>
+                <a:uLnTx/>
+                <a:uFillTx/>
+                <a:ea typeface="Arial Unicode MS" pitchFamily="34" charset="-128"/>
+                <a:cs typeface="Arial Unicode MS" pitchFamily="34" charset="-128"/>
+              </a:rPr>
+              <a:t>2</a:t>
+            </a:r>
+          </a:p>
+        </p:txBody>
+      </p:sp>
+      <p:sp>
+        <p:nvSpPr>
+          <p:cNvPr id="7" name="Rectangle 6">
+            <a:extLst>
+              <a:ext uri="{FF2B5EF4-FFF2-40B4-BE49-F238E27FC236}">
+                <a16:creationId xmlns:a16="http://schemas.microsoft.com/office/drawing/2014/main" id="{F0A5C30F-20AC-B98D-823C-B89E241E439A}"/>
+              </a:ext>
+            </a:extLst>
+          </p:cNvPr>
+          <p:cNvSpPr/>
+          <p:nvPr/>
+        </p:nvSpPr>
+        <p:spPr bwMode="gray">
+          <a:xfrm>
+            <a:off x="7669471" y="1874703"/>
+            <a:ext cx="360757" cy="300729"/>
+          </a:xfrm>
+          <a:prstGeom prst="rect">
+            <a:avLst/>
+          </a:prstGeom>
+          <a:solidFill>
+            <a:schemeClr val="accent4">
+              <a:lumMod val="40000"/>
+              <a:lumOff val="60000"/>
+            </a:schemeClr>
+          </a:solidFill>
+          <a:ln w="25400" algn="ctr">
+            <a:noFill/>
+            <a:miter lim="800000"/>
+            <a:headEnd/>
+            <a:tailEnd/>
+          </a:ln>
+        </p:spPr>
+        <p:txBody>
+          <a:bodyPr lIns="90000" tIns="72000" rIns="90000" bIns="72000" rtlCol="0" anchor="ctr"/>
+          <a:lstStyle/>
+          <a:p>
+            <a:pPr marR="0" algn="ctr" defTabSz="914400" eaLnBrk="1" fontAlgn="base" latinLnBrk="0" hangingPunct="1">
+              <a:lnSpc>
+                <a:spcPct val="100000"/>
+              </a:lnSpc>
+              <a:spcBef>
+                <a:spcPct val="50000"/>
+              </a:spcBef>
+              <a:spcAft>
+                <a:spcPct val="0"/>
+              </a:spcAft>
+              <a:buClr>
+                <a:srgbClr val="F0AB00"/>
+              </a:buClr>
+              <a:buSzPct val="80000"/>
+              <a:tabLst/>
+            </a:pPr>
+            <a:r>
+              <a:rPr kumimoji="0" lang="en-CN" sz="1800" b="0" i="0" u="none" strike="noStrike" kern="0" cap="none" spc="0" normalizeH="0" baseline="0" noProof="0" dirty="0">
+                <a:ln>
+                  <a:noFill/>
+                </a:ln>
+                <a:effectLst/>
+                <a:uLnTx/>
+                <a:uFillTx/>
+                <a:ea typeface="Arial Unicode MS" pitchFamily="34" charset="-128"/>
+                <a:cs typeface="Arial Unicode MS" pitchFamily="34" charset="-128"/>
+              </a:rPr>
+              <a:t>4</a:t>
+            </a:r>
+          </a:p>
+        </p:txBody>
+      </p:sp>
+      <p:sp>
+        <p:nvSpPr>
+          <p:cNvPr id="8" name="Rectangle 7">
+            <a:extLst>
+              <a:ext uri="{FF2B5EF4-FFF2-40B4-BE49-F238E27FC236}">
+                <a16:creationId xmlns:a16="http://schemas.microsoft.com/office/drawing/2014/main" id="{75806E42-B916-15C5-6138-2C42E233E007}"/>
+              </a:ext>
+            </a:extLst>
+          </p:cNvPr>
+          <p:cNvSpPr/>
+          <p:nvPr/>
+        </p:nvSpPr>
+        <p:spPr bwMode="gray">
+          <a:xfrm>
+            <a:off x="6542692" y="2859671"/>
+            <a:ext cx="360757" cy="300729"/>
+          </a:xfrm>
+          <a:prstGeom prst="rect">
+            <a:avLst/>
+          </a:prstGeom>
+          <a:solidFill>
+            <a:schemeClr val="accent4">
+              <a:lumMod val="40000"/>
+              <a:lumOff val="60000"/>
+            </a:schemeClr>
+          </a:solidFill>
+          <a:ln w="25400" algn="ctr">
+            <a:noFill/>
+            <a:miter lim="800000"/>
+            <a:headEnd/>
+            <a:tailEnd/>
+          </a:ln>
+        </p:spPr>
+        <p:txBody>
+          <a:bodyPr lIns="90000" tIns="72000" rIns="90000" bIns="72000" rtlCol="0" anchor="ctr"/>
+          <a:lstStyle/>
+          <a:p>
+            <a:pPr marR="0" algn="ctr" defTabSz="914400" eaLnBrk="1" fontAlgn="base" latinLnBrk="0" hangingPunct="1">
+              <a:lnSpc>
+                <a:spcPct val="100000"/>
+              </a:lnSpc>
+              <a:spcBef>
+                <a:spcPct val="50000"/>
+              </a:spcBef>
+              <a:spcAft>
+                <a:spcPct val="0"/>
+              </a:spcAft>
+              <a:buClr>
+                <a:srgbClr val="F0AB00"/>
+              </a:buClr>
+              <a:buSzPct val="80000"/>
+              <a:tabLst/>
+            </a:pPr>
+            <a:r>
+              <a:rPr kumimoji="0" lang="en-CN" sz="1800" b="0" i="0" u="none" strike="noStrike" kern="0" cap="none" spc="0" normalizeH="0" baseline="0" noProof="0" dirty="0">
+                <a:ln>
+                  <a:noFill/>
+                </a:ln>
+                <a:effectLst/>
+                <a:uLnTx/>
+                <a:uFillTx/>
+                <a:ea typeface="Arial Unicode MS" pitchFamily="34" charset="-128"/>
+                <a:cs typeface="Arial Unicode MS" pitchFamily="34" charset="-128"/>
+              </a:rPr>
+              <a:t>2</a:t>
+            </a:r>
+          </a:p>
+        </p:txBody>
+      </p:sp>
+      <p:sp>
+        <p:nvSpPr>
+          <p:cNvPr id="9" name="Rectangle 8">
+            <a:extLst>
+              <a:ext uri="{FF2B5EF4-FFF2-40B4-BE49-F238E27FC236}">
+                <a16:creationId xmlns:a16="http://schemas.microsoft.com/office/drawing/2014/main" id="{59151CCD-8C26-F8BE-D66D-A77A7901EFC2}"/>
+              </a:ext>
+            </a:extLst>
+          </p:cNvPr>
+          <p:cNvSpPr/>
+          <p:nvPr/>
+        </p:nvSpPr>
+        <p:spPr bwMode="gray">
+          <a:xfrm>
+            <a:off x="6946839" y="2379778"/>
+            <a:ext cx="360757" cy="300729"/>
+          </a:xfrm>
+          <a:prstGeom prst="rect">
+            <a:avLst/>
+          </a:prstGeom>
+          <a:solidFill>
+            <a:schemeClr val="accent4">
+              <a:lumMod val="40000"/>
+              <a:lumOff val="60000"/>
+            </a:schemeClr>
+          </a:solidFill>
+          <a:ln w="25400" algn="ctr">
+            <a:noFill/>
+            <a:miter lim="800000"/>
+            <a:headEnd/>
+            <a:tailEnd/>
+          </a:ln>
+        </p:spPr>
+        <p:txBody>
+          <a:bodyPr lIns="90000" tIns="72000" rIns="90000" bIns="72000" rtlCol="0" anchor="ctr"/>
+          <a:lstStyle/>
+          <a:p>
+            <a:pPr marR="0" algn="ctr" defTabSz="914400" eaLnBrk="1" fontAlgn="base" latinLnBrk="0" hangingPunct="1">
+              <a:lnSpc>
+                <a:spcPct val="100000"/>
+              </a:lnSpc>
+              <a:spcBef>
+                <a:spcPct val="50000"/>
+              </a:spcBef>
+              <a:spcAft>
+                <a:spcPct val="0"/>
+              </a:spcAft>
+              <a:buClr>
+                <a:srgbClr val="F0AB00"/>
+              </a:buClr>
+              <a:buSzPct val="80000"/>
+              <a:tabLst/>
+            </a:pPr>
+            <a:r>
+              <a:rPr kumimoji="0" lang="en-CN" sz="1800" b="0" i="0" u="none" strike="noStrike" kern="0" cap="none" spc="0" normalizeH="0" baseline="0" noProof="0" dirty="0">
+                <a:ln>
+                  <a:noFill/>
+                </a:ln>
+                <a:effectLst/>
+                <a:uLnTx/>
+                <a:uFillTx/>
+                <a:ea typeface="Arial Unicode MS" pitchFamily="34" charset="-128"/>
+                <a:cs typeface="Arial Unicode MS" pitchFamily="34" charset="-128"/>
+              </a:rPr>
+              <a:t>3</a:t>
+            </a:r>
+          </a:p>
+        </p:txBody>
+      </p:sp>
+      <p:sp>
+        <p:nvSpPr>
+          <p:cNvPr id="10" name="Rectangle 9">
+            <a:extLst>
+              <a:ext uri="{FF2B5EF4-FFF2-40B4-BE49-F238E27FC236}">
+                <a16:creationId xmlns:a16="http://schemas.microsoft.com/office/drawing/2014/main" id="{6600DA83-0605-FC8C-F287-6A085BF0466B}"/>
+              </a:ext>
+            </a:extLst>
+          </p:cNvPr>
+          <p:cNvSpPr/>
+          <p:nvPr/>
+        </p:nvSpPr>
+        <p:spPr bwMode="gray">
+          <a:xfrm>
+            <a:off x="927715" y="1386753"/>
+            <a:ext cx="360757" cy="300729"/>
+          </a:xfrm>
+          <a:prstGeom prst="rect">
+            <a:avLst/>
+          </a:prstGeom>
+          <a:solidFill>
+            <a:schemeClr val="accent5">
+              <a:lumMod val="40000"/>
+              <a:lumOff val="60000"/>
+            </a:schemeClr>
+          </a:solidFill>
+          <a:ln w="25400" algn="ctr">
+            <a:noFill/>
+            <a:miter lim="800000"/>
+            <a:headEnd/>
+            <a:tailEnd/>
+          </a:ln>
+        </p:spPr>
+        <p:txBody>
+          <a:bodyPr lIns="90000" tIns="72000" rIns="90000" bIns="72000" rtlCol="0" anchor="ctr"/>
+          <a:lstStyle/>
+          <a:p>
+            <a:pPr marR="0" algn="ctr" defTabSz="914400" eaLnBrk="1" fontAlgn="base" latinLnBrk="0" hangingPunct="1">
+              <a:lnSpc>
+                <a:spcPct val="100000"/>
+              </a:lnSpc>
+              <a:spcBef>
+                <a:spcPct val="50000"/>
+              </a:spcBef>
+              <a:spcAft>
+                <a:spcPct val="0"/>
+              </a:spcAft>
+              <a:buClr>
+                <a:srgbClr val="F0AB00"/>
+              </a:buClr>
+              <a:buSzPct val="80000"/>
+              <a:tabLst/>
+            </a:pPr>
+            <a:r>
+              <a:rPr lang="en-CN" sz="1800" kern="0" dirty="0">
+                <a:ea typeface="Arial Unicode MS" pitchFamily="34" charset="-128"/>
+                <a:cs typeface="Arial Unicode MS" pitchFamily="34" charset="-128"/>
+              </a:rPr>
+              <a:t>0</a:t>
+            </a:r>
+            <a:endParaRPr kumimoji="0" lang="en-CN" sz="1800" b="0" i="0" u="none" strike="noStrike" kern="0" cap="none" spc="0" normalizeH="0" baseline="0" noProof="0" dirty="0">
+              <a:ln>
+                <a:noFill/>
+              </a:ln>
+              <a:effectLst/>
+              <a:uLnTx/>
+              <a:uFillTx/>
+              <a:ea typeface="Arial Unicode MS" pitchFamily="34" charset="-128"/>
+              <a:cs typeface="Arial Unicode MS" pitchFamily="34" charset="-128"/>
+            </a:endParaRPr>
+          </a:p>
+        </p:txBody>
+      </p:sp>
+      <p:sp>
+        <p:nvSpPr>
+          <p:cNvPr id="15" name="Rectangle 14">
+            <a:extLst>
+              <a:ext uri="{FF2B5EF4-FFF2-40B4-BE49-F238E27FC236}">
+                <a16:creationId xmlns:a16="http://schemas.microsoft.com/office/drawing/2014/main" id="{BF1502DE-37F3-22A7-B4F4-CEB57B8A72DE}"/>
+              </a:ext>
+            </a:extLst>
+          </p:cNvPr>
+          <p:cNvSpPr/>
+          <p:nvPr/>
+        </p:nvSpPr>
+        <p:spPr bwMode="gray">
+          <a:xfrm>
+            <a:off x="8262251" y="2867507"/>
+            <a:ext cx="360757" cy="300729"/>
+          </a:xfrm>
+          <a:prstGeom prst="rect">
+            <a:avLst/>
+          </a:prstGeom>
+          <a:solidFill>
+            <a:schemeClr val="accent4">
+              <a:lumMod val="40000"/>
+              <a:lumOff val="60000"/>
+            </a:schemeClr>
+          </a:solidFill>
+          <a:ln w="25400" algn="ctr">
+            <a:noFill/>
+            <a:miter lim="800000"/>
+            <a:headEnd/>
+            <a:tailEnd/>
+          </a:ln>
+        </p:spPr>
+        <p:txBody>
+          <a:bodyPr lIns="90000" tIns="72000" rIns="90000" bIns="72000" rtlCol="0" anchor="ctr"/>
+          <a:lstStyle/>
+          <a:p>
+            <a:pPr marR="0" algn="ctr" defTabSz="914400" eaLnBrk="1" fontAlgn="base" latinLnBrk="0" hangingPunct="1">
+              <a:lnSpc>
+                <a:spcPct val="100000"/>
+              </a:lnSpc>
+              <a:spcBef>
+                <a:spcPct val="50000"/>
+              </a:spcBef>
+              <a:spcAft>
+                <a:spcPct val="0"/>
+              </a:spcAft>
+              <a:buClr>
+                <a:srgbClr val="F0AB00"/>
+              </a:buClr>
+              <a:buSzPct val="80000"/>
+              <a:tabLst/>
+            </a:pPr>
+            <a:r>
+              <a:rPr kumimoji="0" lang="en-CN" sz="1800" b="0" i="0" u="none" strike="noStrike" kern="0" cap="none" spc="0" normalizeH="0" baseline="0" noProof="0" dirty="0">
+                <a:ln>
+                  <a:noFill/>
+                </a:ln>
+                <a:solidFill>
+                  <a:schemeClr val="accent5"/>
+                </a:solidFill>
+                <a:effectLst/>
+                <a:uLnTx/>
+                <a:uFillTx/>
+                <a:ea typeface="Arial Unicode MS" pitchFamily="34" charset="-128"/>
+                <a:cs typeface="Arial Unicode MS" pitchFamily="34" charset="-128"/>
+              </a:rPr>
+              <a:t>1</a:t>
+            </a:r>
+          </a:p>
+        </p:txBody>
+      </p:sp>
+      <p:sp>
+        <p:nvSpPr>
+          <p:cNvPr id="16" name="Rectangle 15">
+            <a:extLst>
+              <a:ext uri="{FF2B5EF4-FFF2-40B4-BE49-F238E27FC236}">
+                <a16:creationId xmlns:a16="http://schemas.microsoft.com/office/drawing/2014/main" id="{54F484F4-ABD2-60A5-5C67-C2761E7AC46D}"/>
+              </a:ext>
+            </a:extLst>
+          </p:cNvPr>
+          <p:cNvSpPr/>
+          <p:nvPr/>
+        </p:nvSpPr>
+        <p:spPr bwMode="gray">
+          <a:xfrm>
+            <a:off x="8986323" y="2858434"/>
+            <a:ext cx="360757" cy="300729"/>
+          </a:xfrm>
+          <a:prstGeom prst="rect">
+            <a:avLst/>
+          </a:prstGeom>
+          <a:solidFill>
+            <a:schemeClr val="accent4">
+              <a:lumMod val="40000"/>
+              <a:lumOff val="60000"/>
+            </a:schemeClr>
+          </a:solidFill>
+          <a:ln w="25400" algn="ctr">
+            <a:noFill/>
+            <a:miter lim="800000"/>
+            <a:headEnd/>
+            <a:tailEnd/>
+          </a:ln>
+        </p:spPr>
+        <p:txBody>
+          <a:bodyPr lIns="90000" tIns="72000" rIns="90000" bIns="72000" rtlCol="0" anchor="ctr"/>
+          <a:lstStyle/>
+          <a:p>
+            <a:pPr marR="0" algn="ctr" defTabSz="914400" eaLnBrk="1" fontAlgn="base" latinLnBrk="0" hangingPunct="1">
+              <a:lnSpc>
+                <a:spcPct val="100000"/>
+              </a:lnSpc>
+              <a:spcBef>
+                <a:spcPct val="50000"/>
+              </a:spcBef>
+              <a:spcAft>
+                <a:spcPct val="0"/>
+              </a:spcAft>
+              <a:buClr>
+                <a:srgbClr val="F0AB00"/>
+              </a:buClr>
+              <a:buSzPct val="80000"/>
+              <a:tabLst/>
+            </a:pPr>
+            <a:r>
+              <a:rPr kumimoji="0" lang="en-CN" sz="1800" b="0" i="0" u="none" strike="noStrike" kern="0" cap="none" spc="0" normalizeH="0" baseline="0" noProof="0" dirty="0">
+                <a:ln>
+                  <a:noFill/>
+                </a:ln>
+                <a:solidFill>
+                  <a:schemeClr val="accent5"/>
+                </a:solidFill>
+                <a:effectLst/>
+                <a:uLnTx/>
+                <a:uFillTx/>
+                <a:ea typeface="Arial Unicode MS" pitchFamily="34" charset="-128"/>
+                <a:cs typeface="Arial Unicode MS" pitchFamily="34" charset="-128"/>
+              </a:rPr>
+              <a:t>0</a:t>
+            </a:r>
+          </a:p>
+        </p:txBody>
+      </p:sp>
+      <p:sp>
+        <p:nvSpPr>
+          <p:cNvPr id="17" name="Rectangle 16">
+            <a:extLst>
+              <a:ext uri="{FF2B5EF4-FFF2-40B4-BE49-F238E27FC236}">
+                <a16:creationId xmlns:a16="http://schemas.microsoft.com/office/drawing/2014/main" id="{4BD4507F-FDF4-BC67-3F09-C25E02329F01}"/>
+              </a:ext>
+            </a:extLst>
+          </p:cNvPr>
+          <p:cNvSpPr/>
+          <p:nvPr/>
+        </p:nvSpPr>
+        <p:spPr bwMode="gray">
+          <a:xfrm>
+            <a:off x="7384067" y="2867507"/>
+            <a:ext cx="360757" cy="300729"/>
+          </a:xfrm>
+          <a:prstGeom prst="rect">
+            <a:avLst/>
+          </a:prstGeom>
+          <a:solidFill>
+            <a:schemeClr val="accent4">
+              <a:lumMod val="40000"/>
+              <a:lumOff val="60000"/>
+            </a:schemeClr>
+          </a:solidFill>
+          <a:ln w="25400" algn="ctr">
+            <a:noFill/>
+            <a:miter lim="800000"/>
+            <a:headEnd/>
+            <a:tailEnd/>
+          </a:ln>
+        </p:spPr>
+        <p:txBody>
+          <a:bodyPr lIns="90000" tIns="72000" rIns="90000" bIns="72000" rtlCol="0" anchor="ctr"/>
+          <a:lstStyle/>
+          <a:p>
+            <a:pPr marR="0" algn="ctr" defTabSz="914400" eaLnBrk="1" fontAlgn="base" latinLnBrk="0" hangingPunct="1">
+              <a:lnSpc>
+                <a:spcPct val="100000"/>
+              </a:lnSpc>
+              <a:spcBef>
+                <a:spcPct val="50000"/>
+              </a:spcBef>
+              <a:spcAft>
+                <a:spcPct val="0"/>
+              </a:spcAft>
+              <a:buClr>
+                <a:srgbClr val="F0AB00"/>
+              </a:buClr>
+              <a:buSzPct val="80000"/>
+              <a:tabLst/>
+            </a:pPr>
+            <a:r>
+              <a:rPr kumimoji="0" lang="en-CN" sz="1800" b="0" i="0" u="none" strike="noStrike" kern="0" cap="none" spc="0" normalizeH="0" baseline="0" noProof="0" dirty="0">
+                <a:ln>
+                  <a:noFill/>
+                </a:ln>
+                <a:solidFill>
+                  <a:schemeClr val="accent5"/>
+                </a:solidFill>
+                <a:effectLst/>
+                <a:uLnTx/>
+                <a:uFillTx/>
+                <a:ea typeface="Arial Unicode MS" pitchFamily="34" charset="-128"/>
+                <a:cs typeface="Arial Unicode MS" pitchFamily="34" charset="-128"/>
+              </a:rPr>
+              <a:t>1</a:t>
+            </a:r>
+          </a:p>
+        </p:txBody>
+      </p:sp>
+      <p:cxnSp>
+        <p:nvCxnSpPr>
+          <p:cNvPr id="19" name="Straight Arrow Connector 18">
+            <a:extLst>
+              <a:ext uri="{FF2B5EF4-FFF2-40B4-BE49-F238E27FC236}">
+                <a16:creationId xmlns:a16="http://schemas.microsoft.com/office/drawing/2014/main" id="{15E31D1D-82F6-3D67-BE6C-0E9D54FB71E5}"/>
+              </a:ext>
+            </a:extLst>
+          </p:cNvPr>
+          <p:cNvCxnSpPr>
+            <a:stCxn id="4" idx="2"/>
+            <a:endCxn id="5" idx="0"/>
+          </p:cNvCxnSpPr>
+          <p:nvPr/>
+        </p:nvCxnSpPr>
+        <p:spPr>
+          <a:xfrm flipH="1">
+            <a:off x="4440034" y="1677403"/>
+            <a:ext cx="1678391" cy="197300"/>
+          </a:xfrm>
+          <a:prstGeom prst="straightConnector1">
+            <a:avLst/>
+          </a:prstGeom>
+          <a:ln w="25400">
+            <a:solidFill>
+              <a:schemeClr val="accent4"/>
+            </a:solidFill>
+            <a:headEnd type="none" w="med" len="med"/>
+            <a:tailEnd type="triangle"/>
+          </a:ln>
+        </p:spPr>
+        <p:style>
+          <a:lnRef idx="1">
+            <a:schemeClr val="accent1"/>
+          </a:lnRef>
+          <a:fillRef idx="0">
+            <a:schemeClr val="accent1"/>
+          </a:fillRef>
+          <a:effectRef idx="0">
+            <a:schemeClr val="accent1"/>
+          </a:effectRef>
+          <a:fontRef idx="minor">
+            <a:schemeClr val="tx1"/>
+          </a:fontRef>
+        </p:style>
+      </p:cxnSp>
+      <p:cxnSp>
+        <p:nvCxnSpPr>
+          <p:cNvPr id="20" name="Straight Arrow Connector 19">
+            <a:extLst>
+              <a:ext uri="{FF2B5EF4-FFF2-40B4-BE49-F238E27FC236}">
+                <a16:creationId xmlns:a16="http://schemas.microsoft.com/office/drawing/2014/main" id="{3AB32079-9F08-0437-18A9-381A94F02268}"/>
+              </a:ext>
+            </a:extLst>
+          </p:cNvPr>
+          <p:cNvCxnSpPr>
+            <a:cxnSpLocks/>
+            <a:stCxn id="4" idx="2"/>
+            <a:endCxn id="7" idx="0"/>
+          </p:cNvCxnSpPr>
+          <p:nvPr/>
+        </p:nvCxnSpPr>
+        <p:spPr>
+          <a:xfrm>
+            <a:off x="6118425" y="1677403"/>
+            <a:ext cx="1731425" cy="197300"/>
+          </a:xfrm>
+          <a:prstGeom prst="straightConnector1">
+            <a:avLst/>
+          </a:prstGeom>
+          <a:ln w="25400">
+            <a:solidFill>
+              <a:schemeClr val="accent4"/>
+            </a:solidFill>
+            <a:headEnd type="none" w="med" len="med"/>
+            <a:tailEnd type="triangle"/>
+          </a:ln>
+        </p:spPr>
+        <p:style>
+          <a:lnRef idx="1">
+            <a:schemeClr val="accent1"/>
+          </a:lnRef>
+          <a:fillRef idx="0">
+            <a:schemeClr val="accent1"/>
+          </a:fillRef>
+          <a:effectRef idx="0">
+            <a:schemeClr val="accent1"/>
+          </a:effectRef>
+          <a:fontRef idx="minor">
+            <a:schemeClr val="tx1"/>
+          </a:fontRef>
+        </p:style>
+      </p:cxnSp>
+      <p:cxnSp>
+        <p:nvCxnSpPr>
+          <p:cNvPr id="23" name="Straight Arrow Connector 22">
+            <a:extLst>
+              <a:ext uri="{FF2B5EF4-FFF2-40B4-BE49-F238E27FC236}">
+                <a16:creationId xmlns:a16="http://schemas.microsoft.com/office/drawing/2014/main" id="{CAE3603A-79E5-E8F4-BF09-EAC91E8D84FF}"/>
+              </a:ext>
+            </a:extLst>
+          </p:cNvPr>
+          <p:cNvCxnSpPr>
+            <a:cxnSpLocks/>
+            <a:stCxn id="7" idx="2"/>
+            <a:endCxn id="6" idx="0"/>
+          </p:cNvCxnSpPr>
+          <p:nvPr/>
+        </p:nvCxnSpPr>
+        <p:spPr>
+          <a:xfrm>
+            <a:off x="7849850" y="2175432"/>
+            <a:ext cx="956095" cy="189090"/>
+          </a:xfrm>
+          <a:prstGeom prst="straightConnector1">
+            <a:avLst/>
+          </a:prstGeom>
+          <a:ln w="25400">
+            <a:solidFill>
+              <a:schemeClr val="accent4"/>
+            </a:solidFill>
+            <a:headEnd type="none" w="med" len="med"/>
+            <a:tailEnd type="triangle"/>
+          </a:ln>
+        </p:spPr>
+        <p:style>
+          <a:lnRef idx="1">
+            <a:schemeClr val="accent1"/>
+          </a:lnRef>
+          <a:fillRef idx="0">
+            <a:schemeClr val="accent1"/>
+          </a:fillRef>
+          <a:effectRef idx="0">
+            <a:schemeClr val="accent1"/>
+          </a:effectRef>
+          <a:fontRef idx="minor">
+            <a:schemeClr val="tx1"/>
+          </a:fontRef>
+        </p:style>
+      </p:cxnSp>
+      <p:cxnSp>
+        <p:nvCxnSpPr>
+          <p:cNvPr id="26" name="Straight Arrow Connector 25">
+            <a:extLst>
+              <a:ext uri="{FF2B5EF4-FFF2-40B4-BE49-F238E27FC236}">
+                <a16:creationId xmlns:a16="http://schemas.microsoft.com/office/drawing/2014/main" id="{3730B450-BF6A-B7E1-8EBA-78CC612D017C}"/>
+              </a:ext>
+            </a:extLst>
+          </p:cNvPr>
+          <p:cNvCxnSpPr>
+            <a:cxnSpLocks/>
+            <a:stCxn id="7" idx="2"/>
+            <a:endCxn id="9" idx="0"/>
+          </p:cNvCxnSpPr>
+          <p:nvPr/>
+        </p:nvCxnSpPr>
+        <p:spPr>
+          <a:xfrm flipH="1">
+            <a:off x="7127218" y="2175432"/>
+            <a:ext cx="722632" cy="204346"/>
+          </a:xfrm>
+          <a:prstGeom prst="straightConnector1">
+            <a:avLst/>
+          </a:prstGeom>
+          <a:ln w="25400">
+            <a:solidFill>
+              <a:schemeClr val="accent4"/>
+            </a:solidFill>
+            <a:headEnd type="none" w="med" len="med"/>
+            <a:tailEnd type="triangle"/>
+          </a:ln>
+        </p:spPr>
+        <p:style>
+          <a:lnRef idx="1">
+            <a:schemeClr val="accent1"/>
+          </a:lnRef>
+          <a:fillRef idx="0">
+            <a:schemeClr val="accent1"/>
+          </a:fillRef>
+          <a:effectRef idx="0">
+            <a:schemeClr val="accent1"/>
+          </a:effectRef>
+          <a:fontRef idx="minor">
+            <a:schemeClr val="tx1"/>
+          </a:fontRef>
+        </p:style>
+      </p:cxnSp>
+      <p:cxnSp>
+        <p:nvCxnSpPr>
+          <p:cNvPr id="29" name="Straight Arrow Connector 28">
+            <a:extLst>
+              <a:ext uri="{FF2B5EF4-FFF2-40B4-BE49-F238E27FC236}">
+                <a16:creationId xmlns:a16="http://schemas.microsoft.com/office/drawing/2014/main" id="{35D6B2E8-DA62-1184-386A-132852CDD0DB}"/>
+              </a:ext>
+            </a:extLst>
+          </p:cNvPr>
+          <p:cNvCxnSpPr>
+            <a:cxnSpLocks/>
+            <a:stCxn id="6" idx="2"/>
+            <a:endCxn id="15" idx="0"/>
+          </p:cNvCxnSpPr>
+          <p:nvPr/>
+        </p:nvCxnSpPr>
+        <p:spPr>
+          <a:xfrm flipH="1">
+            <a:off x="8442630" y="2665251"/>
+            <a:ext cx="363315" cy="202256"/>
+          </a:xfrm>
+          <a:prstGeom prst="straightConnector1">
+            <a:avLst/>
+          </a:prstGeom>
+          <a:ln w="25400">
+            <a:solidFill>
+              <a:schemeClr val="accent4"/>
+            </a:solidFill>
+            <a:headEnd type="none" w="med" len="med"/>
+            <a:tailEnd type="triangle"/>
+          </a:ln>
+        </p:spPr>
+        <p:style>
+          <a:lnRef idx="1">
+            <a:schemeClr val="accent1"/>
+          </a:lnRef>
+          <a:fillRef idx="0">
+            <a:schemeClr val="accent1"/>
+          </a:fillRef>
+          <a:effectRef idx="0">
+            <a:schemeClr val="accent1"/>
+          </a:effectRef>
+          <a:fontRef idx="minor">
+            <a:schemeClr val="tx1"/>
+          </a:fontRef>
+        </p:style>
+      </p:cxnSp>
+      <p:cxnSp>
+        <p:nvCxnSpPr>
+          <p:cNvPr id="32" name="Straight Arrow Connector 31">
+            <a:extLst>
+              <a:ext uri="{FF2B5EF4-FFF2-40B4-BE49-F238E27FC236}">
+                <a16:creationId xmlns:a16="http://schemas.microsoft.com/office/drawing/2014/main" id="{3B13F242-4D3C-3729-AB5C-277A9DAE1F44}"/>
+              </a:ext>
+            </a:extLst>
+          </p:cNvPr>
+          <p:cNvCxnSpPr>
+            <a:cxnSpLocks/>
+            <a:stCxn id="6" idx="2"/>
+            <a:endCxn id="16" idx="0"/>
+          </p:cNvCxnSpPr>
+          <p:nvPr/>
+        </p:nvCxnSpPr>
+        <p:spPr>
+          <a:xfrm>
+            <a:off x="8805945" y="2665251"/>
+            <a:ext cx="360757" cy="193183"/>
+          </a:xfrm>
+          <a:prstGeom prst="straightConnector1">
+            <a:avLst/>
+          </a:prstGeom>
+          <a:ln w="25400">
+            <a:solidFill>
+              <a:schemeClr val="accent4"/>
+            </a:solidFill>
+            <a:headEnd type="none" w="med" len="med"/>
+            <a:tailEnd type="triangle"/>
+          </a:ln>
+        </p:spPr>
+        <p:style>
+          <a:lnRef idx="1">
+            <a:schemeClr val="accent1"/>
+          </a:lnRef>
+          <a:fillRef idx="0">
+            <a:schemeClr val="accent1"/>
+          </a:fillRef>
+          <a:effectRef idx="0">
+            <a:schemeClr val="accent1"/>
+          </a:effectRef>
+          <a:fontRef idx="minor">
+            <a:schemeClr val="tx1"/>
+          </a:fontRef>
+        </p:style>
+      </p:cxnSp>
+      <p:cxnSp>
+        <p:nvCxnSpPr>
+          <p:cNvPr id="35" name="Straight Arrow Connector 34">
+            <a:extLst>
+              <a:ext uri="{FF2B5EF4-FFF2-40B4-BE49-F238E27FC236}">
+                <a16:creationId xmlns:a16="http://schemas.microsoft.com/office/drawing/2014/main" id="{BA121FB2-274D-0826-8B52-8470A98CCD6A}"/>
+              </a:ext>
+            </a:extLst>
+          </p:cNvPr>
+          <p:cNvCxnSpPr>
+            <a:cxnSpLocks/>
+            <a:stCxn id="9" idx="2"/>
+            <a:endCxn id="8" idx="0"/>
+          </p:cNvCxnSpPr>
+          <p:nvPr/>
+        </p:nvCxnSpPr>
+        <p:spPr>
+          <a:xfrm flipH="1">
+            <a:off x="6723071" y="2680507"/>
+            <a:ext cx="404147" cy="179164"/>
+          </a:xfrm>
+          <a:prstGeom prst="straightConnector1">
+            <a:avLst/>
+          </a:prstGeom>
+          <a:ln w="25400">
+            <a:solidFill>
+              <a:schemeClr val="accent4"/>
+            </a:solidFill>
+            <a:headEnd type="none" w="med" len="med"/>
+            <a:tailEnd type="triangle"/>
+          </a:ln>
+        </p:spPr>
+        <p:style>
+          <a:lnRef idx="1">
+            <a:schemeClr val="accent1"/>
+          </a:lnRef>
+          <a:fillRef idx="0">
+            <a:schemeClr val="accent1"/>
+          </a:fillRef>
+          <a:effectRef idx="0">
+            <a:schemeClr val="accent1"/>
+          </a:effectRef>
+          <a:fontRef idx="minor">
+            <a:schemeClr val="tx1"/>
+          </a:fontRef>
+        </p:style>
+      </p:cxnSp>
+      <p:cxnSp>
+        <p:nvCxnSpPr>
+          <p:cNvPr id="38" name="Straight Arrow Connector 37">
+            <a:extLst>
+              <a:ext uri="{FF2B5EF4-FFF2-40B4-BE49-F238E27FC236}">
+                <a16:creationId xmlns:a16="http://schemas.microsoft.com/office/drawing/2014/main" id="{33C3805A-F07B-0138-0662-99605470D39F}"/>
+              </a:ext>
+            </a:extLst>
+          </p:cNvPr>
+          <p:cNvCxnSpPr>
+            <a:cxnSpLocks/>
+            <a:stCxn id="9" idx="2"/>
+            <a:endCxn id="17" idx="0"/>
+          </p:cNvCxnSpPr>
+          <p:nvPr/>
+        </p:nvCxnSpPr>
+        <p:spPr>
+          <a:xfrm>
+            <a:off x="7127218" y="2680507"/>
+            <a:ext cx="437228" cy="187000"/>
+          </a:xfrm>
+          <a:prstGeom prst="straightConnector1">
+            <a:avLst/>
+          </a:prstGeom>
+          <a:ln w="25400">
+            <a:solidFill>
+              <a:schemeClr val="accent4"/>
+            </a:solidFill>
+            <a:headEnd type="none" w="med" len="med"/>
+            <a:tailEnd type="triangle"/>
+          </a:ln>
+        </p:spPr>
+        <p:style>
+          <a:lnRef idx="1">
+            <a:schemeClr val="accent1"/>
+          </a:lnRef>
+          <a:fillRef idx="0">
+            <a:schemeClr val="accent1"/>
+          </a:fillRef>
+          <a:effectRef idx="0">
+            <a:schemeClr val="accent1"/>
+          </a:effectRef>
+          <a:fontRef idx="minor">
+            <a:schemeClr val="tx1"/>
+          </a:fontRef>
+        </p:style>
+      </p:cxnSp>
+      <p:sp>
+        <p:nvSpPr>
+          <p:cNvPr id="41" name="Rectangle 40">
+            <a:extLst>
+              <a:ext uri="{FF2B5EF4-FFF2-40B4-BE49-F238E27FC236}">
+                <a16:creationId xmlns:a16="http://schemas.microsoft.com/office/drawing/2014/main" id="{AE9F8AE4-56C7-D114-A678-69829E4D5386}"/>
+              </a:ext>
+            </a:extLst>
+          </p:cNvPr>
+          <p:cNvSpPr/>
+          <p:nvPr/>
+        </p:nvSpPr>
+        <p:spPr bwMode="gray">
+          <a:xfrm>
+            <a:off x="6193372" y="3380987"/>
+            <a:ext cx="360757" cy="300729"/>
+          </a:xfrm>
+          <a:prstGeom prst="rect">
+            <a:avLst/>
+          </a:prstGeom>
+          <a:solidFill>
+            <a:schemeClr val="accent4">
+              <a:lumMod val="40000"/>
+              <a:lumOff val="60000"/>
+            </a:schemeClr>
+          </a:solidFill>
+          <a:ln w="25400" algn="ctr">
+            <a:noFill/>
+            <a:miter lim="800000"/>
+            <a:headEnd/>
+            <a:tailEnd/>
+          </a:ln>
+        </p:spPr>
+        <p:txBody>
+          <a:bodyPr lIns="90000" tIns="72000" rIns="90000" bIns="72000" rtlCol="0" anchor="ctr"/>
+          <a:lstStyle/>
+          <a:p>
+            <a:pPr marR="0" algn="ctr" defTabSz="914400" eaLnBrk="1" fontAlgn="base" latinLnBrk="0" hangingPunct="1">
+              <a:lnSpc>
+                <a:spcPct val="100000"/>
+              </a:lnSpc>
+              <a:spcBef>
+                <a:spcPct val="50000"/>
+              </a:spcBef>
+              <a:spcAft>
+                <a:spcPct val="0"/>
+              </a:spcAft>
+              <a:buClr>
+                <a:srgbClr val="F0AB00"/>
+              </a:buClr>
+              <a:buSzPct val="80000"/>
+              <a:tabLst/>
+            </a:pPr>
+            <a:r>
+              <a:rPr kumimoji="0" lang="en-CN" sz="1800" b="0" i="0" u="none" strike="noStrike" kern="0" cap="none" spc="0" normalizeH="0" baseline="0" noProof="0" dirty="0">
+                <a:ln>
+                  <a:noFill/>
+                </a:ln>
+                <a:solidFill>
+                  <a:schemeClr val="accent5"/>
+                </a:solidFill>
+                <a:effectLst/>
+                <a:uLnTx/>
+                <a:uFillTx/>
+                <a:ea typeface="Arial Unicode MS" pitchFamily="34" charset="-128"/>
+                <a:cs typeface="Arial Unicode MS" pitchFamily="34" charset="-128"/>
+              </a:rPr>
+              <a:t>1</a:t>
+            </a:r>
+          </a:p>
+        </p:txBody>
+      </p:sp>
+      <p:sp>
+        <p:nvSpPr>
+          <p:cNvPr id="42" name="Rectangle 41">
+            <a:extLst>
+              <a:ext uri="{FF2B5EF4-FFF2-40B4-BE49-F238E27FC236}">
+                <a16:creationId xmlns:a16="http://schemas.microsoft.com/office/drawing/2014/main" id="{12CA8504-D355-E3CF-CE20-DC86A7C433D2}"/>
+              </a:ext>
+            </a:extLst>
+          </p:cNvPr>
+          <p:cNvSpPr/>
+          <p:nvPr/>
+        </p:nvSpPr>
+        <p:spPr bwMode="gray">
+          <a:xfrm>
+            <a:off x="6889132" y="3380513"/>
+            <a:ext cx="360757" cy="300729"/>
+          </a:xfrm>
+          <a:prstGeom prst="rect">
+            <a:avLst/>
+          </a:prstGeom>
+          <a:solidFill>
+            <a:schemeClr val="accent4">
+              <a:lumMod val="40000"/>
+              <a:lumOff val="60000"/>
+            </a:schemeClr>
+          </a:solidFill>
+          <a:ln w="25400" algn="ctr">
+            <a:noFill/>
+            <a:miter lim="800000"/>
+            <a:headEnd/>
+            <a:tailEnd/>
+          </a:ln>
+        </p:spPr>
+        <p:txBody>
+          <a:bodyPr lIns="90000" tIns="72000" rIns="90000" bIns="72000" rtlCol="0" anchor="ctr"/>
+          <a:lstStyle/>
+          <a:p>
+            <a:pPr marR="0" algn="ctr" defTabSz="914400" eaLnBrk="1" fontAlgn="base" latinLnBrk="0" hangingPunct="1">
+              <a:lnSpc>
+                <a:spcPct val="100000"/>
+              </a:lnSpc>
+              <a:spcBef>
+                <a:spcPct val="50000"/>
+              </a:spcBef>
+              <a:spcAft>
+                <a:spcPct val="0"/>
+              </a:spcAft>
+              <a:buClr>
+                <a:srgbClr val="F0AB00"/>
+              </a:buClr>
+              <a:buSzPct val="80000"/>
+              <a:tabLst/>
+            </a:pPr>
+            <a:r>
+              <a:rPr kumimoji="0" lang="en-CN" sz="1800" b="0" i="0" u="none" strike="noStrike" kern="0" cap="none" spc="0" normalizeH="0" baseline="0" noProof="0" dirty="0">
+                <a:ln>
+                  <a:noFill/>
+                </a:ln>
+                <a:solidFill>
+                  <a:schemeClr val="accent5"/>
+                </a:solidFill>
+                <a:effectLst/>
+                <a:uLnTx/>
+                <a:uFillTx/>
+                <a:ea typeface="Arial Unicode MS" pitchFamily="34" charset="-128"/>
+                <a:cs typeface="Arial Unicode MS" pitchFamily="34" charset="-128"/>
+              </a:rPr>
+              <a:t>0</a:t>
+            </a:r>
+          </a:p>
+        </p:txBody>
+      </p:sp>
+      <p:cxnSp>
+        <p:nvCxnSpPr>
+          <p:cNvPr id="43" name="Straight Arrow Connector 42">
+            <a:extLst>
+              <a:ext uri="{FF2B5EF4-FFF2-40B4-BE49-F238E27FC236}">
+                <a16:creationId xmlns:a16="http://schemas.microsoft.com/office/drawing/2014/main" id="{BAFF0989-2A67-64DF-7FA5-7BB435F59525}"/>
+              </a:ext>
+            </a:extLst>
+          </p:cNvPr>
+          <p:cNvCxnSpPr>
+            <a:cxnSpLocks/>
+            <a:stCxn id="8" idx="2"/>
+            <a:endCxn id="41" idx="0"/>
+          </p:cNvCxnSpPr>
+          <p:nvPr/>
+        </p:nvCxnSpPr>
+        <p:spPr>
+          <a:xfrm flipH="1">
+            <a:off x="6373751" y="3160400"/>
+            <a:ext cx="349320" cy="220587"/>
+          </a:xfrm>
+          <a:prstGeom prst="straightConnector1">
+            <a:avLst/>
+          </a:prstGeom>
+          <a:ln w="25400">
+            <a:solidFill>
+              <a:schemeClr val="accent4"/>
+            </a:solidFill>
+            <a:headEnd type="none" w="med" len="med"/>
+            <a:tailEnd type="triangle"/>
+          </a:ln>
+        </p:spPr>
+        <p:style>
+          <a:lnRef idx="1">
+            <a:schemeClr val="accent1"/>
+          </a:lnRef>
+          <a:fillRef idx="0">
+            <a:schemeClr val="accent1"/>
+          </a:fillRef>
+          <a:effectRef idx="0">
+            <a:schemeClr val="accent1"/>
+          </a:effectRef>
+          <a:fontRef idx="minor">
+            <a:schemeClr val="tx1"/>
+          </a:fontRef>
+        </p:style>
+      </p:cxnSp>
+      <p:cxnSp>
+        <p:nvCxnSpPr>
+          <p:cNvPr id="44" name="Straight Arrow Connector 43">
+            <a:extLst>
+              <a:ext uri="{FF2B5EF4-FFF2-40B4-BE49-F238E27FC236}">
+                <a16:creationId xmlns:a16="http://schemas.microsoft.com/office/drawing/2014/main" id="{C8DAD9A0-E7BD-B68E-6D12-554B5B5EDC70}"/>
+              </a:ext>
+            </a:extLst>
+          </p:cNvPr>
+          <p:cNvCxnSpPr>
+            <a:cxnSpLocks/>
+            <a:stCxn id="8" idx="2"/>
+            <a:endCxn id="42" idx="0"/>
+          </p:cNvCxnSpPr>
+          <p:nvPr/>
+        </p:nvCxnSpPr>
+        <p:spPr>
+          <a:xfrm>
+            <a:off x="6723071" y="3160400"/>
+            <a:ext cx="346440" cy="220113"/>
+          </a:xfrm>
+          <a:prstGeom prst="straightConnector1">
+            <a:avLst/>
+          </a:prstGeom>
+          <a:ln w="25400">
+            <a:solidFill>
+              <a:schemeClr val="accent4"/>
+            </a:solidFill>
+            <a:headEnd type="none" w="med" len="med"/>
+            <a:tailEnd type="triangle"/>
+          </a:ln>
+        </p:spPr>
+        <p:style>
+          <a:lnRef idx="1">
+            <a:schemeClr val="accent1"/>
+          </a:lnRef>
+          <a:fillRef idx="0">
+            <a:schemeClr val="accent1"/>
+          </a:fillRef>
+          <a:effectRef idx="0">
+            <a:schemeClr val="accent1"/>
+          </a:effectRef>
+          <a:fontRef idx="minor">
+            <a:schemeClr val="tx1"/>
+          </a:fontRef>
+        </p:style>
+      </p:cxnSp>
+      <p:sp>
+        <p:nvSpPr>
+          <p:cNvPr id="47" name="Rectangle 46">
+            <a:extLst>
+              <a:ext uri="{FF2B5EF4-FFF2-40B4-BE49-F238E27FC236}">
+                <a16:creationId xmlns:a16="http://schemas.microsoft.com/office/drawing/2014/main" id="{2817DD44-12BD-D305-4E6F-34605AECEB2F}"/>
+              </a:ext>
+            </a:extLst>
+          </p:cNvPr>
+          <p:cNvSpPr/>
+          <p:nvPr/>
+        </p:nvSpPr>
+        <p:spPr bwMode="gray">
+          <a:xfrm>
+            <a:off x="3111946" y="2370090"/>
+            <a:ext cx="360757" cy="300729"/>
+          </a:xfrm>
+          <a:prstGeom prst="rect">
+            <a:avLst/>
+          </a:prstGeom>
+          <a:solidFill>
+            <a:schemeClr val="accent4">
+              <a:lumMod val="40000"/>
+              <a:lumOff val="60000"/>
+            </a:schemeClr>
+          </a:solidFill>
+          <a:ln w="25400" algn="ctr">
+            <a:noFill/>
+            <a:miter lim="800000"/>
+            <a:headEnd/>
+            <a:tailEnd/>
+          </a:ln>
+        </p:spPr>
+        <p:txBody>
+          <a:bodyPr lIns="90000" tIns="72000" rIns="90000" bIns="72000" rtlCol="0" anchor="ctr"/>
+          <a:lstStyle/>
+          <a:p>
+            <a:pPr marR="0" algn="ctr" defTabSz="914400" eaLnBrk="1" fontAlgn="base" latinLnBrk="0" hangingPunct="1">
+              <a:lnSpc>
+                <a:spcPct val="100000"/>
+              </a:lnSpc>
+              <a:spcBef>
+                <a:spcPct val="50000"/>
+              </a:spcBef>
+              <a:spcAft>
+                <a:spcPct val="0"/>
+              </a:spcAft>
+              <a:buClr>
+                <a:srgbClr val="F0AB00"/>
+              </a:buClr>
+              <a:buSzPct val="80000"/>
+              <a:tabLst/>
+            </a:pPr>
+            <a:r>
+              <a:rPr kumimoji="0" lang="en-CN" sz="1800" b="0" i="0" u="none" strike="noStrike" kern="0" cap="none" spc="0" normalizeH="0" baseline="0" noProof="0" dirty="0">
+                <a:ln>
+                  <a:noFill/>
+                </a:ln>
+                <a:effectLst/>
+                <a:uLnTx/>
+                <a:uFillTx/>
+                <a:ea typeface="Arial Unicode MS" pitchFamily="34" charset="-128"/>
+                <a:cs typeface="Arial Unicode MS" pitchFamily="34" charset="-128"/>
+              </a:rPr>
+              <a:t>4</a:t>
+            </a:r>
+          </a:p>
+        </p:txBody>
+      </p:sp>
+      <p:sp>
+        <p:nvSpPr>
+          <p:cNvPr id="48" name="Rectangle 47">
+            <a:extLst>
+              <a:ext uri="{FF2B5EF4-FFF2-40B4-BE49-F238E27FC236}">
+                <a16:creationId xmlns:a16="http://schemas.microsoft.com/office/drawing/2014/main" id="{162A2C42-AE54-589F-7A88-4D6FCF373A49}"/>
+              </a:ext>
+            </a:extLst>
+          </p:cNvPr>
+          <p:cNvSpPr/>
+          <p:nvPr/>
+        </p:nvSpPr>
+        <p:spPr bwMode="gray">
+          <a:xfrm>
+            <a:off x="5360756" y="2370089"/>
+            <a:ext cx="360757" cy="300729"/>
+          </a:xfrm>
+          <a:prstGeom prst="rect">
+            <a:avLst/>
+          </a:prstGeom>
+          <a:solidFill>
+            <a:schemeClr val="accent4">
+              <a:lumMod val="40000"/>
+              <a:lumOff val="60000"/>
+            </a:schemeClr>
+          </a:solidFill>
+          <a:ln w="25400" algn="ctr">
+            <a:noFill/>
+            <a:miter lim="800000"/>
+            <a:headEnd/>
+            <a:tailEnd/>
+          </a:ln>
+        </p:spPr>
+        <p:txBody>
+          <a:bodyPr lIns="90000" tIns="72000" rIns="90000" bIns="72000" rtlCol="0" anchor="ctr"/>
+          <a:lstStyle/>
+          <a:p>
+            <a:pPr marR="0" algn="ctr" defTabSz="914400" eaLnBrk="1" fontAlgn="base" latinLnBrk="0" hangingPunct="1">
+              <a:lnSpc>
+                <a:spcPct val="100000"/>
+              </a:lnSpc>
+              <a:spcBef>
+                <a:spcPct val="50000"/>
+              </a:spcBef>
+              <a:spcAft>
+                <a:spcPct val="0"/>
+              </a:spcAft>
+              <a:buClr>
+                <a:srgbClr val="F0AB00"/>
+              </a:buClr>
+              <a:buSzPct val="80000"/>
+              <a:tabLst/>
+            </a:pPr>
+            <a:r>
+              <a:rPr lang="en-CN" sz="1800" kern="0" dirty="0">
+                <a:ea typeface="Arial Unicode MS" pitchFamily="34" charset="-128"/>
+                <a:cs typeface="Arial Unicode MS" pitchFamily="34" charset="-128"/>
+              </a:rPr>
+              <a:t>3</a:t>
+            </a:r>
+            <a:endParaRPr kumimoji="0" lang="en-CN" sz="1800" b="0" i="0" u="none" strike="noStrike" kern="0" cap="none" spc="0" normalizeH="0" baseline="0" noProof="0" dirty="0">
+              <a:ln>
+                <a:noFill/>
+              </a:ln>
+              <a:effectLst/>
+              <a:uLnTx/>
+              <a:uFillTx/>
+              <a:ea typeface="Arial Unicode MS" pitchFamily="34" charset="-128"/>
+              <a:cs typeface="Arial Unicode MS" pitchFamily="34" charset="-128"/>
+            </a:endParaRPr>
+          </a:p>
+        </p:txBody>
+      </p:sp>
+      <p:cxnSp>
+        <p:nvCxnSpPr>
+          <p:cNvPr id="49" name="Straight Arrow Connector 48">
+            <a:extLst>
+              <a:ext uri="{FF2B5EF4-FFF2-40B4-BE49-F238E27FC236}">
+                <a16:creationId xmlns:a16="http://schemas.microsoft.com/office/drawing/2014/main" id="{9078D0EB-F0DD-F867-476E-3051C570EF6E}"/>
+              </a:ext>
+            </a:extLst>
+          </p:cNvPr>
+          <p:cNvCxnSpPr>
+            <a:cxnSpLocks/>
+            <a:stCxn id="5" idx="2"/>
+            <a:endCxn id="47" idx="0"/>
+          </p:cNvCxnSpPr>
+          <p:nvPr/>
+        </p:nvCxnSpPr>
+        <p:spPr>
+          <a:xfrm flipH="1">
+            <a:off x="3292325" y="2175432"/>
+            <a:ext cx="1147709" cy="194658"/>
+          </a:xfrm>
+          <a:prstGeom prst="straightConnector1">
+            <a:avLst/>
+          </a:prstGeom>
+          <a:ln w="25400">
+            <a:solidFill>
+              <a:schemeClr val="accent4"/>
+            </a:solidFill>
+            <a:headEnd type="none" w="med" len="med"/>
+            <a:tailEnd type="triangle"/>
+          </a:ln>
+        </p:spPr>
+        <p:style>
+          <a:lnRef idx="1">
+            <a:schemeClr val="accent1"/>
+          </a:lnRef>
+          <a:fillRef idx="0">
+            <a:schemeClr val="accent1"/>
+          </a:fillRef>
+          <a:effectRef idx="0">
+            <a:schemeClr val="accent1"/>
+          </a:effectRef>
+          <a:fontRef idx="minor">
+            <a:schemeClr val="tx1"/>
+          </a:fontRef>
+        </p:style>
+      </p:cxnSp>
+      <p:cxnSp>
+        <p:nvCxnSpPr>
+          <p:cNvPr id="50" name="Straight Arrow Connector 49">
+            <a:extLst>
+              <a:ext uri="{FF2B5EF4-FFF2-40B4-BE49-F238E27FC236}">
+                <a16:creationId xmlns:a16="http://schemas.microsoft.com/office/drawing/2014/main" id="{17761E4A-CB93-19DB-8A37-411719F0F20D}"/>
+              </a:ext>
+            </a:extLst>
+          </p:cNvPr>
+          <p:cNvCxnSpPr>
+            <a:cxnSpLocks/>
+            <a:stCxn id="5" idx="2"/>
+            <a:endCxn id="48" idx="0"/>
+          </p:cNvCxnSpPr>
+          <p:nvPr/>
+        </p:nvCxnSpPr>
+        <p:spPr>
+          <a:xfrm>
+            <a:off x="4440034" y="2175432"/>
+            <a:ext cx="1101101" cy="194657"/>
+          </a:xfrm>
+          <a:prstGeom prst="straightConnector1">
+            <a:avLst/>
+          </a:prstGeom>
+          <a:ln w="25400">
+            <a:solidFill>
+              <a:schemeClr val="accent4"/>
+            </a:solidFill>
+            <a:headEnd type="none" w="med" len="med"/>
+            <a:tailEnd type="triangle"/>
+          </a:ln>
+        </p:spPr>
+        <p:style>
+          <a:lnRef idx="1">
+            <a:schemeClr val="accent1"/>
+          </a:lnRef>
+          <a:fillRef idx="0">
+            <a:schemeClr val="accent1"/>
+          </a:fillRef>
+          <a:effectRef idx="0">
+            <a:schemeClr val="accent1"/>
+          </a:effectRef>
+          <a:fontRef idx="minor">
+            <a:schemeClr val="tx1"/>
+          </a:fontRef>
+        </p:style>
+      </p:cxnSp>
+      <p:sp>
+        <p:nvSpPr>
+          <p:cNvPr id="59" name="Rectangle 58">
+            <a:extLst>
+              <a:ext uri="{FF2B5EF4-FFF2-40B4-BE49-F238E27FC236}">
+                <a16:creationId xmlns:a16="http://schemas.microsoft.com/office/drawing/2014/main" id="{E6A85B4B-827E-7200-3384-6538A2BCF01D}"/>
+              </a:ext>
+            </a:extLst>
+          </p:cNvPr>
+          <p:cNvSpPr/>
+          <p:nvPr/>
+        </p:nvSpPr>
+        <p:spPr bwMode="gray">
+          <a:xfrm>
+            <a:off x="3716339" y="2860731"/>
+            <a:ext cx="360757" cy="300729"/>
+          </a:xfrm>
+          <a:prstGeom prst="rect">
+            <a:avLst/>
+          </a:prstGeom>
+          <a:solidFill>
+            <a:schemeClr val="accent4">
+              <a:lumMod val="40000"/>
+              <a:lumOff val="60000"/>
+            </a:schemeClr>
+          </a:solidFill>
+          <a:ln w="25400" algn="ctr">
+            <a:noFill/>
+            <a:miter lim="800000"/>
+            <a:headEnd/>
+            <a:tailEnd/>
+          </a:ln>
+        </p:spPr>
+        <p:txBody>
+          <a:bodyPr lIns="90000" tIns="72000" rIns="90000" bIns="72000" rtlCol="0" anchor="ctr"/>
+          <a:lstStyle/>
+          <a:p>
+            <a:pPr marR="0" algn="ctr" defTabSz="914400" eaLnBrk="1" fontAlgn="base" latinLnBrk="0" hangingPunct="1">
+              <a:lnSpc>
+                <a:spcPct val="100000"/>
+              </a:lnSpc>
+              <a:spcBef>
+                <a:spcPct val="50000"/>
+              </a:spcBef>
+              <a:spcAft>
+                <a:spcPct val="0"/>
+              </a:spcAft>
+              <a:buClr>
+                <a:srgbClr val="F0AB00"/>
+              </a:buClr>
+              <a:buSzPct val="80000"/>
+              <a:tabLst/>
+            </a:pPr>
+            <a:r>
+              <a:rPr kumimoji="0" lang="en-CN" sz="1800" b="0" i="0" u="none" strike="noStrike" kern="0" cap="none" spc="0" normalizeH="0" baseline="0" noProof="0" dirty="0">
+                <a:ln>
+                  <a:noFill/>
+                </a:ln>
+                <a:effectLst/>
+                <a:uLnTx/>
+                <a:uFillTx/>
+                <a:ea typeface="Arial Unicode MS" pitchFamily="34" charset="-128"/>
+                <a:cs typeface="Arial Unicode MS" pitchFamily="34" charset="-128"/>
+              </a:rPr>
+              <a:t>2</a:t>
+            </a:r>
+          </a:p>
+        </p:txBody>
+      </p:sp>
+      <p:sp>
+        <p:nvSpPr>
+          <p:cNvPr id="60" name="Rectangle 59">
+            <a:extLst>
+              <a:ext uri="{FF2B5EF4-FFF2-40B4-BE49-F238E27FC236}">
+                <a16:creationId xmlns:a16="http://schemas.microsoft.com/office/drawing/2014/main" id="{F1F02B92-7882-959B-9EC1-9052BC2370F5}"/>
+              </a:ext>
+            </a:extLst>
+          </p:cNvPr>
+          <p:cNvSpPr/>
+          <p:nvPr/>
+        </p:nvSpPr>
+        <p:spPr bwMode="gray">
+          <a:xfrm>
+            <a:off x="2439509" y="2865478"/>
+            <a:ext cx="360757" cy="300729"/>
+          </a:xfrm>
+          <a:prstGeom prst="rect">
+            <a:avLst/>
+          </a:prstGeom>
+          <a:solidFill>
+            <a:schemeClr val="accent4">
+              <a:lumMod val="40000"/>
+              <a:lumOff val="60000"/>
+            </a:schemeClr>
+          </a:solidFill>
+          <a:ln w="25400" algn="ctr">
+            <a:noFill/>
+            <a:miter lim="800000"/>
+            <a:headEnd/>
+            <a:tailEnd/>
+          </a:ln>
+        </p:spPr>
+        <p:txBody>
+          <a:bodyPr lIns="90000" tIns="72000" rIns="90000" bIns="72000" rtlCol="0" anchor="ctr"/>
+          <a:lstStyle/>
+          <a:p>
+            <a:pPr marR="0" algn="ctr" defTabSz="914400" eaLnBrk="1" fontAlgn="base" latinLnBrk="0" hangingPunct="1">
+              <a:lnSpc>
+                <a:spcPct val="100000"/>
+              </a:lnSpc>
+              <a:spcBef>
+                <a:spcPct val="50000"/>
+              </a:spcBef>
+              <a:spcAft>
+                <a:spcPct val="0"/>
+              </a:spcAft>
+              <a:buClr>
+                <a:srgbClr val="F0AB00"/>
+              </a:buClr>
+              <a:buSzPct val="80000"/>
+              <a:tabLst/>
+            </a:pPr>
+            <a:r>
+              <a:rPr kumimoji="0" lang="en-CN" sz="1800" b="0" i="0" u="none" strike="noStrike" kern="0" cap="none" spc="0" normalizeH="0" baseline="0" noProof="0" dirty="0">
+                <a:ln>
+                  <a:noFill/>
+                </a:ln>
+                <a:effectLst/>
+                <a:uLnTx/>
+                <a:uFillTx/>
+                <a:ea typeface="Arial Unicode MS" pitchFamily="34" charset="-128"/>
+                <a:cs typeface="Arial Unicode MS" pitchFamily="34" charset="-128"/>
+              </a:rPr>
+              <a:t>3</a:t>
+            </a:r>
+          </a:p>
+        </p:txBody>
+      </p:sp>
+      <p:cxnSp>
+        <p:nvCxnSpPr>
+          <p:cNvPr id="61" name="Straight Arrow Connector 60">
+            <a:extLst>
+              <a:ext uri="{FF2B5EF4-FFF2-40B4-BE49-F238E27FC236}">
+                <a16:creationId xmlns:a16="http://schemas.microsoft.com/office/drawing/2014/main" id="{823F6AA7-2206-7477-448C-66633B2FB8C3}"/>
+              </a:ext>
+            </a:extLst>
+          </p:cNvPr>
+          <p:cNvCxnSpPr>
+            <a:cxnSpLocks/>
+            <a:stCxn id="47" idx="2"/>
+            <a:endCxn id="59" idx="0"/>
+          </p:cNvCxnSpPr>
+          <p:nvPr/>
+        </p:nvCxnSpPr>
+        <p:spPr>
+          <a:xfrm>
+            <a:off x="3292325" y="2670819"/>
+            <a:ext cx="604393" cy="189912"/>
+          </a:xfrm>
+          <a:prstGeom prst="straightConnector1">
+            <a:avLst/>
+          </a:prstGeom>
+          <a:ln w="25400">
+            <a:solidFill>
+              <a:schemeClr val="accent4"/>
+            </a:solidFill>
+            <a:headEnd type="none" w="med" len="med"/>
+            <a:tailEnd type="triangle"/>
+          </a:ln>
+        </p:spPr>
+        <p:style>
+          <a:lnRef idx="1">
+            <a:schemeClr val="accent1"/>
+          </a:lnRef>
+          <a:fillRef idx="0">
+            <a:schemeClr val="accent1"/>
+          </a:fillRef>
+          <a:effectRef idx="0">
+            <a:schemeClr val="accent1"/>
+          </a:effectRef>
+          <a:fontRef idx="minor">
+            <a:schemeClr val="tx1"/>
+          </a:fontRef>
+        </p:style>
+      </p:cxnSp>
+      <p:cxnSp>
+        <p:nvCxnSpPr>
+          <p:cNvPr id="62" name="Straight Arrow Connector 61">
+            <a:extLst>
+              <a:ext uri="{FF2B5EF4-FFF2-40B4-BE49-F238E27FC236}">
+                <a16:creationId xmlns:a16="http://schemas.microsoft.com/office/drawing/2014/main" id="{66D212CA-78F1-1952-722A-7AE4E941A4AB}"/>
+              </a:ext>
+            </a:extLst>
+          </p:cNvPr>
+          <p:cNvCxnSpPr>
+            <a:cxnSpLocks/>
+            <a:stCxn id="47" idx="2"/>
+            <a:endCxn id="60" idx="0"/>
+          </p:cNvCxnSpPr>
+          <p:nvPr/>
+        </p:nvCxnSpPr>
+        <p:spPr>
+          <a:xfrm flipH="1">
+            <a:off x="2619888" y="2670819"/>
+            <a:ext cx="672437" cy="194659"/>
+          </a:xfrm>
+          <a:prstGeom prst="straightConnector1">
+            <a:avLst/>
+          </a:prstGeom>
+          <a:ln w="25400">
+            <a:solidFill>
+              <a:schemeClr val="accent4"/>
+            </a:solidFill>
+            <a:headEnd type="none" w="med" len="med"/>
+            <a:tailEnd type="triangle"/>
+          </a:ln>
+        </p:spPr>
+        <p:style>
+          <a:lnRef idx="1">
+            <a:schemeClr val="accent1"/>
+          </a:lnRef>
+          <a:fillRef idx="0">
+            <a:schemeClr val="accent1"/>
+          </a:fillRef>
+          <a:effectRef idx="0">
+            <a:schemeClr val="accent1"/>
+          </a:effectRef>
+          <a:fontRef idx="minor">
+            <a:schemeClr val="tx1"/>
+          </a:fontRef>
+        </p:style>
+      </p:cxnSp>
+      <p:sp>
+        <p:nvSpPr>
+          <p:cNvPr id="75" name="Rectangle 74">
+            <a:extLst>
+              <a:ext uri="{FF2B5EF4-FFF2-40B4-BE49-F238E27FC236}">
+                <a16:creationId xmlns:a16="http://schemas.microsoft.com/office/drawing/2014/main" id="{D861DD9E-14FF-A0B7-1210-8D5BDA5A1252}"/>
+              </a:ext>
+            </a:extLst>
+          </p:cNvPr>
+          <p:cNvSpPr/>
+          <p:nvPr/>
+        </p:nvSpPr>
+        <p:spPr bwMode="gray">
+          <a:xfrm>
+            <a:off x="2076572" y="3374795"/>
+            <a:ext cx="360757" cy="300729"/>
+          </a:xfrm>
+          <a:prstGeom prst="rect">
+            <a:avLst/>
+          </a:prstGeom>
+          <a:solidFill>
+            <a:schemeClr val="accent4">
+              <a:lumMod val="40000"/>
+              <a:lumOff val="60000"/>
+            </a:schemeClr>
+          </a:solidFill>
+          <a:ln w="25400" algn="ctr">
+            <a:noFill/>
+            <a:miter lim="800000"/>
+            <a:headEnd/>
+            <a:tailEnd/>
+          </a:ln>
+        </p:spPr>
+        <p:txBody>
+          <a:bodyPr lIns="90000" tIns="72000" rIns="90000" bIns="72000" rtlCol="0" anchor="ctr"/>
+          <a:lstStyle/>
+          <a:p>
+            <a:pPr marR="0" algn="ctr" defTabSz="914400" eaLnBrk="1" fontAlgn="base" latinLnBrk="0" hangingPunct="1">
+              <a:lnSpc>
+                <a:spcPct val="100000"/>
+              </a:lnSpc>
+              <a:spcBef>
+                <a:spcPct val="50000"/>
+              </a:spcBef>
+              <a:spcAft>
+                <a:spcPct val="0"/>
+              </a:spcAft>
+              <a:buClr>
+                <a:srgbClr val="F0AB00"/>
+              </a:buClr>
+              <a:buSzPct val="80000"/>
+              <a:tabLst/>
+            </a:pPr>
+            <a:r>
+              <a:rPr kumimoji="0" lang="en-CN" sz="1800" b="0" i="0" u="none" strike="noStrike" kern="0" cap="none" spc="0" normalizeH="0" baseline="0" noProof="0" dirty="0">
+                <a:ln>
+                  <a:noFill/>
+                </a:ln>
+                <a:effectLst/>
+                <a:uLnTx/>
+                <a:uFillTx/>
+                <a:ea typeface="Arial Unicode MS" pitchFamily="34" charset="-128"/>
+                <a:cs typeface="Arial Unicode MS" pitchFamily="34" charset="-128"/>
+              </a:rPr>
+              <a:t>2</a:t>
+            </a:r>
+          </a:p>
+        </p:txBody>
+      </p:sp>
+      <p:sp>
+        <p:nvSpPr>
+          <p:cNvPr id="76" name="Rectangle 75">
+            <a:extLst>
+              <a:ext uri="{FF2B5EF4-FFF2-40B4-BE49-F238E27FC236}">
+                <a16:creationId xmlns:a16="http://schemas.microsoft.com/office/drawing/2014/main" id="{E172AA35-88DE-8B6C-1D37-0578F376CA19}"/>
+              </a:ext>
+            </a:extLst>
+          </p:cNvPr>
+          <p:cNvSpPr/>
+          <p:nvPr/>
+        </p:nvSpPr>
+        <p:spPr bwMode="gray">
+          <a:xfrm>
+            <a:off x="2776155" y="3379281"/>
+            <a:ext cx="360757" cy="300729"/>
+          </a:xfrm>
+          <a:prstGeom prst="rect">
+            <a:avLst/>
+          </a:prstGeom>
+          <a:solidFill>
+            <a:schemeClr val="accent4">
+              <a:lumMod val="40000"/>
+              <a:lumOff val="60000"/>
+            </a:schemeClr>
+          </a:solidFill>
+          <a:ln w="25400" algn="ctr">
+            <a:noFill/>
+            <a:miter lim="800000"/>
+            <a:headEnd/>
+            <a:tailEnd/>
+          </a:ln>
+        </p:spPr>
+        <p:txBody>
+          <a:bodyPr lIns="90000" tIns="72000" rIns="90000" bIns="72000" rtlCol="0" anchor="ctr"/>
+          <a:lstStyle/>
+          <a:p>
+            <a:pPr marR="0" algn="ctr" defTabSz="914400" eaLnBrk="1" fontAlgn="base" latinLnBrk="0" hangingPunct="1">
+              <a:lnSpc>
+                <a:spcPct val="100000"/>
+              </a:lnSpc>
+              <a:spcBef>
+                <a:spcPct val="50000"/>
+              </a:spcBef>
+              <a:spcAft>
+                <a:spcPct val="0"/>
+              </a:spcAft>
+              <a:buClr>
+                <a:srgbClr val="F0AB00"/>
+              </a:buClr>
+              <a:buSzPct val="80000"/>
+              <a:tabLst/>
+            </a:pPr>
+            <a:r>
+              <a:rPr kumimoji="0" lang="en-CN" sz="1800" b="0" i="0" u="none" strike="noStrike" kern="0" cap="none" spc="0" normalizeH="0" baseline="0" noProof="0" dirty="0">
+                <a:ln>
+                  <a:noFill/>
+                </a:ln>
+                <a:solidFill>
+                  <a:schemeClr val="accent5"/>
+                </a:solidFill>
+                <a:effectLst/>
+                <a:uLnTx/>
+                <a:uFillTx/>
+                <a:ea typeface="Arial Unicode MS" pitchFamily="34" charset="-128"/>
+                <a:cs typeface="Arial Unicode MS" pitchFamily="34" charset="-128"/>
+              </a:rPr>
+              <a:t>1</a:t>
+            </a:r>
+          </a:p>
+        </p:txBody>
+      </p:sp>
+      <p:cxnSp>
+        <p:nvCxnSpPr>
+          <p:cNvPr id="77" name="Straight Arrow Connector 76">
+            <a:extLst>
+              <a:ext uri="{FF2B5EF4-FFF2-40B4-BE49-F238E27FC236}">
+                <a16:creationId xmlns:a16="http://schemas.microsoft.com/office/drawing/2014/main" id="{4868D155-12E8-34B8-8637-9D24A8CFCD6B}"/>
+              </a:ext>
+            </a:extLst>
+          </p:cNvPr>
+          <p:cNvCxnSpPr>
+            <a:cxnSpLocks/>
+            <a:stCxn id="60" idx="2"/>
+            <a:endCxn id="75" idx="0"/>
+          </p:cNvCxnSpPr>
+          <p:nvPr/>
+        </p:nvCxnSpPr>
+        <p:spPr>
+          <a:xfrm flipH="1">
+            <a:off x="2256951" y="3166207"/>
+            <a:ext cx="362937" cy="208588"/>
+          </a:xfrm>
+          <a:prstGeom prst="straightConnector1">
+            <a:avLst/>
+          </a:prstGeom>
+          <a:ln w="25400">
+            <a:solidFill>
+              <a:schemeClr val="accent4"/>
+            </a:solidFill>
+            <a:headEnd type="none" w="med" len="med"/>
+            <a:tailEnd type="triangle"/>
+          </a:ln>
+        </p:spPr>
+        <p:style>
+          <a:lnRef idx="1">
+            <a:schemeClr val="accent1"/>
+          </a:lnRef>
+          <a:fillRef idx="0">
+            <a:schemeClr val="accent1"/>
+          </a:fillRef>
+          <a:effectRef idx="0">
+            <a:schemeClr val="accent1"/>
+          </a:effectRef>
+          <a:fontRef idx="minor">
+            <a:schemeClr val="tx1"/>
+          </a:fontRef>
+        </p:style>
+      </p:cxnSp>
+      <p:cxnSp>
+        <p:nvCxnSpPr>
+          <p:cNvPr id="78" name="Straight Arrow Connector 77">
+            <a:extLst>
+              <a:ext uri="{FF2B5EF4-FFF2-40B4-BE49-F238E27FC236}">
+                <a16:creationId xmlns:a16="http://schemas.microsoft.com/office/drawing/2014/main" id="{18407A42-F257-A7DA-C5FE-03335BF90F33}"/>
+              </a:ext>
+            </a:extLst>
+          </p:cNvPr>
+          <p:cNvCxnSpPr>
+            <a:cxnSpLocks/>
+            <a:stCxn id="60" idx="2"/>
+            <a:endCxn id="76" idx="0"/>
+          </p:cNvCxnSpPr>
+          <p:nvPr/>
+        </p:nvCxnSpPr>
+        <p:spPr>
+          <a:xfrm>
+            <a:off x="2619888" y="3166207"/>
+            <a:ext cx="336646" cy="213074"/>
+          </a:xfrm>
+          <a:prstGeom prst="straightConnector1">
+            <a:avLst/>
+          </a:prstGeom>
+          <a:ln w="25400">
+            <a:solidFill>
+              <a:schemeClr val="accent4"/>
+            </a:solidFill>
+            <a:headEnd type="none" w="med" len="med"/>
+            <a:tailEnd type="triangle"/>
+          </a:ln>
+        </p:spPr>
+        <p:style>
+          <a:lnRef idx="1">
+            <a:schemeClr val="accent1"/>
+          </a:lnRef>
+          <a:fillRef idx="0">
+            <a:schemeClr val="accent1"/>
+          </a:fillRef>
+          <a:effectRef idx="0">
+            <a:schemeClr val="accent1"/>
+          </a:effectRef>
+          <a:fontRef idx="minor">
+            <a:schemeClr val="tx1"/>
+          </a:fontRef>
+        </p:style>
+      </p:cxnSp>
+      <p:sp>
+        <p:nvSpPr>
+          <p:cNvPr id="83" name="Rectangle 82">
+            <a:extLst>
+              <a:ext uri="{FF2B5EF4-FFF2-40B4-BE49-F238E27FC236}">
+                <a16:creationId xmlns:a16="http://schemas.microsoft.com/office/drawing/2014/main" id="{EC4049CE-CC4B-BD6A-A031-574B79C0C4BD}"/>
+              </a:ext>
+            </a:extLst>
+          </p:cNvPr>
+          <p:cNvSpPr/>
+          <p:nvPr/>
+        </p:nvSpPr>
+        <p:spPr bwMode="gray">
+          <a:xfrm>
+            <a:off x="1715815" y="3884111"/>
+            <a:ext cx="360757" cy="300729"/>
+          </a:xfrm>
+          <a:prstGeom prst="rect">
+            <a:avLst/>
+          </a:prstGeom>
+          <a:solidFill>
+            <a:schemeClr val="accent4">
+              <a:lumMod val="40000"/>
+              <a:lumOff val="60000"/>
+            </a:schemeClr>
+          </a:solidFill>
+          <a:ln w="25400" algn="ctr">
+            <a:noFill/>
+            <a:miter lim="800000"/>
+            <a:headEnd/>
+            <a:tailEnd/>
+          </a:ln>
+        </p:spPr>
+        <p:txBody>
+          <a:bodyPr lIns="90000" tIns="72000" rIns="90000" bIns="72000" rtlCol="0" anchor="ctr"/>
+          <a:lstStyle/>
+          <a:p>
+            <a:pPr marR="0" algn="ctr" defTabSz="914400" eaLnBrk="1" fontAlgn="base" latinLnBrk="0" hangingPunct="1">
+              <a:lnSpc>
+                <a:spcPct val="100000"/>
+              </a:lnSpc>
+              <a:spcBef>
+                <a:spcPct val="50000"/>
+              </a:spcBef>
+              <a:spcAft>
+                <a:spcPct val="0"/>
+              </a:spcAft>
+              <a:buClr>
+                <a:srgbClr val="F0AB00"/>
+              </a:buClr>
+              <a:buSzPct val="80000"/>
+              <a:tabLst/>
+            </a:pPr>
+            <a:r>
+              <a:rPr kumimoji="0" lang="en-CN" sz="1800" b="0" i="0" u="none" strike="noStrike" kern="0" cap="none" spc="0" normalizeH="0" baseline="0" noProof="0" dirty="0">
+                <a:ln>
+                  <a:noFill/>
+                </a:ln>
+                <a:solidFill>
+                  <a:schemeClr val="accent5"/>
+                </a:solidFill>
+                <a:effectLst/>
+                <a:uLnTx/>
+                <a:uFillTx/>
+                <a:ea typeface="Arial Unicode MS" pitchFamily="34" charset="-128"/>
+                <a:cs typeface="Arial Unicode MS" pitchFamily="34" charset="-128"/>
+              </a:rPr>
+              <a:t>1</a:t>
+            </a:r>
+          </a:p>
+        </p:txBody>
+      </p:sp>
+      <p:sp>
+        <p:nvSpPr>
+          <p:cNvPr id="84" name="Rectangle 83">
+            <a:extLst>
+              <a:ext uri="{FF2B5EF4-FFF2-40B4-BE49-F238E27FC236}">
+                <a16:creationId xmlns:a16="http://schemas.microsoft.com/office/drawing/2014/main" id="{E4C13D00-4D26-5AB4-8FDF-6CD1C0D2F437}"/>
+              </a:ext>
+            </a:extLst>
+          </p:cNvPr>
+          <p:cNvSpPr/>
+          <p:nvPr/>
+        </p:nvSpPr>
+        <p:spPr bwMode="gray">
+          <a:xfrm>
+            <a:off x="2367155" y="3884112"/>
+            <a:ext cx="360757" cy="300729"/>
+          </a:xfrm>
+          <a:prstGeom prst="rect">
+            <a:avLst/>
+          </a:prstGeom>
+          <a:solidFill>
+            <a:schemeClr val="accent4">
+              <a:lumMod val="40000"/>
+              <a:lumOff val="60000"/>
+            </a:schemeClr>
+          </a:solidFill>
+          <a:ln w="25400" algn="ctr">
+            <a:noFill/>
+            <a:miter lim="800000"/>
+            <a:headEnd/>
+            <a:tailEnd/>
+          </a:ln>
+        </p:spPr>
+        <p:txBody>
+          <a:bodyPr lIns="90000" tIns="72000" rIns="90000" bIns="72000" rtlCol="0" anchor="ctr"/>
+          <a:lstStyle/>
+          <a:p>
+            <a:pPr marR="0" algn="ctr" defTabSz="914400" eaLnBrk="1" fontAlgn="base" latinLnBrk="0" hangingPunct="1">
+              <a:lnSpc>
+                <a:spcPct val="100000"/>
+              </a:lnSpc>
+              <a:spcBef>
+                <a:spcPct val="50000"/>
+              </a:spcBef>
+              <a:spcAft>
+                <a:spcPct val="0"/>
+              </a:spcAft>
+              <a:buClr>
+                <a:srgbClr val="F0AB00"/>
+              </a:buClr>
+              <a:buSzPct val="80000"/>
+              <a:tabLst/>
+            </a:pPr>
+            <a:r>
+              <a:rPr kumimoji="0" lang="en-CN" sz="1800" b="0" i="0" u="none" strike="noStrike" kern="0" cap="none" spc="0" normalizeH="0" baseline="0" noProof="0" dirty="0">
+                <a:ln>
+                  <a:noFill/>
+                </a:ln>
+                <a:solidFill>
+                  <a:schemeClr val="accent5"/>
+                </a:solidFill>
+                <a:effectLst/>
+                <a:uLnTx/>
+                <a:uFillTx/>
+                <a:ea typeface="Arial Unicode MS" pitchFamily="34" charset="-128"/>
+                <a:cs typeface="Arial Unicode MS" pitchFamily="34" charset="-128"/>
+              </a:rPr>
+              <a:t>0</a:t>
+            </a:r>
+          </a:p>
+        </p:txBody>
+      </p:sp>
+      <p:cxnSp>
+        <p:nvCxnSpPr>
+          <p:cNvPr id="85" name="Straight Arrow Connector 84">
+            <a:extLst>
+              <a:ext uri="{FF2B5EF4-FFF2-40B4-BE49-F238E27FC236}">
+                <a16:creationId xmlns:a16="http://schemas.microsoft.com/office/drawing/2014/main" id="{B9B94F48-9FE5-789F-735A-C143B0000C0B}"/>
+              </a:ext>
+            </a:extLst>
+          </p:cNvPr>
+          <p:cNvCxnSpPr>
+            <a:cxnSpLocks/>
+            <a:stCxn id="75" idx="2"/>
+            <a:endCxn id="83" idx="0"/>
+          </p:cNvCxnSpPr>
+          <p:nvPr/>
+        </p:nvCxnSpPr>
+        <p:spPr>
+          <a:xfrm flipH="1">
+            <a:off x="1896194" y="3675524"/>
+            <a:ext cx="360757" cy="208587"/>
+          </a:xfrm>
+          <a:prstGeom prst="straightConnector1">
+            <a:avLst/>
+          </a:prstGeom>
+          <a:ln w="25400">
+            <a:solidFill>
+              <a:schemeClr val="accent4"/>
+            </a:solidFill>
+            <a:headEnd type="none" w="med" len="med"/>
+            <a:tailEnd type="triangle"/>
+          </a:ln>
+        </p:spPr>
+        <p:style>
+          <a:lnRef idx="1">
+            <a:schemeClr val="accent1"/>
+          </a:lnRef>
+          <a:fillRef idx="0">
+            <a:schemeClr val="accent1"/>
+          </a:fillRef>
+          <a:effectRef idx="0">
+            <a:schemeClr val="accent1"/>
+          </a:effectRef>
+          <a:fontRef idx="minor">
+            <a:schemeClr val="tx1"/>
+          </a:fontRef>
+        </p:style>
+      </p:cxnSp>
+      <p:cxnSp>
+        <p:nvCxnSpPr>
+          <p:cNvPr id="86" name="Straight Arrow Connector 85">
+            <a:extLst>
+              <a:ext uri="{FF2B5EF4-FFF2-40B4-BE49-F238E27FC236}">
+                <a16:creationId xmlns:a16="http://schemas.microsoft.com/office/drawing/2014/main" id="{35BEC9A4-44C3-29B0-0243-1F38E588D800}"/>
+              </a:ext>
+            </a:extLst>
+          </p:cNvPr>
+          <p:cNvCxnSpPr>
+            <a:cxnSpLocks/>
+            <a:stCxn id="75" idx="2"/>
+            <a:endCxn id="84" idx="0"/>
+          </p:cNvCxnSpPr>
+          <p:nvPr/>
+        </p:nvCxnSpPr>
+        <p:spPr>
+          <a:xfrm>
+            <a:off x="2256951" y="3675524"/>
+            <a:ext cx="290583" cy="208588"/>
+          </a:xfrm>
+          <a:prstGeom prst="straightConnector1">
+            <a:avLst/>
+          </a:prstGeom>
+          <a:ln w="25400">
+            <a:solidFill>
+              <a:schemeClr val="accent4"/>
+            </a:solidFill>
+            <a:headEnd type="none" w="med" len="med"/>
+            <a:tailEnd type="triangle"/>
+          </a:ln>
+        </p:spPr>
+        <p:style>
+          <a:lnRef idx="1">
+            <a:schemeClr val="accent1"/>
+          </a:lnRef>
+          <a:fillRef idx="0">
+            <a:schemeClr val="accent1"/>
+          </a:fillRef>
+          <a:effectRef idx="0">
+            <a:schemeClr val="accent1"/>
+          </a:effectRef>
+          <a:fontRef idx="minor">
+            <a:schemeClr val="tx1"/>
+          </a:fontRef>
+        </p:style>
+      </p:cxnSp>
+      <p:sp>
+        <p:nvSpPr>
+          <p:cNvPr id="90" name="Rectangle 89">
+            <a:extLst>
+              <a:ext uri="{FF2B5EF4-FFF2-40B4-BE49-F238E27FC236}">
+                <a16:creationId xmlns:a16="http://schemas.microsoft.com/office/drawing/2014/main" id="{B993F78C-CA12-0EF1-5BA2-59B32A7735DF}"/>
+              </a:ext>
+            </a:extLst>
+          </p:cNvPr>
+          <p:cNvSpPr/>
+          <p:nvPr/>
+        </p:nvSpPr>
+        <p:spPr bwMode="gray">
+          <a:xfrm>
+            <a:off x="927715" y="1884782"/>
+            <a:ext cx="360757" cy="300729"/>
+          </a:xfrm>
+          <a:prstGeom prst="rect">
+            <a:avLst/>
+          </a:prstGeom>
+          <a:solidFill>
+            <a:schemeClr val="accent5">
+              <a:lumMod val="40000"/>
+              <a:lumOff val="60000"/>
+            </a:schemeClr>
+          </a:solidFill>
+          <a:ln w="25400" algn="ctr">
+            <a:noFill/>
+            <a:miter lim="800000"/>
+            <a:headEnd/>
+            <a:tailEnd/>
+          </a:ln>
+        </p:spPr>
+        <p:txBody>
+          <a:bodyPr lIns="90000" tIns="72000" rIns="90000" bIns="72000" rtlCol="0" anchor="ctr"/>
+          <a:lstStyle/>
+          <a:p>
+            <a:pPr marR="0" algn="ctr" defTabSz="914400" eaLnBrk="1" fontAlgn="base" latinLnBrk="0" hangingPunct="1">
+              <a:lnSpc>
+                <a:spcPct val="100000"/>
+              </a:lnSpc>
+              <a:spcBef>
+                <a:spcPct val="50000"/>
+              </a:spcBef>
+              <a:spcAft>
+                <a:spcPct val="0"/>
+              </a:spcAft>
+              <a:buClr>
+                <a:srgbClr val="F0AB00"/>
+              </a:buClr>
+              <a:buSzPct val="80000"/>
+              <a:tabLst/>
+            </a:pPr>
+            <a:r>
+              <a:rPr lang="en-CN" sz="1800" kern="0" dirty="0">
+                <a:ea typeface="Arial Unicode MS" pitchFamily="34" charset="-128"/>
+                <a:cs typeface="Arial Unicode MS" pitchFamily="34" charset="-128"/>
+              </a:rPr>
+              <a:t>1</a:t>
+            </a:r>
+            <a:endParaRPr kumimoji="0" lang="en-CN" sz="1800" b="0" i="0" u="none" strike="noStrike" kern="0" cap="none" spc="0" normalizeH="0" baseline="0" noProof="0" dirty="0">
+              <a:ln>
+                <a:noFill/>
+              </a:ln>
+              <a:effectLst/>
+              <a:uLnTx/>
+              <a:uFillTx/>
+              <a:ea typeface="Arial Unicode MS" pitchFamily="34" charset="-128"/>
+              <a:cs typeface="Arial Unicode MS" pitchFamily="34" charset="-128"/>
+            </a:endParaRPr>
+          </a:p>
+        </p:txBody>
+      </p:sp>
+      <p:sp>
+        <p:nvSpPr>
+          <p:cNvPr id="91" name="Rectangle 90">
+            <a:extLst>
+              <a:ext uri="{FF2B5EF4-FFF2-40B4-BE49-F238E27FC236}">
+                <a16:creationId xmlns:a16="http://schemas.microsoft.com/office/drawing/2014/main" id="{62440954-4406-918D-E6F4-E5B5840D513C}"/>
+              </a:ext>
+            </a:extLst>
+          </p:cNvPr>
+          <p:cNvSpPr/>
+          <p:nvPr/>
+        </p:nvSpPr>
+        <p:spPr bwMode="gray">
+          <a:xfrm>
+            <a:off x="922828" y="2380169"/>
+            <a:ext cx="360757" cy="300729"/>
+          </a:xfrm>
+          <a:prstGeom prst="rect">
+            <a:avLst/>
+          </a:prstGeom>
+          <a:solidFill>
+            <a:schemeClr val="accent5">
+              <a:lumMod val="40000"/>
+              <a:lumOff val="60000"/>
+            </a:schemeClr>
+          </a:solidFill>
+          <a:ln w="25400" algn="ctr">
+            <a:noFill/>
+            <a:miter lim="800000"/>
+            <a:headEnd/>
+            <a:tailEnd/>
+          </a:ln>
+        </p:spPr>
+        <p:txBody>
+          <a:bodyPr lIns="90000" tIns="72000" rIns="90000" bIns="72000" rtlCol="0" anchor="ctr"/>
+          <a:lstStyle/>
+          <a:p>
+            <a:pPr marR="0" algn="ctr" defTabSz="914400" eaLnBrk="1" fontAlgn="base" latinLnBrk="0" hangingPunct="1">
+              <a:lnSpc>
+                <a:spcPct val="100000"/>
+              </a:lnSpc>
+              <a:spcBef>
+                <a:spcPct val="50000"/>
+              </a:spcBef>
+              <a:spcAft>
+                <a:spcPct val="0"/>
+              </a:spcAft>
+              <a:buClr>
+                <a:srgbClr val="F0AB00"/>
+              </a:buClr>
+              <a:buSzPct val="80000"/>
+              <a:tabLst/>
+            </a:pPr>
+            <a:r>
+              <a:rPr lang="en-CN" sz="1800" kern="0" dirty="0">
+                <a:ea typeface="Arial Unicode MS" pitchFamily="34" charset="-128"/>
+                <a:cs typeface="Arial Unicode MS" pitchFamily="34" charset="-128"/>
+              </a:rPr>
+              <a:t>2</a:t>
+            </a:r>
+            <a:endParaRPr kumimoji="0" lang="en-CN" sz="1800" b="0" i="0" u="none" strike="noStrike" kern="0" cap="none" spc="0" normalizeH="0" baseline="0" noProof="0" dirty="0">
+              <a:ln>
+                <a:noFill/>
+              </a:ln>
+              <a:effectLst/>
+              <a:uLnTx/>
+              <a:uFillTx/>
+              <a:ea typeface="Arial Unicode MS" pitchFamily="34" charset="-128"/>
+              <a:cs typeface="Arial Unicode MS" pitchFamily="34" charset="-128"/>
+            </a:endParaRPr>
+          </a:p>
+        </p:txBody>
+      </p:sp>
+      <p:sp>
+        <p:nvSpPr>
+          <p:cNvPr id="92" name="Rectangle 91">
+            <a:extLst>
+              <a:ext uri="{FF2B5EF4-FFF2-40B4-BE49-F238E27FC236}">
+                <a16:creationId xmlns:a16="http://schemas.microsoft.com/office/drawing/2014/main" id="{CFDEA096-2C79-A28F-A482-07121308317D}"/>
+              </a:ext>
+            </a:extLst>
+          </p:cNvPr>
+          <p:cNvSpPr/>
+          <p:nvPr/>
+        </p:nvSpPr>
+        <p:spPr bwMode="gray">
+          <a:xfrm>
+            <a:off x="922827" y="2875556"/>
+            <a:ext cx="360757" cy="300729"/>
+          </a:xfrm>
+          <a:prstGeom prst="rect">
+            <a:avLst/>
+          </a:prstGeom>
+          <a:solidFill>
+            <a:schemeClr val="accent5">
+              <a:lumMod val="40000"/>
+              <a:lumOff val="60000"/>
+            </a:schemeClr>
+          </a:solidFill>
+          <a:ln w="25400" algn="ctr">
+            <a:noFill/>
+            <a:miter lim="800000"/>
+            <a:headEnd/>
+            <a:tailEnd/>
+          </a:ln>
+        </p:spPr>
+        <p:txBody>
+          <a:bodyPr lIns="90000" tIns="72000" rIns="90000" bIns="72000" rtlCol="0" anchor="ctr"/>
+          <a:lstStyle/>
+          <a:p>
+            <a:pPr marR="0" algn="ctr" defTabSz="914400" eaLnBrk="1" fontAlgn="base" latinLnBrk="0" hangingPunct="1">
+              <a:lnSpc>
+                <a:spcPct val="100000"/>
+              </a:lnSpc>
+              <a:spcBef>
+                <a:spcPct val="50000"/>
+              </a:spcBef>
+              <a:spcAft>
+                <a:spcPct val="0"/>
+              </a:spcAft>
+              <a:buClr>
+                <a:srgbClr val="F0AB00"/>
+              </a:buClr>
+              <a:buSzPct val="80000"/>
+              <a:tabLst/>
+            </a:pPr>
+            <a:r>
+              <a:rPr lang="en-CN" sz="1800" kern="0" dirty="0">
+                <a:ea typeface="Arial Unicode MS" pitchFamily="34" charset="-128"/>
+                <a:cs typeface="Arial Unicode MS" pitchFamily="34" charset="-128"/>
+              </a:rPr>
+              <a:t>3</a:t>
+            </a:r>
+            <a:endParaRPr kumimoji="0" lang="en-CN" sz="1800" b="0" i="0" u="none" strike="noStrike" kern="0" cap="none" spc="0" normalizeH="0" baseline="0" noProof="0" dirty="0">
+              <a:ln>
+                <a:noFill/>
+              </a:ln>
+              <a:effectLst/>
+              <a:uLnTx/>
+              <a:uFillTx/>
+              <a:ea typeface="Arial Unicode MS" pitchFamily="34" charset="-128"/>
+              <a:cs typeface="Arial Unicode MS" pitchFamily="34" charset="-128"/>
+            </a:endParaRPr>
+          </a:p>
+        </p:txBody>
+      </p:sp>
+      <p:sp>
+        <p:nvSpPr>
+          <p:cNvPr id="93" name="Rectangle 92">
+            <a:extLst>
+              <a:ext uri="{FF2B5EF4-FFF2-40B4-BE49-F238E27FC236}">
+                <a16:creationId xmlns:a16="http://schemas.microsoft.com/office/drawing/2014/main" id="{90794129-CDDD-5DE1-1D92-C00D79EF9515}"/>
+              </a:ext>
+            </a:extLst>
+          </p:cNvPr>
+          <p:cNvSpPr/>
+          <p:nvPr/>
+        </p:nvSpPr>
+        <p:spPr bwMode="gray">
+          <a:xfrm>
+            <a:off x="922827" y="3369485"/>
+            <a:ext cx="360757" cy="300729"/>
+          </a:xfrm>
+          <a:prstGeom prst="rect">
+            <a:avLst/>
+          </a:prstGeom>
+          <a:solidFill>
+            <a:schemeClr val="accent5">
+              <a:lumMod val="40000"/>
+              <a:lumOff val="60000"/>
+            </a:schemeClr>
+          </a:solidFill>
+          <a:ln w="25400" algn="ctr">
+            <a:noFill/>
+            <a:miter lim="800000"/>
+            <a:headEnd/>
+            <a:tailEnd/>
+          </a:ln>
+        </p:spPr>
+        <p:txBody>
+          <a:bodyPr lIns="90000" tIns="72000" rIns="90000" bIns="72000" rtlCol="0" anchor="ctr"/>
+          <a:lstStyle/>
+          <a:p>
+            <a:pPr marR="0" algn="ctr" defTabSz="914400" eaLnBrk="1" fontAlgn="base" latinLnBrk="0" hangingPunct="1">
+              <a:lnSpc>
+                <a:spcPct val="100000"/>
+              </a:lnSpc>
+              <a:spcBef>
+                <a:spcPct val="50000"/>
+              </a:spcBef>
+              <a:spcAft>
+                <a:spcPct val="0"/>
+              </a:spcAft>
+              <a:buClr>
+                <a:srgbClr val="F0AB00"/>
+              </a:buClr>
+              <a:buSzPct val="80000"/>
+              <a:tabLst/>
+            </a:pPr>
+            <a:r>
+              <a:rPr lang="en-CN" sz="1800" kern="0" dirty="0">
+                <a:ea typeface="Arial Unicode MS" pitchFamily="34" charset="-128"/>
+                <a:cs typeface="Arial Unicode MS" pitchFamily="34" charset="-128"/>
+              </a:rPr>
+              <a:t>4</a:t>
+            </a:r>
+            <a:endParaRPr kumimoji="0" lang="en-CN" sz="1800" b="0" i="0" u="none" strike="noStrike" kern="0" cap="none" spc="0" normalizeH="0" baseline="0" noProof="0" dirty="0">
+              <a:ln>
+                <a:noFill/>
+              </a:ln>
+              <a:effectLst/>
+              <a:uLnTx/>
+              <a:uFillTx/>
+              <a:ea typeface="Arial Unicode MS" pitchFamily="34" charset="-128"/>
+              <a:cs typeface="Arial Unicode MS" pitchFamily="34" charset="-128"/>
+            </a:endParaRPr>
+          </a:p>
+        </p:txBody>
+      </p:sp>
+      <p:sp>
+        <p:nvSpPr>
+          <p:cNvPr id="94" name="Rectangle 93">
+            <a:extLst>
+              <a:ext uri="{FF2B5EF4-FFF2-40B4-BE49-F238E27FC236}">
+                <a16:creationId xmlns:a16="http://schemas.microsoft.com/office/drawing/2014/main" id="{DC02C79D-290B-6C9F-4338-32A5769A9481}"/>
+              </a:ext>
+            </a:extLst>
+          </p:cNvPr>
+          <p:cNvSpPr/>
+          <p:nvPr/>
+        </p:nvSpPr>
+        <p:spPr bwMode="gray">
+          <a:xfrm>
+            <a:off x="3363353" y="3379281"/>
+            <a:ext cx="360757" cy="300729"/>
+          </a:xfrm>
+          <a:prstGeom prst="rect">
+            <a:avLst/>
+          </a:prstGeom>
+          <a:solidFill>
+            <a:schemeClr val="accent4">
+              <a:lumMod val="40000"/>
+              <a:lumOff val="60000"/>
+            </a:schemeClr>
+          </a:solidFill>
+          <a:ln w="25400" algn="ctr">
+            <a:noFill/>
+            <a:miter lim="800000"/>
+            <a:headEnd/>
+            <a:tailEnd/>
+          </a:ln>
+        </p:spPr>
+        <p:txBody>
+          <a:bodyPr lIns="90000" tIns="72000" rIns="90000" bIns="72000" rtlCol="0" anchor="ctr"/>
+          <a:lstStyle/>
+          <a:p>
+            <a:pPr marR="0" algn="ctr" defTabSz="914400" eaLnBrk="1" fontAlgn="base" latinLnBrk="0" hangingPunct="1">
+              <a:lnSpc>
+                <a:spcPct val="100000"/>
+              </a:lnSpc>
+              <a:spcBef>
+                <a:spcPct val="50000"/>
+              </a:spcBef>
+              <a:spcAft>
+                <a:spcPct val="0"/>
+              </a:spcAft>
+              <a:buClr>
+                <a:srgbClr val="F0AB00"/>
+              </a:buClr>
+              <a:buSzPct val="80000"/>
+              <a:tabLst/>
+            </a:pPr>
+            <a:r>
+              <a:rPr kumimoji="0" lang="en-CN" sz="1800" b="0" i="0" u="none" strike="noStrike" kern="0" cap="none" spc="0" normalizeH="0" baseline="0" noProof="0" dirty="0">
+                <a:ln>
+                  <a:noFill/>
+                </a:ln>
+                <a:solidFill>
+                  <a:schemeClr val="accent5"/>
+                </a:solidFill>
+                <a:effectLst/>
+                <a:uLnTx/>
+                <a:uFillTx/>
+                <a:ea typeface="Arial Unicode MS" pitchFamily="34" charset="-128"/>
+                <a:cs typeface="Arial Unicode MS" pitchFamily="34" charset="-128"/>
+              </a:rPr>
+              <a:t>1</a:t>
+            </a:r>
+          </a:p>
+        </p:txBody>
+      </p:sp>
+      <p:sp>
+        <p:nvSpPr>
+          <p:cNvPr id="95" name="Rectangle 94">
+            <a:extLst>
+              <a:ext uri="{FF2B5EF4-FFF2-40B4-BE49-F238E27FC236}">
+                <a16:creationId xmlns:a16="http://schemas.microsoft.com/office/drawing/2014/main" id="{ACC50C51-4AB5-7FC3-AA23-542D2A55C37B}"/>
+              </a:ext>
+            </a:extLst>
+          </p:cNvPr>
+          <p:cNvSpPr/>
+          <p:nvPr/>
+        </p:nvSpPr>
+        <p:spPr bwMode="gray">
+          <a:xfrm>
+            <a:off x="4024349" y="3379281"/>
+            <a:ext cx="360757" cy="300729"/>
+          </a:xfrm>
+          <a:prstGeom prst="rect">
+            <a:avLst/>
+          </a:prstGeom>
+          <a:solidFill>
+            <a:schemeClr val="accent4">
+              <a:lumMod val="40000"/>
+              <a:lumOff val="60000"/>
+            </a:schemeClr>
+          </a:solidFill>
+          <a:ln w="25400" algn="ctr">
+            <a:noFill/>
+            <a:miter lim="800000"/>
+            <a:headEnd/>
+            <a:tailEnd/>
+          </a:ln>
+        </p:spPr>
+        <p:txBody>
+          <a:bodyPr lIns="90000" tIns="72000" rIns="90000" bIns="72000" rtlCol="0" anchor="ctr"/>
+          <a:lstStyle/>
+          <a:p>
+            <a:pPr marR="0" algn="ctr" defTabSz="914400" eaLnBrk="1" fontAlgn="base" latinLnBrk="0" hangingPunct="1">
+              <a:lnSpc>
+                <a:spcPct val="100000"/>
+              </a:lnSpc>
+              <a:spcBef>
+                <a:spcPct val="50000"/>
+              </a:spcBef>
+              <a:spcAft>
+                <a:spcPct val="0"/>
+              </a:spcAft>
+              <a:buClr>
+                <a:srgbClr val="F0AB00"/>
+              </a:buClr>
+              <a:buSzPct val="80000"/>
+              <a:tabLst/>
+            </a:pPr>
+            <a:r>
+              <a:rPr kumimoji="0" lang="en-CN" sz="1800" b="0" i="0" u="none" strike="noStrike" kern="0" cap="none" spc="0" normalizeH="0" baseline="0" noProof="0" dirty="0">
+                <a:ln>
+                  <a:noFill/>
+                </a:ln>
+                <a:solidFill>
+                  <a:schemeClr val="accent5"/>
+                </a:solidFill>
+                <a:effectLst/>
+                <a:uLnTx/>
+                <a:uFillTx/>
+                <a:ea typeface="Arial Unicode MS" pitchFamily="34" charset="-128"/>
+                <a:cs typeface="Arial Unicode MS" pitchFamily="34" charset="-128"/>
+              </a:rPr>
+              <a:t>0</a:t>
+            </a:r>
+          </a:p>
+        </p:txBody>
+      </p:sp>
+      <p:cxnSp>
+        <p:nvCxnSpPr>
+          <p:cNvPr id="96" name="Straight Arrow Connector 95">
+            <a:extLst>
+              <a:ext uri="{FF2B5EF4-FFF2-40B4-BE49-F238E27FC236}">
+                <a16:creationId xmlns:a16="http://schemas.microsoft.com/office/drawing/2014/main" id="{A48CB377-3425-ED3F-5C71-33F9C9E125EF}"/>
+              </a:ext>
+            </a:extLst>
+          </p:cNvPr>
+          <p:cNvCxnSpPr>
+            <a:cxnSpLocks/>
+            <a:stCxn id="59" idx="2"/>
+            <a:endCxn id="94" idx="0"/>
+          </p:cNvCxnSpPr>
+          <p:nvPr/>
+        </p:nvCxnSpPr>
+        <p:spPr>
+          <a:xfrm flipH="1">
+            <a:off x="3543732" y="3161460"/>
+            <a:ext cx="352986" cy="217821"/>
+          </a:xfrm>
+          <a:prstGeom prst="straightConnector1">
+            <a:avLst/>
+          </a:prstGeom>
+          <a:ln w="25400">
+            <a:solidFill>
+              <a:schemeClr val="accent4"/>
+            </a:solidFill>
+            <a:headEnd type="none" w="med" len="med"/>
+            <a:tailEnd type="triangle"/>
+          </a:ln>
+        </p:spPr>
+        <p:style>
+          <a:lnRef idx="1">
+            <a:schemeClr val="accent1"/>
+          </a:lnRef>
+          <a:fillRef idx="0">
+            <a:schemeClr val="accent1"/>
+          </a:fillRef>
+          <a:effectRef idx="0">
+            <a:schemeClr val="accent1"/>
+          </a:effectRef>
+          <a:fontRef idx="minor">
+            <a:schemeClr val="tx1"/>
+          </a:fontRef>
+        </p:style>
+      </p:cxnSp>
+      <p:cxnSp>
+        <p:nvCxnSpPr>
+          <p:cNvPr id="97" name="Straight Arrow Connector 96">
+            <a:extLst>
+              <a:ext uri="{FF2B5EF4-FFF2-40B4-BE49-F238E27FC236}">
+                <a16:creationId xmlns:a16="http://schemas.microsoft.com/office/drawing/2014/main" id="{370EA934-0BE4-F5D6-65A3-CA8867AA8F78}"/>
+              </a:ext>
+            </a:extLst>
+          </p:cNvPr>
+          <p:cNvCxnSpPr>
+            <a:cxnSpLocks/>
+            <a:stCxn id="59" idx="2"/>
+            <a:endCxn id="95" idx="0"/>
+          </p:cNvCxnSpPr>
+          <p:nvPr/>
+        </p:nvCxnSpPr>
+        <p:spPr>
+          <a:xfrm>
+            <a:off x="3896718" y="3161460"/>
+            <a:ext cx="308010" cy="217821"/>
+          </a:xfrm>
+          <a:prstGeom prst="straightConnector1">
+            <a:avLst/>
+          </a:prstGeom>
+          <a:ln w="25400">
+            <a:solidFill>
+              <a:schemeClr val="accent4"/>
+            </a:solidFill>
+            <a:headEnd type="none" w="med" len="med"/>
+            <a:tailEnd type="triangle"/>
+          </a:ln>
+        </p:spPr>
+        <p:style>
+          <a:lnRef idx="1">
+            <a:schemeClr val="accent1"/>
+          </a:lnRef>
+          <a:fillRef idx="0">
+            <a:schemeClr val="accent1"/>
+          </a:fillRef>
+          <a:effectRef idx="0">
+            <a:schemeClr val="accent1"/>
+          </a:effectRef>
+          <a:fontRef idx="minor">
+            <a:schemeClr val="tx1"/>
+          </a:fontRef>
+        </p:style>
+      </p:cxnSp>
+      <p:sp>
+        <p:nvSpPr>
+          <p:cNvPr id="103" name="Rectangle 102">
+            <a:extLst>
+              <a:ext uri="{FF2B5EF4-FFF2-40B4-BE49-F238E27FC236}">
+                <a16:creationId xmlns:a16="http://schemas.microsoft.com/office/drawing/2014/main" id="{D113350E-E222-1AFC-1AE0-57F2375C15E6}"/>
+              </a:ext>
+            </a:extLst>
+          </p:cNvPr>
+          <p:cNvSpPr/>
+          <p:nvPr/>
+        </p:nvSpPr>
+        <p:spPr bwMode="gray">
+          <a:xfrm>
+            <a:off x="4929087" y="2859673"/>
+            <a:ext cx="360757" cy="300729"/>
+          </a:xfrm>
+          <a:prstGeom prst="rect">
+            <a:avLst/>
+          </a:prstGeom>
+          <a:solidFill>
+            <a:schemeClr val="accent4">
+              <a:lumMod val="40000"/>
+              <a:lumOff val="60000"/>
+            </a:schemeClr>
+          </a:solidFill>
+          <a:ln w="25400" algn="ctr">
+            <a:noFill/>
+            <a:miter lim="800000"/>
+            <a:headEnd/>
+            <a:tailEnd/>
+          </a:ln>
+        </p:spPr>
+        <p:txBody>
+          <a:bodyPr lIns="90000" tIns="72000" rIns="90000" bIns="72000" rtlCol="0" anchor="ctr"/>
+          <a:lstStyle/>
+          <a:p>
+            <a:pPr marR="0" algn="ctr" defTabSz="914400" eaLnBrk="1" fontAlgn="base" latinLnBrk="0" hangingPunct="1">
+              <a:lnSpc>
+                <a:spcPct val="100000"/>
+              </a:lnSpc>
+              <a:spcBef>
+                <a:spcPct val="50000"/>
+              </a:spcBef>
+              <a:spcAft>
+                <a:spcPct val="0"/>
+              </a:spcAft>
+              <a:buClr>
+                <a:srgbClr val="F0AB00"/>
+              </a:buClr>
+              <a:buSzPct val="80000"/>
+              <a:tabLst/>
+            </a:pPr>
+            <a:r>
+              <a:rPr kumimoji="0" lang="en-CN" sz="1800" b="0" i="0" u="none" strike="noStrike" kern="0" cap="none" spc="0" normalizeH="0" baseline="0" noProof="0" dirty="0">
+                <a:ln>
+                  <a:noFill/>
+                </a:ln>
+                <a:effectLst/>
+                <a:uLnTx/>
+                <a:uFillTx/>
+                <a:ea typeface="Arial Unicode MS" pitchFamily="34" charset="-128"/>
+                <a:cs typeface="Arial Unicode MS" pitchFamily="34" charset="-128"/>
+              </a:rPr>
+              <a:t>2</a:t>
+            </a:r>
+          </a:p>
+        </p:txBody>
+      </p:sp>
+      <p:sp>
+        <p:nvSpPr>
+          <p:cNvPr id="104" name="Rectangle 103">
+            <a:extLst>
+              <a:ext uri="{FF2B5EF4-FFF2-40B4-BE49-F238E27FC236}">
+                <a16:creationId xmlns:a16="http://schemas.microsoft.com/office/drawing/2014/main" id="{4319DCD0-D1A0-3DD7-B9EC-7ADB0AFC3750}"/>
+              </a:ext>
+            </a:extLst>
+          </p:cNvPr>
+          <p:cNvSpPr/>
+          <p:nvPr/>
+        </p:nvSpPr>
+        <p:spPr bwMode="gray">
+          <a:xfrm>
+            <a:off x="5801458" y="2859672"/>
+            <a:ext cx="360757" cy="300729"/>
+          </a:xfrm>
+          <a:prstGeom prst="rect">
+            <a:avLst/>
+          </a:prstGeom>
+          <a:solidFill>
+            <a:schemeClr val="accent4">
+              <a:lumMod val="40000"/>
+              <a:lumOff val="60000"/>
+            </a:schemeClr>
+          </a:solidFill>
+          <a:ln w="25400" algn="ctr">
+            <a:noFill/>
+            <a:miter lim="800000"/>
+            <a:headEnd/>
+            <a:tailEnd/>
+          </a:ln>
+        </p:spPr>
+        <p:txBody>
+          <a:bodyPr lIns="90000" tIns="72000" rIns="90000" bIns="72000" rtlCol="0" anchor="ctr"/>
+          <a:lstStyle/>
+          <a:p>
+            <a:pPr marR="0" algn="ctr" defTabSz="914400" eaLnBrk="1" fontAlgn="base" latinLnBrk="0" hangingPunct="1">
+              <a:lnSpc>
+                <a:spcPct val="100000"/>
+              </a:lnSpc>
+              <a:spcBef>
+                <a:spcPct val="50000"/>
+              </a:spcBef>
+              <a:spcAft>
+                <a:spcPct val="0"/>
+              </a:spcAft>
+              <a:buClr>
+                <a:srgbClr val="F0AB00"/>
+              </a:buClr>
+              <a:buSzPct val="80000"/>
+              <a:tabLst/>
+            </a:pPr>
+            <a:r>
+              <a:rPr kumimoji="0" lang="en-CN" sz="1800" b="0" i="0" u="none" strike="noStrike" kern="0" cap="none" spc="0" normalizeH="0" baseline="0" noProof="0" dirty="0">
+                <a:ln>
+                  <a:noFill/>
+                </a:ln>
+                <a:solidFill>
+                  <a:schemeClr val="accent5"/>
+                </a:solidFill>
+                <a:effectLst/>
+                <a:uLnTx/>
+                <a:uFillTx/>
+                <a:ea typeface="Arial Unicode MS" pitchFamily="34" charset="-128"/>
+                <a:cs typeface="Arial Unicode MS" pitchFamily="34" charset="-128"/>
+              </a:rPr>
+              <a:t>1</a:t>
+            </a:r>
+          </a:p>
+        </p:txBody>
+      </p:sp>
+      <p:cxnSp>
+        <p:nvCxnSpPr>
+          <p:cNvPr id="105" name="Straight Arrow Connector 104">
+            <a:extLst>
+              <a:ext uri="{FF2B5EF4-FFF2-40B4-BE49-F238E27FC236}">
+                <a16:creationId xmlns:a16="http://schemas.microsoft.com/office/drawing/2014/main" id="{CEA15C64-B054-9B02-2F5D-BDA2B132491C}"/>
+              </a:ext>
+            </a:extLst>
+          </p:cNvPr>
+          <p:cNvCxnSpPr>
+            <a:cxnSpLocks/>
+            <a:stCxn id="48" idx="2"/>
+            <a:endCxn id="103" idx="0"/>
+          </p:cNvCxnSpPr>
+          <p:nvPr/>
+        </p:nvCxnSpPr>
+        <p:spPr>
+          <a:xfrm flipH="1">
+            <a:off x="5109466" y="2670818"/>
+            <a:ext cx="431669" cy="188855"/>
+          </a:xfrm>
+          <a:prstGeom prst="straightConnector1">
+            <a:avLst/>
+          </a:prstGeom>
+          <a:ln w="25400">
+            <a:solidFill>
+              <a:schemeClr val="accent4"/>
+            </a:solidFill>
+            <a:headEnd type="none" w="med" len="med"/>
+            <a:tailEnd type="triangle"/>
+          </a:ln>
+        </p:spPr>
+        <p:style>
+          <a:lnRef idx="1">
+            <a:schemeClr val="accent1"/>
+          </a:lnRef>
+          <a:fillRef idx="0">
+            <a:schemeClr val="accent1"/>
+          </a:fillRef>
+          <a:effectRef idx="0">
+            <a:schemeClr val="accent1"/>
+          </a:effectRef>
+          <a:fontRef idx="minor">
+            <a:schemeClr val="tx1"/>
+          </a:fontRef>
+        </p:style>
+      </p:cxnSp>
+      <p:cxnSp>
+        <p:nvCxnSpPr>
+          <p:cNvPr id="106" name="Straight Arrow Connector 105">
+            <a:extLst>
+              <a:ext uri="{FF2B5EF4-FFF2-40B4-BE49-F238E27FC236}">
+                <a16:creationId xmlns:a16="http://schemas.microsoft.com/office/drawing/2014/main" id="{285199F1-3197-64FF-2853-1913B174A765}"/>
+              </a:ext>
+            </a:extLst>
+          </p:cNvPr>
+          <p:cNvCxnSpPr>
+            <a:cxnSpLocks/>
+            <a:stCxn id="48" idx="2"/>
+            <a:endCxn id="104" idx="0"/>
+          </p:cNvCxnSpPr>
+          <p:nvPr/>
+        </p:nvCxnSpPr>
+        <p:spPr>
+          <a:xfrm>
+            <a:off x="5541135" y="2670818"/>
+            <a:ext cx="440702" cy="188854"/>
+          </a:xfrm>
+          <a:prstGeom prst="straightConnector1">
+            <a:avLst/>
+          </a:prstGeom>
+          <a:ln w="25400">
+            <a:solidFill>
+              <a:schemeClr val="accent4"/>
+            </a:solidFill>
+            <a:headEnd type="none" w="med" len="med"/>
+            <a:tailEnd type="triangle"/>
+          </a:ln>
+        </p:spPr>
+        <p:style>
+          <a:lnRef idx="1">
+            <a:schemeClr val="accent1"/>
+          </a:lnRef>
+          <a:fillRef idx="0">
+            <a:schemeClr val="accent1"/>
+          </a:fillRef>
+          <a:effectRef idx="0">
+            <a:schemeClr val="accent1"/>
+          </a:effectRef>
+          <a:fontRef idx="minor">
+            <a:schemeClr val="tx1"/>
+          </a:fontRef>
+        </p:style>
+      </p:cxnSp>
+      <p:sp>
+        <p:nvSpPr>
+          <p:cNvPr id="112" name="Rectangle 111">
+            <a:extLst>
+              <a:ext uri="{FF2B5EF4-FFF2-40B4-BE49-F238E27FC236}">
+                <a16:creationId xmlns:a16="http://schemas.microsoft.com/office/drawing/2014/main" id="{ACE2CE32-EA43-11D0-73E1-674F399680E5}"/>
+              </a:ext>
+            </a:extLst>
+          </p:cNvPr>
+          <p:cNvSpPr/>
+          <p:nvPr/>
+        </p:nvSpPr>
+        <p:spPr bwMode="gray">
+          <a:xfrm>
+            <a:off x="4596884" y="3379281"/>
+            <a:ext cx="360757" cy="300729"/>
+          </a:xfrm>
+          <a:prstGeom prst="rect">
+            <a:avLst/>
+          </a:prstGeom>
+          <a:solidFill>
+            <a:schemeClr val="accent4">
+              <a:lumMod val="40000"/>
+              <a:lumOff val="60000"/>
+            </a:schemeClr>
+          </a:solidFill>
+          <a:ln w="25400" algn="ctr">
+            <a:noFill/>
+            <a:miter lim="800000"/>
+            <a:headEnd/>
+            <a:tailEnd/>
+          </a:ln>
+        </p:spPr>
+        <p:txBody>
+          <a:bodyPr lIns="90000" tIns="72000" rIns="90000" bIns="72000" rtlCol="0" anchor="ctr"/>
+          <a:lstStyle/>
+          <a:p>
+            <a:pPr marR="0" algn="ctr" defTabSz="914400" eaLnBrk="1" fontAlgn="base" latinLnBrk="0" hangingPunct="1">
+              <a:lnSpc>
+                <a:spcPct val="100000"/>
+              </a:lnSpc>
+              <a:spcBef>
+                <a:spcPct val="50000"/>
+              </a:spcBef>
+              <a:spcAft>
+                <a:spcPct val="0"/>
+              </a:spcAft>
+              <a:buClr>
+                <a:srgbClr val="F0AB00"/>
+              </a:buClr>
+              <a:buSzPct val="80000"/>
+              <a:tabLst/>
+            </a:pPr>
+            <a:r>
+              <a:rPr kumimoji="0" lang="en-CN" sz="1800" b="0" i="0" u="none" strike="noStrike" kern="0" cap="none" spc="0" normalizeH="0" baseline="0" noProof="0" dirty="0">
+                <a:ln>
+                  <a:noFill/>
+                </a:ln>
+                <a:solidFill>
+                  <a:schemeClr val="accent5"/>
+                </a:solidFill>
+                <a:effectLst/>
+                <a:uLnTx/>
+                <a:uFillTx/>
+                <a:ea typeface="Arial Unicode MS" pitchFamily="34" charset="-128"/>
+                <a:cs typeface="Arial Unicode MS" pitchFamily="34" charset="-128"/>
+              </a:rPr>
+              <a:t>1</a:t>
+            </a:r>
+          </a:p>
+        </p:txBody>
+      </p:sp>
+      <p:sp>
+        <p:nvSpPr>
+          <p:cNvPr id="113" name="Rectangle 112">
+            <a:extLst>
+              <a:ext uri="{FF2B5EF4-FFF2-40B4-BE49-F238E27FC236}">
+                <a16:creationId xmlns:a16="http://schemas.microsoft.com/office/drawing/2014/main" id="{37AB3578-E6A5-1208-7074-44F57A60EAB5}"/>
+              </a:ext>
+            </a:extLst>
+          </p:cNvPr>
+          <p:cNvSpPr/>
+          <p:nvPr/>
+        </p:nvSpPr>
+        <p:spPr bwMode="gray">
+          <a:xfrm>
+            <a:off x="5292644" y="3379281"/>
+            <a:ext cx="360757" cy="300729"/>
+          </a:xfrm>
+          <a:prstGeom prst="rect">
+            <a:avLst/>
+          </a:prstGeom>
+          <a:solidFill>
+            <a:schemeClr val="accent4">
+              <a:lumMod val="40000"/>
+              <a:lumOff val="60000"/>
+            </a:schemeClr>
+          </a:solidFill>
+          <a:ln w="25400" algn="ctr">
+            <a:noFill/>
+            <a:miter lim="800000"/>
+            <a:headEnd/>
+            <a:tailEnd/>
+          </a:ln>
+        </p:spPr>
+        <p:txBody>
+          <a:bodyPr lIns="90000" tIns="72000" rIns="90000" bIns="72000" rtlCol="0" anchor="ctr"/>
+          <a:lstStyle/>
+          <a:p>
+            <a:pPr marR="0" algn="ctr" defTabSz="914400" eaLnBrk="1" fontAlgn="base" latinLnBrk="0" hangingPunct="1">
+              <a:lnSpc>
+                <a:spcPct val="100000"/>
+              </a:lnSpc>
+              <a:spcBef>
+                <a:spcPct val="50000"/>
+              </a:spcBef>
+              <a:spcAft>
+                <a:spcPct val="0"/>
+              </a:spcAft>
+              <a:buClr>
+                <a:srgbClr val="F0AB00"/>
+              </a:buClr>
+              <a:buSzPct val="80000"/>
+              <a:tabLst/>
+            </a:pPr>
+            <a:r>
+              <a:rPr kumimoji="0" lang="en-CN" sz="1800" b="0" i="0" u="none" strike="noStrike" kern="0" cap="none" spc="0" normalizeH="0" baseline="0" noProof="0" dirty="0">
+                <a:ln>
+                  <a:noFill/>
+                </a:ln>
+                <a:solidFill>
+                  <a:schemeClr val="accent5"/>
+                </a:solidFill>
+                <a:effectLst/>
+                <a:uLnTx/>
+                <a:uFillTx/>
+                <a:ea typeface="Arial Unicode MS" pitchFamily="34" charset="-128"/>
+                <a:cs typeface="Arial Unicode MS" pitchFamily="34" charset="-128"/>
+              </a:rPr>
+              <a:t>0</a:t>
+            </a:r>
+          </a:p>
+        </p:txBody>
+      </p:sp>
+      <p:cxnSp>
+        <p:nvCxnSpPr>
+          <p:cNvPr id="114" name="Straight Arrow Connector 113">
+            <a:extLst>
+              <a:ext uri="{FF2B5EF4-FFF2-40B4-BE49-F238E27FC236}">
+                <a16:creationId xmlns:a16="http://schemas.microsoft.com/office/drawing/2014/main" id="{12E71418-AFB1-C553-EFE6-5C95EF684784}"/>
+              </a:ext>
+            </a:extLst>
+          </p:cNvPr>
+          <p:cNvCxnSpPr>
+            <a:cxnSpLocks/>
+            <a:stCxn id="103" idx="2"/>
+            <a:endCxn id="112" idx="0"/>
+          </p:cNvCxnSpPr>
+          <p:nvPr/>
+        </p:nvCxnSpPr>
+        <p:spPr>
+          <a:xfrm flipH="1">
+            <a:off x="4777263" y="3160402"/>
+            <a:ext cx="332203" cy="218879"/>
+          </a:xfrm>
+          <a:prstGeom prst="straightConnector1">
+            <a:avLst/>
+          </a:prstGeom>
+          <a:ln w="25400">
+            <a:solidFill>
+              <a:schemeClr val="accent4"/>
+            </a:solidFill>
+            <a:headEnd type="none" w="med" len="med"/>
+            <a:tailEnd type="triangle"/>
+          </a:ln>
+        </p:spPr>
+        <p:style>
+          <a:lnRef idx="1">
+            <a:schemeClr val="accent1"/>
+          </a:lnRef>
+          <a:fillRef idx="0">
+            <a:schemeClr val="accent1"/>
+          </a:fillRef>
+          <a:effectRef idx="0">
+            <a:schemeClr val="accent1"/>
+          </a:effectRef>
+          <a:fontRef idx="minor">
+            <a:schemeClr val="tx1"/>
+          </a:fontRef>
+        </p:style>
+      </p:cxnSp>
+      <p:cxnSp>
+        <p:nvCxnSpPr>
+          <p:cNvPr id="115" name="Straight Arrow Connector 114">
+            <a:extLst>
+              <a:ext uri="{FF2B5EF4-FFF2-40B4-BE49-F238E27FC236}">
+                <a16:creationId xmlns:a16="http://schemas.microsoft.com/office/drawing/2014/main" id="{5CD8B721-381B-BF7B-BD7F-F2B0E1F0FC4A}"/>
+              </a:ext>
+            </a:extLst>
+          </p:cNvPr>
+          <p:cNvCxnSpPr>
+            <a:cxnSpLocks/>
+            <a:stCxn id="103" idx="2"/>
+            <a:endCxn id="113" idx="0"/>
+          </p:cNvCxnSpPr>
+          <p:nvPr/>
+        </p:nvCxnSpPr>
+        <p:spPr>
+          <a:xfrm>
+            <a:off x="5109466" y="3160402"/>
+            <a:ext cx="363557" cy="218879"/>
+          </a:xfrm>
+          <a:prstGeom prst="straightConnector1">
+            <a:avLst/>
+          </a:prstGeom>
+          <a:ln w="25400">
+            <a:solidFill>
+              <a:schemeClr val="accent4"/>
+            </a:solidFill>
+            <a:headEnd type="none" w="med" len="med"/>
+            <a:tailEnd type="triangle"/>
+          </a:ln>
+        </p:spPr>
+        <p:style>
+          <a:lnRef idx="1">
+            <a:schemeClr val="accent1"/>
+          </a:lnRef>
+          <a:fillRef idx="0">
+            <a:schemeClr val="accent1"/>
+          </a:fillRef>
+          <a:effectRef idx="0">
+            <a:schemeClr val="accent1"/>
+          </a:effectRef>
+          <a:fontRef idx="minor">
+            <a:schemeClr val="tx1"/>
+          </a:fontRef>
+        </p:style>
+      </p:cxnSp>
+    </p:spTree>
+    <p:extLst>
+      <p:ext uri="{BB962C8B-B14F-4D97-AF65-F5344CB8AC3E}">
+        <p14:creationId xmlns:p14="http://schemas.microsoft.com/office/powerpoint/2010/main" val="2326496402"/>
+      </p:ext>
+    </p:extLst>
+  </p:cSld>
+  <p:clrMapOvr>
+    <a:masterClrMapping/>
+  </p:clrMapOvr>
+</p:sld>
+</file>
+
 <file path=ppt/tags/tag1.xml><?xml version="1.0" encoding="utf-8"?>
 <p:tagLst xmlns:a="http://schemas.openxmlformats.org/drawingml/2006/main" xmlns:r="http://schemas.openxmlformats.org/officeDocument/2006/relationships" xmlns:p="http://schemas.openxmlformats.org/presentationml/2006/main">
   <p:tag name="SP_AGENDA" val="TOC TOCShowsSubsections Dividers SectionNumber SlideNumber"/>
@@ -17624,20 +20915,6 @@
 </file>
 
 <file path=customXml/item1.xml><?xml version="1.0" encoding="utf-8"?>
-<p:properties xmlns:p="http://schemas.microsoft.com/office/2006/metadata/properties" xmlns:xsi="http://www.w3.org/2001/XMLSchema-instance" xmlns:pc="http://schemas.microsoft.com/office/infopath/2007/PartnerControls">
-  <documentManagement>
-    <ResponsibleContact xmlns="47fc58d8-9f4b-4bc8-b278-c3cb6f298023">
-      <UserInfo>
-        <DisplayName/>
-        <AccountId xsi:nil="true"/>
-        <AccountType/>
-      </UserInfo>
-    </ResponsibleContact>
-  </documentManagement>
-</p:properties>
-</file>
-
-<file path=customXml/item2.xml><?xml version="1.0" encoding="utf-8"?>
 <ct:contentTypeSchema xmlns:ct="http://schemas.microsoft.com/office/2006/metadata/contentType" xmlns:ma="http://schemas.microsoft.com/office/2006/metadata/properties/metaAttributes" ct:_="" ma:_="" ma:contentTypeName="Document" ma:contentTypeID="0x010100615F0F9DCBF1E94796646FCF98A7C072" ma:contentTypeVersion="13" ma:contentTypeDescription="Create a new document." ma:contentTypeScope="" ma:versionID="5b306df2387467d165757eb5a8cdddaa">
   <xsd:schema xmlns:xsd="http://www.w3.org/2001/XMLSchema" xmlns:xs="http://www.w3.org/2001/XMLSchema" xmlns:p="http://schemas.microsoft.com/office/2006/metadata/properties" xmlns:ns2="0e00d59e-b0d2-4e67-be34-67e465b0fbed" xmlns:ns3="47fc58d8-9f4b-4bc8-b278-c3cb6f298023" targetNamespace="http://schemas.microsoft.com/office/2006/metadata/properties" ma:root="true" ma:fieldsID="eebd9c38828bcd412c0ba6e1c1867684" ns2:_="" ns3:_="">
     <xsd:import namespace="0e00d59e-b0d2-4e67-be34-67e465b0fbed"/>
@@ -17874,19 +21151,21 @@
 </ct:contentTypeSchema>
 </file>
 
-<file path=customXml/item3.xml><?xml version="1.0" encoding="utf-8"?>
-<TemplafySlideFormConfiguration><![CDATA[{"formFields":[],"formDataEntries":[]}]]></TemplafySlideFormConfiguration>
+<file path=customXml/item2.xml><?xml version="1.0" encoding="utf-8"?>
+<p:properties xmlns:p="http://schemas.microsoft.com/office/2006/metadata/properties" xmlns:xsi="http://www.w3.org/2001/XMLSchema-instance" xmlns:pc="http://schemas.microsoft.com/office/infopath/2007/PartnerControls">
+  <documentManagement>
+    <ResponsibleContact xmlns="47fc58d8-9f4b-4bc8-b278-c3cb6f298023">
+      <UserInfo>
+        <DisplayName/>
+        <AccountId xsi:nil="true"/>
+        <AccountType/>
+      </UserInfo>
+    </ResponsibleContact>
+  </documentManagement>
+</p:properties>
 </file>
 
-<file path=customXml/item4.xml><?xml version="1.0" encoding="utf-8"?>
-<TemplafySlideTemplateConfiguration><![CDATA[{"slideVersion":1,"isValidatorEnabled":false,"isLocked":false,"elementsMetadata":[],"slideId":"638265661923438196","enableDocumentContentUpdater":false,"version":"2.0"}]]></TemplafySlideTemplateConfiguration>
-</file>
-
-<file path=customXml/item5.xml><?xml version="1.0" encoding="utf-8"?>
-<TemplafyTemplateConfiguration><![CDATA[{"elementsMetadata":[{"type":"shape","id":"08b84b80-e163-4c17-82cd-a9abe93f8840","elementConfiguration":{"binding":"{{Form.SelectClassification.Name}}","visibility":"","type":"text","disableUpdates":false}}],"transformationConfigurations":[],"templateName":"Blank-PowerPoint-NewDesign-260723","templateDescription":"","enableDocumentContentUpdater":true,"version":"2.0"}]]></TemplafyTemplateConfiguration>
-</file>
-
-<file path=customXml/item6.xml><?xml version="1.0" encoding="utf-8"?>
+<file path=customXml/item3.xml><?xml version="1.0" encoding="utf-8"?>
 <?mso-contentType ?>
 <FormTemplates xmlns="http://schemas.microsoft.com/sharepoint/v3/contenttype/forms">
   <Display>DocumentLibraryForm</Display>
@@ -17895,28 +21174,23 @@
 </FormTemplates>
 </file>
 
+<file path=customXml/item4.xml><?xml version="1.0" encoding="utf-8"?>
+<TemplafyTemplateConfiguration><![CDATA[{"elementsMetadata":[{"type":"shape","id":"08b84b80-e163-4c17-82cd-a9abe93f8840","elementConfiguration":{"binding":"{{Form.SelectClassification.Name}}","visibility":"","type":"text","disableUpdates":false}}],"transformationConfigurations":[],"templateName":"Blank-PowerPoint-NewDesign-260723","templateDescription":"","enableDocumentContentUpdater":true,"version":"2.0"}]]></TemplafyTemplateConfiguration>
+</file>
+
+<file path=customXml/item5.xml><?xml version="1.0" encoding="utf-8"?>
+<TemplafySlideTemplateConfiguration><![CDATA[{"slideVersion":1,"isValidatorEnabled":false,"isLocked":false,"elementsMetadata":[],"slideId":"638265661923438196","enableDocumentContentUpdater":false,"version":"2.0"}]]></TemplafySlideTemplateConfiguration>
+</file>
+
+<file path=customXml/item6.xml><?xml version="1.0" encoding="utf-8"?>
+<TemplafySlideFormConfiguration><![CDATA[{"formFields":[],"formDataEntries":[]}]]></TemplafySlideFormConfiguration>
+</file>
+
 <file path=customXml/item7.xml><?xml version="1.0" encoding="utf-8"?>
 <TemplafyFormConfiguration><![CDATA[{"formFields":[{"distinct":false,"hideIfNoUserInteractionRequired":false,"required":false,"defaultValue":"INTERNAL – SAP and Partners Only","autoSelectFirstOption":false,"shareValue":false,"type":"dropDown","dataSourceName":"Classification","dataSourceFieldName":"Name","name":"SelectClassification","label":"Select Classification"}],"formDataEntries":[{"name":"SelectClassification","value":"OmrOP8d402txjl1Zr787gUA6bTWeMdaxGEF9U5BKD64="}]}]]></TemplafyFormConfiguration>
 </file>
 
 <file path=customXml/itemProps1.xml><?xml version="1.0" encoding="utf-8"?>
-<ds:datastoreItem xmlns:ds="http://schemas.openxmlformats.org/officeDocument/2006/customXml" ds:itemID="{C1422F45-04DB-421D-8796-270006657806}">
-  <ds:schemaRefs>
-    <ds:schemaRef ds:uri="http://www.w3.org/XML/1998/namespace"/>
-    <ds:schemaRef ds:uri="http://purl.org/dc/elements/1.1/"/>
-    <ds:schemaRef ds:uri="http://purl.org/dc/terms/"/>
-    <ds:schemaRef ds:uri="http://schemas.microsoft.com/office/infopath/2007/PartnerControls"/>
-    <ds:schemaRef ds:uri="0e00d59e-b0d2-4e67-be34-67e465b0fbed"/>
-    <ds:schemaRef ds:uri="47fc58d8-9f4b-4bc8-b278-c3cb6f298023"/>
-    <ds:schemaRef ds:uri="http://purl.org/dc/dcmitype/"/>
-    <ds:schemaRef ds:uri="http://schemas.microsoft.com/office/2006/documentManagement/types"/>
-    <ds:schemaRef ds:uri="http://schemas.openxmlformats.org/package/2006/metadata/core-properties"/>
-    <ds:schemaRef ds:uri="http://schemas.microsoft.com/office/2006/metadata/properties"/>
-  </ds:schemaRefs>
-</ds:datastoreItem>
-</file>
-
-<file path=customXml/itemProps2.xml><?xml version="1.0" encoding="utf-8"?>
 <ds:datastoreItem xmlns:ds="http://schemas.openxmlformats.org/officeDocument/2006/customXml" ds:itemID="{B3812128-B7DF-461F-A8F2-831754A1D2F6}">
   <ds:schemaRefs>
     <ds:schemaRef ds:uri="http://schemas.microsoft.com/office/2006/metadata/contentType"/>
@@ -17935,29 +21209,46 @@
 </ds:datastoreItem>
 </file>
 
+<file path=customXml/itemProps2.xml><?xml version="1.0" encoding="utf-8"?>
+<ds:datastoreItem xmlns:ds="http://schemas.openxmlformats.org/officeDocument/2006/customXml" ds:itemID="{C1422F45-04DB-421D-8796-270006657806}">
+  <ds:schemaRefs>
+    <ds:schemaRef ds:uri="http://www.w3.org/XML/1998/namespace"/>
+    <ds:schemaRef ds:uri="http://purl.org/dc/elements/1.1/"/>
+    <ds:schemaRef ds:uri="http://purl.org/dc/terms/"/>
+    <ds:schemaRef ds:uri="http://schemas.microsoft.com/office/infopath/2007/PartnerControls"/>
+    <ds:schemaRef ds:uri="0e00d59e-b0d2-4e67-be34-67e465b0fbed"/>
+    <ds:schemaRef ds:uri="47fc58d8-9f4b-4bc8-b278-c3cb6f298023"/>
+    <ds:schemaRef ds:uri="http://purl.org/dc/dcmitype/"/>
+    <ds:schemaRef ds:uri="http://schemas.microsoft.com/office/2006/documentManagement/types"/>
+    <ds:schemaRef ds:uri="http://schemas.openxmlformats.org/package/2006/metadata/core-properties"/>
+    <ds:schemaRef ds:uri="http://schemas.microsoft.com/office/2006/metadata/properties"/>
+  </ds:schemaRefs>
+</ds:datastoreItem>
+</file>
+
 <file path=customXml/itemProps3.xml><?xml version="1.0" encoding="utf-8"?>
-<ds:datastoreItem xmlns:ds="http://schemas.openxmlformats.org/officeDocument/2006/customXml" ds:itemID="{8D60027D-B63E-433E-BB56-64F598DA4B11}">
+<ds:datastoreItem xmlns:ds="http://schemas.openxmlformats.org/officeDocument/2006/customXml" ds:itemID="{291DCB28-1C52-4C0E-804A-6BD2D3F0FB8D}">
+  <ds:schemaRefs>
+    <ds:schemaRef ds:uri="http://schemas.microsoft.com/sharepoint/v3/contenttype/forms"/>
+  </ds:schemaRefs>
+</ds:datastoreItem>
+</file>
+
+<file path=customXml/itemProps4.xml><?xml version="1.0" encoding="utf-8"?>
+<ds:datastoreItem xmlns:ds="http://schemas.openxmlformats.org/officeDocument/2006/customXml" ds:itemID="{626BBCBB-1894-4E66-BA48-9E91CE3ACBA0}">
   <ds:schemaRefs/>
 </ds:datastoreItem>
 </file>
 
-<file path=customXml/itemProps4.xml><?xml version="1.0" encoding="utf-8"?>
+<file path=customXml/itemProps5.xml><?xml version="1.0" encoding="utf-8"?>
 <ds:datastoreItem xmlns:ds="http://schemas.openxmlformats.org/officeDocument/2006/customXml" ds:itemID="{FB3CBE98-0F50-4DCC-AB6D-9CE0DBAA75FF}">
   <ds:schemaRefs/>
 </ds:datastoreItem>
 </file>
 
-<file path=customXml/itemProps5.xml><?xml version="1.0" encoding="utf-8"?>
-<ds:datastoreItem xmlns:ds="http://schemas.openxmlformats.org/officeDocument/2006/customXml" ds:itemID="{626BBCBB-1894-4E66-BA48-9E91CE3ACBA0}">
+<file path=customXml/itemProps6.xml><?xml version="1.0" encoding="utf-8"?>
+<ds:datastoreItem xmlns:ds="http://schemas.openxmlformats.org/officeDocument/2006/customXml" ds:itemID="{8D60027D-B63E-433E-BB56-64F598DA4B11}">
   <ds:schemaRefs/>
-</ds:datastoreItem>
-</file>
-
-<file path=customXml/itemProps6.xml><?xml version="1.0" encoding="utf-8"?>
-<ds:datastoreItem xmlns:ds="http://schemas.openxmlformats.org/officeDocument/2006/customXml" ds:itemID="{291DCB28-1C52-4C0E-804A-6BD2D3F0FB8D}">
-  <ds:schemaRefs>
-    <ds:schemaRef ds:uri="http://schemas.microsoft.com/sharepoint/v3/contenttype/forms"/>
-  </ds:schemaRefs>
 </ds:datastoreItem>
 </file>
 

</xml_diff>

<commit_message>
Deployed f3c5b6e with MkDocs version: 1.3.0
</commit_message>
<xml_diff>
--- a/python/DataStructure/assets/tmp.pptx
+++ b/python/DataStructure/assets/tmp.pptx
@@ -5,19 +5,20 @@
     <p:sldMasterId id="2147483733" r:id="rId8"/>
   </p:sldMasterIdLst>
   <p:notesMasterIdLst>
-    <p:notesMasterId r:id="rId11"/>
+    <p:notesMasterId r:id="rId12"/>
   </p:notesMasterIdLst>
   <p:handoutMasterIdLst>
-    <p:handoutMasterId r:id="rId12"/>
+    <p:handoutMasterId r:id="rId13"/>
   </p:handoutMasterIdLst>
   <p:sldIdLst>
     <p:sldId id="364" r:id="rId9"/>
     <p:sldId id="365" r:id="rId10"/>
+    <p:sldId id="366" r:id="rId11"/>
   </p:sldIdLst>
   <p:sldSz cx="12195175" cy="6858000"/>
   <p:notesSz cx="6858000" cy="9144000"/>
   <p:custDataLst>
-    <p:tags r:id="rId13"/>
+    <p:tags r:id="rId14"/>
   </p:custDataLst>
   <p:defaultTextStyle>
     <a:defPPr>
@@ -19468,6 +19469,2092 @@
 </p:sld>
 </file>
 
+<file path=ppt/slides/slide3.xml><?xml version="1.0" encoding="utf-8"?>
+<p:sld xmlns:a="http://schemas.openxmlformats.org/drawingml/2006/main" xmlns:r="http://schemas.openxmlformats.org/officeDocument/2006/relationships" xmlns:p="http://schemas.openxmlformats.org/presentationml/2006/main">
+  <p:cSld>
+    <p:spTree>
+      <p:nvGrpSpPr>
+        <p:cNvPr id="1" name=""/>
+        <p:cNvGrpSpPr/>
+        <p:nvPr/>
+      </p:nvGrpSpPr>
+      <p:grpSpPr>
+        <a:xfrm>
+          <a:off x="0" y="0"/>
+          <a:ext cx="0" cy="0"/>
+          <a:chOff x="0" y="0"/>
+          <a:chExt cx="0" cy="0"/>
+        </a:xfrm>
+      </p:grpSpPr>
+      <p:grpSp>
+        <p:nvGrpSpPr>
+          <p:cNvPr id="52" name="Group 51">
+            <a:extLst>
+              <a:ext uri="{FF2B5EF4-FFF2-40B4-BE49-F238E27FC236}">
+                <a16:creationId xmlns:a16="http://schemas.microsoft.com/office/drawing/2014/main" id="{E2CC44ED-E39D-FDD8-6B17-16B4C0B3290C}"/>
+              </a:ext>
+            </a:extLst>
+          </p:cNvPr>
+          <p:cNvGrpSpPr/>
+          <p:nvPr/>
+        </p:nvGrpSpPr>
+        <p:grpSpPr>
+          <a:xfrm>
+            <a:off x="3341471" y="1092641"/>
+            <a:ext cx="6918762" cy="2465025"/>
+            <a:chOff x="2184003" y="1092641"/>
+            <a:chExt cx="6918762" cy="2465025"/>
+          </a:xfrm>
+        </p:grpSpPr>
+        <p:sp>
+          <p:nvSpPr>
+            <p:cNvPr id="4" name="Rectangle 3">
+              <a:extLst>
+                <a:ext uri="{FF2B5EF4-FFF2-40B4-BE49-F238E27FC236}">
+                  <a16:creationId xmlns:a16="http://schemas.microsoft.com/office/drawing/2014/main" id="{3D4EEE75-DC6F-6F4A-A653-C0A626166ADF}"/>
+                </a:ext>
+              </a:extLst>
+            </p:cNvPr>
+            <p:cNvSpPr/>
+            <p:nvPr/>
+          </p:nvSpPr>
+          <p:spPr bwMode="gray">
+            <a:xfrm>
+              <a:off x="3698532" y="1092641"/>
+              <a:ext cx="518474" cy="518474"/>
+            </a:xfrm>
+            <a:prstGeom prst="rect">
+              <a:avLst/>
+            </a:prstGeom>
+            <a:solidFill>
+              <a:schemeClr val="accent4"/>
+            </a:solidFill>
+            <a:ln w="25400" algn="ctr">
+              <a:solidFill>
+                <a:schemeClr val="tx1"/>
+              </a:solidFill>
+              <a:miter lim="800000"/>
+              <a:headEnd/>
+              <a:tailEnd/>
+            </a:ln>
+          </p:spPr>
+          <p:txBody>
+            <a:bodyPr lIns="90000" tIns="72000" rIns="90000" bIns="72000" rtlCol="0" anchor="ctr"/>
+            <a:lstStyle/>
+            <a:p>
+              <a:pPr marR="0" algn="ctr" defTabSz="914400" eaLnBrk="1" fontAlgn="base" latinLnBrk="0" hangingPunct="1">
+                <a:lnSpc>
+                  <a:spcPct val="100000"/>
+                </a:lnSpc>
+                <a:spcBef>
+                  <a:spcPct val="50000"/>
+                </a:spcBef>
+                <a:spcAft>
+                  <a:spcPct val="0"/>
+                </a:spcAft>
+                <a:buClr>
+                  <a:srgbClr val="F0AB00"/>
+                </a:buClr>
+                <a:buSzPct val="80000"/>
+                <a:tabLst/>
+              </a:pPr>
+              <a:r>
+                <a:rPr kumimoji="0" lang="en-CN" sz="1800" b="0" i="0" u="none" strike="noStrike" kern="0" cap="none" spc="0" normalizeH="0" baseline="0" noProof="0" dirty="0">
+                  <a:ln>
+                    <a:noFill/>
+                  </a:ln>
+                  <a:effectLst/>
+                  <a:uLnTx/>
+                  <a:uFillTx/>
+                  <a:ea typeface="Arial Unicode MS" pitchFamily="34" charset="-128"/>
+                  <a:cs typeface="Arial Unicode MS" pitchFamily="34" charset="-128"/>
+                </a:rPr>
+                <a:t>D1</a:t>
+              </a:r>
+            </a:p>
+          </p:txBody>
+        </p:sp>
+        <p:sp>
+          <p:nvSpPr>
+            <p:cNvPr id="5" name="Rectangle 4">
+              <a:extLst>
+                <a:ext uri="{FF2B5EF4-FFF2-40B4-BE49-F238E27FC236}">
+                  <a16:creationId xmlns:a16="http://schemas.microsoft.com/office/drawing/2014/main" id="{9E1C0B82-9DB4-1DDC-21DD-F88C11881172}"/>
+                </a:ext>
+              </a:extLst>
+            </p:cNvPr>
+            <p:cNvSpPr/>
+            <p:nvPr/>
+          </p:nvSpPr>
+          <p:spPr bwMode="gray">
+            <a:xfrm>
+              <a:off x="4217006" y="1094212"/>
+              <a:ext cx="518474" cy="518474"/>
+            </a:xfrm>
+            <a:prstGeom prst="rect">
+              <a:avLst/>
+            </a:prstGeom>
+            <a:noFill/>
+            <a:ln w="25400" algn="ctr">
+              <a:solidFill>
+                <a:schemeClr val="tx1"/>
+              </a:solidFill>
+              <a:miter lim="800000"/>
+              <a:headEnd/>
+              <a:tailEnd/>
+            </a:ln>
+          </p:spPr>
+          <p:txBody>
+            <a:bodyPr lIns="90000" tIns="72000" rIns="90000" bIns="72000" rtlCol="0" anchor="ctr"/>
+            <a:lstStyle/>
+            <a:p>
+              <a:pPr marR="0" algn="ctr" defTabSz="914400" eaLnBrk="1" fontAlgn="base" latinLnBrk="0" hangingPunct="1">
+                <a:lnSpc>
+                  <a:spcPct val="100000"/>
+                </a:lnSpc>
+                <a:spcBef>
+                  <a:spcPct val="50000"/>
+                </a:spcBef>
+                <a:spcAft>
+                  <a:spcPct val="0"/>
+                </a:spcAft>
+                <a:buClr>
+                  <a:srgbClr val="F0AB00"/>
+                </a:buClr>
+                <a:buSzPct val="80000"/>
+                <a:tabLst/>
+              </a:pPr>
+              <a:endParaRPr kumimoji="0" lang="en-CN" sz="1800" b="0" i="0" u="none" strike="noStrike" kern="0" cap="none" spc="0" normalizeH="0" baseline="0" noProof="0" dirty="0">
+                <a:ln>
+                  <a:noFill/>
+                </a:ln>
+                <a:effectLst/>
+                <a:uLnTx/>
+                <a:uFillTx/>
+                <a:ea typeface="Arial Unicode MS" pitchFamily="34" charset="-128"/>
+                <a:cs typeface="Arial Unicode MS" pitchFamily="34" charset="-128"/>
+              </a:endParaRPr>
+            </a:p>
+          </p:txBody>
+        </p:sp>
+        <p:cxnSp>
+          <p:nvCxnSpPr>
+            <p:cNvPr id="7" name="Straight Arrow Connector 6">
+              <a:extLst>
+                <a:ext uri="{FF2B5EF4-FFF2-40B4-BE49-F238E27FC236}">
+                  <a16:creationId xmlns:a16="http://schemas.microsoft.com/office/drawing/2014/main" id="{917674BA-EF24-7475-8FA6-D3C9BB33C913}"/>
+                </a:ext>
+              </a:extLst>
+            </p:cNvPr>
+            <p:cNvCxnSpPr>
+              <a:cxnSpLocks/>
+            </p:cNvCxnSpPr>
+            <p:nvPr/>
+          </p:nvCxnSpPr>
+          <p:spPr>
+            <a:xfrm>
+              <a:off x="4476243" y="1351878"/>
+              <a:ext cx="617333" cy="0"/>
+            </a:xfrm>
+            <a:prstGeom prst="straightConnector1">
+              <a:avLst/>
+            </a:prstGeom>
+            <a:ln w="38100">
+              <a:solidFill>
+                <a:schemeClr val="tx1"/>
+              </a:solidFill>
+              <a:headEnd type="none" w="med" len="med"/>
+              <a:tailEnd type="triangle"/>
+            </a:ln>
+          </p:spPr>
+          <p:style>
+            <a:lnRef idx="1">
+              <a:schemeClr val="accent1"/>
+            </a:lnRef>
+            <a:fillRef idx="0">
+              <a:schemeClr val="accent1"/>
+            </a:fillRef>
+            <a:effectRef idx="0">
+              <a:schemeClr val="accent1"/>
+            </a:effectRef>
+            <a:fontRef idx="minor">
+              <a:schemeClr val="tx1"/>
+            </a:fontRef>
+          </p:style>
+        </p:cxnSp>
+        <p:sp>
+          <p:nvSpPr>
+            <p:cNvPr id="9" name="Rectangle 8">
+              <a:extLst>
+                <a:ext uri="{FF2B5EF4-FFF2-40B4-BE49-F238E27FC236}">
+                  <a16:creationId xmlns:a16="http://schemas.microsoft.com/office/drawing/2014/main" id="{6F5BCC88-D58B-B6B7-8774-BDABBF103C8E}"/>
+                </a:ext>
+              </a:extLst>
+            </p:cNvPr>
+            <p:cNvSpPr/>
+            <p:nvPr/>
+          </p:nvSpPr>
+          <p:spPr bwMode="gray">
+            <a:xfrm>
+              <a:off x="5091740" y="1092641"/>
+              <a:ext cx="518474" cy="518474"/>
+            </a:xfrm>
+            <a:prstGeom prst="rect">
+              <a:avLst/>
+            </a:prstGeom>
+            <a:solidFill>
+              <a:schemeClr val="accent4"/>
+            </a:solidFill>
+            <a:ln w="25400" algn="ctr">
+              <a:solidFill>
+                <a:schemeClr val="tx1"/>
+              </a:solidFill>
+              <a:miter lim="800000"/>
+              <a:headEnd/>
+              <a:tailEnd/>
+            </a:ln>
+          </p:spPr>
+          <p:txBody>
+            <a:bodyPr lIns="90000" tIns="72000" rIns="90000" bIns="72000" rtlCol="0" anchor="ctr"/>
+            <a:lstStyle/>
+            <a:p>
+              <a:pPr marR="0" algn="ctr" defTabSz="914400" eaLnBrk="1" fontAlgn="base" latinLnBrk="0" hangingPunct="1">
+                <a:lnSpc>
+                  <a:spcPct val="100000"/>
+                </a:lnSpc>
+                <a:spcBef>
+                  <a:spcPct val="50000"/>
+                </a:spcBef>
+                <a:spcAft>
+                  <a:spcPct val="0"/>
+                </a:spcAft>
+                <a:buClr>
+                  <a:srgbClr val="F0AB00"/>
+                </a:buClr>
+                <a:buSzPct val="80000"/>
+                <a:tabLst/>
+              </a:pPr>
+              <a:r>
+                <a:rPr kumimoji="0" lang="en-CN" sz="1800" b="0" i="0" u="none" strike="noStrike" kern="0" cap="none" spc="0" normalizeH="0" baseline="0" noProof="0" dirty="0">
+                  <a:ln>
+                    <a:noFill/>
+                  </a:ln>
+                  <a:effectLst/>
+                  <a:uLnTx/>
+                  <a:uFillTx/>
+                  <a:ea typeface="Arial Unicode MS" pitchFamily="34" charset="-128"/>
+                  <a:cs typeface="Arial Unicode MS" pitchFamily="34" charset="-128"/>
+                </a:rPr>
+                <a:t>D2</a:t>
+              </a:r>
+            </a:p>
+          </p:txBody>
+        </p:sp>
+        <p:sp>
+          <p:nvSpPr>
+            <p:cNvPr id="10" name="Rectangle 9">
+              <a:extLst>
+                <a:ext uri="{FF2B5EF4-FFF2-40B4-BE49-F238E27FC236}">
+                  <a16:creationId xmlns:a16="http://schemas.microsoft.com/office/drawing/2014/main" id="{35B5CE6E-7479-283E-032A-D899F8F93E4A}"/>
+                </a:ext>
+              </a:extLst>
+            </p:cNvPr>
+            <p:cNvSpPr/>
+            <p:nvPr/>
+          </p:nvSpPr>
+          <p:spPr bwMode="gray">
+            <a:xfrm>
+              <a:off x="5610214" y="1094212"/>
+              <a:ext cx="518474" cy="518474"/>
+            </a:xfrm>
+            <a:prstGeom prst="rect">
+              <a:avLst/>
+            </a:prstGeom>
+            <a:noFill/>
+            <a:ln w="25400" algn="ctr">
+              <a:solidFill>
+                <a:schemeClr val="tx1"/>
+              </a:solidFill>
+              <a:miter lim="800000"/>
+              <a:headEnd/>
+              <a:tailEnd/>
+            </a:ln>
+          </p:spPr>
+          <p:txBody>
+            <a:bodyPr lIns="90000" tIns="72000" rIns="90000" bIns="72000" rtlCol="0" anchor="ctr"/>
+            <a:lstStyle/>
+            <a:p>
+              <a:pPr marR="0" algn="ctr" defTabSz="914400" eaLnBrk="1" fontAlgn="base" latinLnBrk="0" hangingPunct="1">
+                <a:lnSpc>
+                  <a:spcPct val="100000"/>
+                </a:lnSpc>
+                <a:spcBef>
+                  <a:spcPct val="50000"/>
+                </a:spcBef>
+                <a:spcAft>
+                  <a:spcPct val="0"/>
+                </a:spcAft>
+                <a:buClr>
+                  <a:srgbClr val="F0AB00"/>
+                </a:buClr>
+                <a:buSzPct val="80000"/>
+                <a:tabLst/>
+              </a:pPr>
+              <a:endParaRPr kumimoji="0" lang="en-CN" sz="1800" b="0" i="0" u="none" strike="noStrike" kern="0" cap="none" spc="0" normalizeH="0" baseline="0" noProof="0" dirty="0">
+                <a:ln>
+                  <a:noFill/>
+                </a:ln>
+                <a:effectLst/>
+                <a:uLnTx/>
+                <a:uFillTx/>
+                <a:ea typeface="Arial Unicode MS" pitchFamily="34" charset="-128"/>
+                <a:cs typeface="Arial Unicode MS" pitchFamily="34" charset="-128"/>
+              </a:endParaRPr>
+            </a:p>
+          </p:txBody>
+        </p:sp>
+        <p:cxnSp>
+          <p:nvCxnSpPr>
+            <p:cNvPr id="11" name="Straight Arrow Connector 10">
+              <a:extLst>
+                <a:ext uri="{FF2B5EF4-FFF2-40B4-BE49-F238E27FC236}">
+                  <a16:creationId xmlns:a16="http://schemas.microsoft.com/office/drawing/2014/main" id="{283434DB-F1C3-7CF3-C284-E738EEBEE1B9}"/>
+                </a:ext>
+              </a:extLst>
+            </p:cNvPr>
+            <p:cNvCxnSpPr>
+              <a:cxnSpLocks/>
+            </p:cNvCxnSpPr>
+            <p:nvPr/>
+          </p:nvCxnSpPr>
+          <p:spPr>
+            <a:xfrm>
+              <a:off x="5869451" y="1351878"/>
+              <a:ext cx="617333" cy="0"/>
+            </a:xfrm>
+            <a:prstGeom prst="straightConnector1">
+              <a:avLst/>
+            </a:prstGeom>
+            <a:ln w="38100">
+              <a:solidFill>
+                <a:schemeClr val="tx1"/>
+              </a:solidFill>
+              <a:headEnd type="none" w="med" len="med"/>
+              <a:tailEnd type="triangle"/>
+            </a:ln>
+          </p:spPr>
+          <p:style>
+            <a:lnRef idx="1">
+              <a:schemeClr val="accent1"/>
+            </a:lnRef>
+            <a:fillRef idx="0">
+              <a:schemeClr val="accent1"/>
+            </a:fillRef>
+            <a:effectRef idx="0">
+              <a:schemeClr val="accent1"/>
+            </a:effectRef>
+            <a:fontRef idx="minor">
+              <a:schemeClr val="tx1"/>
+            </a:fontRef>
+          </p:style>
+        </p:cxnSp>
+        <p:sp>
+          <p:nvSpPr>
+            <p:cNvPr id="12" name="Rectangle 11">
+              <a:extLst>
+                <a:ext uri="{FF2B5EF4-FFF2-40B4-BE49-F238E27FC236}">
+                  <a16:creationId xmlns:a16="http://schemas.microsoft.com/office/drawing/2014/main" id="{FADAE391-BC0E-57F4-F37C-DD2A771A8497}"/>
+                </a:ext>
+              </a:extLst>
+            </p:cNvPr>
+            <p:cNvSpPr/>
+            <p:nvPr/>
+          </p:nvSpPr>
+          <p:spPr bwMode="gray">
+            <a:xfrm>
+              <a:off x="6484948" y="1092641"/>
+              <a:ext cx="518474" cy="518474"/>
+            </a:xfrm>
+            <a:prstGeom prst="rect">
+              <a:avLst/>
+            </a:prstGeom>
+            <a:solidFill>
+              <a:schemeClr val="accent4"/>
+            </a:solidFill>
+            <a:ln w="25400" algn="ctr">
+              <a:solidFill>
+                <a:schemeClr val="tx1"/>
+              </a:solidFill>
+              <a:miter lim="800000"/>
+              <a:headEnd/>
+              <a:tailEnd/>
+            </a:ln>
+          </p:spPr>
+          <p:txBody>
+            <a:bodyPr lIns="90000" tIns="72000" rIns="90000" bIns="72000" rtlCol="0" anchor="ctr"/>
+            <a:lstStyle/>
+            <a:p>
+              <a:pPr marR="0" algn="ctr" defTabSz="914400" eaLnBrk="1" fontAlgn="base" latinLnBrk="0" hangingPunct="1">
+                <a:lnSpc>
+                  <a:spcPct val="100000"/>
+                </a:lnSpc>
+                <a:spcBef>
+                  <a:spcPct val="50000"/>
+                </a:spcBef>
+                <a:spcAft>
+                  <a:spcPct val="0"/>
+                </a:spcAft>
+                <a:buClr>
+                  <a:srgbClr val="F0AB00"/>
+                </a:buClr>
+                <a:buSzPct val="80000"/>
+                <a:tabLst/>
+              </a:pPr>
+              <a:r>
+                <a:rPr kumimoji="0" lang="en-CN" sz="1800" b="0" i="0" u="none" strike="noStrike" kern="0" cap="none" spc="0" normalizeH="0" baseline="0" noProof="0" dirty="0">
+                  <a:ln>
+                    <a:noFill/>
+                  </a:ln>
+                  <a:effectLst/>
+                  <a:uLnTx/>
+                  <a:uFillTx/>
+                  <a:ea typeface="Arial Unicode MS" pitchFamily="34" charset="-128"/>
+                  <a:cs typeface="Arial Unicode MS" pitchFamily="34" charset="-128"/>
+                </a:rPr>
+                <a:t>D3</a:t>
+              </a:r>
+            </a:p>
+          </p:txBody>
+        </p:sp>
+        <p:sp>
+          <p:nvSpPr>
+            <p:cNvPr id="13" name="Rectangle 12">
+              <a:extLst>
+                <a:ext uri="{FF2B5EF4-FFF2-40B4-BE49-F238E27FC236}">
+                  <a16:creationId xmlns:a16="http://schemas.microsoft.com/office/drawing/2014/main" id="{F73D2162-7F93-B318-5A56-9AEDE1DB6427}"/>
+                </a:ext>
+              </a:extLst>
+            </p:cNvPr>
+            <p:cNvSpPr/>
+            <p:nvPr/>
+          </p:nvSpPr>
+          <p:spPr bwMode="gray">
+            <a:xfrm>
+              <a:off x="7003422" y="1094212"/>
+              <a:ext cx="518474" cy="518474"/>
+            </a:xfrm>
+            <a:prstGeom prst="rect">
+              <a:avLst/>
+            </a:prstGeom>
+            <a:noFill/>
+            <a:ln w="25400" algn="ctr">
+              <a:solidFill>
+                <a:schemeClr val="tx1"/>
+              </a:solidFill>
+              <a:miter lim="800000"/>
+              <a:headEnd/>
+              <a:tailEnd/>
+            </a:ln>
+          </p:spPr>
+          <p:txBody>
+            <a:bodyPr lIns="90000" tIns="72000" rIns="90000" bIns="72000" rtlCol="0" anchor="ctr"/>
+            <a:lstStyle/>
+            <a:p>
+              <a:pPr marR="0" algn="ctr" defTabSz="914400" eaLnBrk="1" fontAlgn="base" latinLnBrk="0" hangingPunct="1">
+                <a:lnSpc>
+                  <a:spcPct val="100000"/>
+                </a:lnSpc>
+                <a:spcBef>
+                  <a:spcPct val="50000"/>
+                </a:spcBef>
+                <a:spcAft>
+                  <a:spcPct val="0"/>
+                </a:spcAft>
+                <a:buClr>
+                  <a:srgbClr val="F0AB00"/>
+                </a:buClr>
+                <a:buSzPct val="80000"/>
+                <a:tabLst/>
+              </a:pPr>
+              <a:endParaRPr kumimoji="0" lang="en-CN" sz="1800" b="0" i="0" u="none" strike="noStrike" kern="0" cap="none" spc="0" normalizeH="0" baseline="0" noProof="0" dirty="0">
+                <a:ln>
+                  <a:noFill/>
+                </a:ln>
+                <a:effectLst/>
+                <a:uLnTx/>
+                <a:uFillTx/>
+                <a:ea typeface="Arial Unicode MS" pitchFamily="34" charset="-128"/>
+                <a:cs typeface="Arial Unicode MS" pitchFamily="34" charset="-128"/>
+              </a:endParaRPr>
+            </a:p>
+          </p:txBody>
+        </p:sp>
+        <p:cxnSp>
+          <p:nvCxnSpPr>
+            <p:cNvPr id="16" name="Straight Connector 15">
+              <a:extLst>
+                <a:ext uri="{FF2B5EF4-FFF2-40B4-BE49-F238E27FC236}">
+                  <a16:creationId xmlns:a16="http://schemas.microsoft.com/office/drawing/2014/main" id="{EA5DEDA8-C91C-8CFC-4D43-FD19D6DE8C40}"/>
+                </a:ext>
+              </a:extLst>
+            </p:cNvPr>
+            <p:cNvCxnSpPr/>
+            <p:nvPr/>
+          </p:nvCxnSpPr>
+          <p:spPr>
+            <a:xfrm>
+              <a:off x="7003422" y="1092641"/>
+              <a:ext cx="518474" cy="518474"/>
+            </a:xfrm>
+            <a:prstGeom prst="line">
+              <a:avLst/>
+            </a:prstGeom>
+            <a:ln w="25400">
+              <a:solidFill>
+                <a:schemeClr val="tx1"/>
+              </a:solidFill>
+              <a:headEnd type="none" w="med" len="med"/>
+              <a:tailEnd type="none" w="med" len="med"/>
+            </a:ln>
+          </p:spPr>
+          <p:style>
+            <a:lnRef idx="1">
+              <a:schemeClr val="accent1"/>
+            </a:lnRef>
+            <a:fillRef idx="0">
+              <a:schemeClr val="accent1"/>
+            </a:fillRef>
+            <a:effectRef idx="0">
+              <a:schemeClr val="accent1"/>
+            </a:effectRef>
+            <a:fontRef idx="minor">
+              <a:schemeClr val="tx1"/>
+            </a:fontRef>
+          </p:style>
+        </p:cxnSp>
+        <p:sp>
+          <p:nvSpPr>
+            <p:cNvPr id="17" name="Rectangle 16">
+              <a:extLst>
+                <a:ext uri="{FF2B5EF4-FFF2-40B4-BE49-F238E27FC236}">
+                  <a16:creationId xmlns:a16="http://schemas.microsoft.com/office/drawing/2014/main" id="{80A9E3D1-534C-BB70-45F8-851FCFFBD7A0}"/>
+                </a:ext>
+              </a:extLst>
+            </p:cNvPr>
+            <p:cNvSpPr/>
+            <p:nvPr/>
+          </p:nvSpPr>
+          <p:spPr bwMode="gray">
+            <a:xfrm>
+              <a:off x="2823798" y="1092641"/>
+              <a:ext cx="518474" cy="518474"/>
+            </a:xfrm>
+            <a:prstGeom prst="rect">
+              <a:avLst/>
+            </a:prstGeom>
+            <a:noFill/>
+            <a:ln w="25400" algn="ctr">
+              <a:solidFill>
+                <a:schemeClr val="tx1"/>
+              </a:solidFill>
+              <a:miter lim="800000"/>
+              <a:headEnd/>
+              <a:tailEnd/>
+            </a:ln>
+          </p:spPr>
+          <p:txBody>
+            <a:bodyPr lIns="90000" tIns="72000" rIns="90000" bIns="72000" rtlCol="0" anchor="ctr"/>
+            <a:lstStyle/>
+            <a:p>
+              <a:pPr marR="0" algn="ctr" defTabSz="914400" eaLnBrk="1" fontAlgn="base" latinLnBrk="0" hangingPunct="1">
+                <a:lnSpc>
+                  <a:spcPct val="100000"/>
+                </a:lnSpc>
+                <a:spcBef>
+                  <a:spcPct val="50000"/>
+                </a:spcBef>
+                <a:spcAft>
+                  <a:spcPct val="0"/>
+                </a:spcAft>
+                <a:buClr>
+                  <a:srgbClr val="F0AB00"/>
+                </a:buClr>
+                <a:buSzPct val="80000"/>
+                <a:tabLst/>
+              </a:pPr>
+              <a:endParaRPr kumimoji="0" lang="en-CN" sz="1800" b="0" i="0" u="none" strike="noStrike" kern="0" cap="none" spc="0" normalizeH="0" baseline="0" noProof="0" dirty="0">
+                <a:ln>
+                  <a:noFill/>
+                </a:ln>
+                <a:effectLst/>
+                <a:uLnTx/>
+                <a:uFillTx/>
+                <a:ea typeface="Arial Unicode MS" pitchFamily="34" charset="-128"/>
+                <a:cs typeface="Arial Unicode MS" pitchFamily="34" charset="-128"/>
+              </a:endParaRPr>
+            </a:p>
+          </p:txBody>
+        </p:sp>
+        <p:cxnSp>
+          <p:nvCxnSpPr>
+            <p:cNvPr id="18" name="Straight Arrow Connector 17">
+              <a:extLst>
+                <a:ext uri="{FF2B5EF4-FFF2-40B4-BE49-F238E27FC236}">
+                  <a16:creationId xmlns:a16="http://schemas.microsoft.com/office/drawing/2014/main" id="{B6D7B0FB-121E-D83A-A8B3-B50B14FF8577}"/>
+                </a:ext>
+              </a:extLst>
+            </p:cNvPr>
+            <p:cNvCxnSpPr>
+              <a:cxnSpLocks/>
+            </p:cNvCxnSpPr>
+            <p:nvPr/>
+          </p:nvCxnSpPr>
+          <p:spPr>
+            <a:xfrm>
+              <a:off x="3083035" y="1350307"/>
+              <a:ext cx="617333" cy="0"/>
+            </a:xfrm>
+            <a:prstGeom prst="straightConnector1">
+              <a:avLst/>
+            </a:prstGeom>
+            <a:ln w="38100">
+              <a:solidFill>
+                <a:schemeClr val="tx1"/>
+              </a:solidFill>
+              <a:headEnd type="none" w="med" len="med"/>
+              <a:tailEnd type="triangle"/>
+            </a:ln>
+          </p:spPr>
+          <p:style>
+            <a:lnRef idx="1">
+              <a:schemeClr val="accent1"/>
+            </a:lnRef>
+            <a:fillRef idx="0">
+              <a:schemeClr val="accent1"/>
+            </a:fillRef>
+            <a:effectRef idx="0">
+              <a:schemeClr val="accent1"/>
+            </a:effectRef>
+            <a:fontRef idx="minor">
+              <a:schemeClr val="tx1"/>
+            </a:fontRef>
+          </p:style>
+        </p:cxnSp>
+        <p:sp>
+          <p:nvSpPr>
+            <p:cNvPr id="19" name="TextBox 18">
+              <a:extLst>
+                <a:ext uri="{FF2B5EF4-FFF2-40B4-BE49-F238E27FC236}">
+                  <a16:creationId xmlns:a16="http://schemas.microsoft.com/office/drawing/2014/main" id="{0773B748-EF2B-60ED-00C2-D6FAFC61F719}"/>
+                </a:ext>
+              </a:extLst>
+            </p:cNvPr>
+            <p:cNvSpPr txBox="1"/>
+            <p:nvPr/>
+          </p:nvSpPr>
+          <p:spPr>
+            <a:xfrm>
+              <a:off x="2184003" y="1211807"/>
+              <a:ext cx="461665" cy="276999"/>
+            </a:xfrm>
+            <a:prstGeom prst="rect">
+              <a:avLst/>
+            </a:prstGeom>
+            <a:noFill/>
+          </p:spPr>
+          <p:txBody>
+            <a:bodyPr wrap="none" lIns="0" tIns="0" rIns="0" bIns="0" rtlCol="0">
+              <a:spAutoFit/>
+            </a:bodyPr>
+            <a:lstStyle/>
+            <a:p>
+              <a:pPr fontAlgn="base">
+                <a:spcBef>
+                  <a:spcPct val="50000"/>
+                </a:spcBef>
+                <a:spcAft>
+                  <a:spcPct val="0"/>
+                </a:spcAft>
+                <a:buClr>
+                  <a:srgbClr val="F0AB00"/>
+                </a:buClr>
+                <a:buSzPct val="80000"/>
+              </a:pPr>
+              <a:r>
+                <a:rPr lang="en-CN" sz="1800" kern="0" dirty="0">
+                  <a:ea typeface="Arial Unicode MS" pitchFamily="34" charset="-128"/>
+                  <a:cs typeface="Arial Unicode MS" pitchFamily="34" charset="-128"/>
+                </a:rPr>
+                <a:t>头部</a:t>
+              </a:r>
+            </a:p>
+          </p:txBody>
+        </p:sp>
+        <p:sp>
+          <p:nvSpPr>
+            <p:cNvPr id="20" name="Rectangle 19">
+              <a:extLst>
+                <a:ext uri="{FF2B5EF4-FFF2-40B4-BE49-F238E27FC236}">
+                  <a16:creationId xmlns:a16="http://schemas.microsoft.com/office/drawing/2014/main" id="{E280986D-149A-EEFF-A243-5E31463A44F3}"/>
+                </a:ext>
+              </a:extLst>
+            </p:cNvPr>
+            <p:cNvSpPr/>
+            <p:nvPr/>
+          </p:nvSpPr>
+          <p:spPr bwMode="gray">
+            <a:xfrm>
+              <a:off x="4242681" y="2193964"/>
+              <a:ext cx="518474" cy="518474"/>
+            </a:xfrm>
+            <a:prstGeom prst="rect">
+              <a:avLst/>
+            </a:prstGeom>
+            <a:solidFill>
+              <a:schemeClr val="accent4"/>
+            </a:solidFill>
+            <a:ln w="25400" algn="ctr">
+              <a:solidFill>
+                <a:schemeClr val="tx1"/>
+              </a:solidFill>
+              <a:miter lim="800000"/>
+              <a:headEnd/>
+              <a:tailEnd/>
+            </a:ln>
+          </p:spPr>
+          <p:txBody>
+            <a:bodyPr lIns="90000" tIns="72000" rIns="90000" bIns="72000" rtlCol="0" anchor="ctr"/>
+            <a:lstStyle/>
+            <a:p>
+              <a:pPr marR="0" algn="ctr" defTabSz="914400" eaLnBrk="1" fontAlgn="base" latinLnBrk="0" hangingPunct="1">
+                <a:lnSpc>
+                  <a:spcPct val="100000"/>
+                </a:lnSpc>
+                <a:spcBef>
+                  <a:spcPct val="50000"/>
+                </a:spcBef>
+                <a:spcAft>
+                  <a:spcPct val="0"/>
+                </a:spcAft>
+                <a:buClr>
+                  <a:srgbClr val="F0AB00"/>
+                </a:buClr>
+                <a:buSzPct val="80000"/>
+                <a:tabLst/>
+              </a:pPr>
+              <a:r>
+                <a:rPr kumimoji="0" lang="en-CN" sz="1800" b="0" i="0" u="none" strike="noStrike" kern="0" cap="none" spc="0" normalizeH="0" baseline="0" noProof="0" dirty="0">
+                  <a:ln>
+                    <a:noFill/>
+                  </a:ln>
+                  <a:effectLst/>
+                  <a:uLnTx/>
+                  <a:uFillTx/>
+                  <a:ea typeface="Arial Unicode MS" pitchFamily="34" charset="-128"/>
+                  <a:cs typeface="Arial Unicode MS" pitchFamily="34" charset="-128"/>
+                </a:rPr>
+                <a:t>D1</a:t>
+              </a:r>
+            </a:p>
+          </p:txBody>
+        </p:sp>
+        <p:sp>
+          <p:nvSpPr>
+            <p:cNvPr id="21" name="Rectangle 20">
+              <a:extLst>
+                <a:ext uri="{FF2B5EF4-FFF2-40B4-BE49-F238E27FC236}">
+                  <a16:creationId xmlns:a16="http://schemas.microsoft.com/office/drawing/2014/main" id="{46CC41B5-DED9-E67F-2D6D-F2B8351D3036}"/>
+                </a:ext>
+              </a:extLst>
+            </p:cNvPr>
+            <p:cNvSpPr/>
+            <p:nvPr/>
+          </p:nvSpPr>
+          <p:spPr bwMode="gray">
+            <a:xfrm>
+              <a:off x="4761155" y="2192393"/>
+              <a:ext cx="518474" cy="518474"/>
+            </a:xfrm>
+            <a:prstGeom prst="rect">
+              <a:avLst/>
+            </a:prstGeom>
+            <a:noFill/>
+            <a:ln w="25400" algn="ctr">
+              <a:solidFill>
+                <a:schemeClr val="tx1"/>
+              </a:solidFill>
+              <a:miter lim="800000"/>
+              <a:headEnd/>
+              <a:tailEnd/>
+            </a:ln>
+          </p:spPr>
+          <p:txBody>
+            <a:bodyPr lIns="90000" tIns="72000" rIns="90000" bIns="72000" rtlCol="0" anchor="ctr"/>
+            <a:lstStyle/>
+            <a:p>
+              <a:pPr marR="0" algn="ctr" defTabSz="914400" eaLnBrk="1" fontAlgn="base" latinLnBrk="0" hangingPunct="1">
+                <a:lnSpc>
+                  <a:spcPct val="100000"/>
+                </a:lnSpc>
+                <a:spcBef>
+                  <a:spcPct val="50000"/>
+                </a:spcBef>
+                <a:spcAft>
+                  <a:spcPct val="0"/>
+                </a:spcAft>
+                <a:buClr>
+                  <a:srgbClr val="F0AB00"/>
+                </a:buClr>
+                <a:buSzPct val="80000"/>
+                <a:tabLst/>
+              </a:pPr>
+              <a:endParaRPr kumimoji="0" lang="en-CN" sz="1800" b="0" i="0" u="none" strike="noStrike" kern="0" cap="none" spc="0" normalizeH="0" baseline="0" noProof="0" dirty="0">
+                <a:ln>
+                  <a:noFill/>
+                </a:ln>
+                <a:effectLst/>
+                <a:uLnTx/>
+                <a:uFillTx/>
+                <a:ea typeface="Arial Unicode MS" pitchFamily="34" charset="-128"/>
+                <a:cs typeface="Arial Unicode MS" pitchFamily="34" charset="-128"/>
+              </a:endParaRPr>
+            </a:p>
+          </p:txBody>
+        </p:sp>
+        <p:cxnSp>
+          <p:nvCxnSpPr>
+            <p:cNvPr id="22" name="Straight Arrow Connector 21">
+              <a:extLst>
+                <a:ext uri="{FF2B5EF4-FFF2-40B4-BE49-F238E27FC236}">
+                  <a16:creationId xmlns:a16="http://schemas.microsoft.com/office/drawing/2014/main" id="{90D65E5D-9AE3-27D7-0FDD-5557CBC2CF42}"/>
+                </a:ext>
+              </a:extLst>
+            </p:cNvPr>
+            <p:cNvCxnSpPr>
+              <a:cxnSpLocks/>
+            </p:cNvCxnSpPr>
+            <p:nvPr/>
+          </p:nvCxnSpPr>
+          <p:spPr>
+            <a:xfrm flipH="1">
+              <a:off x="5279629" y="2543154"/>
+              <a:ext cx="615497" cy="0"/>
+            </a:xfrm>
+            <a:prstGeom prst="straightConnector1">
+              <a:avLst/>
+            </a:prstGeom>
+            <a:ln w="38100">
+              <a:solidFill>
+                <a:schemeClr val="tx1"/>
+              </a:solidFill>
+              <a:headEnd type="none" w="med" len="med"/>
+              <a:tailEnd type="triangle"/>
+            </a:ln>
+          </p:spPr>
+          <p:style>
+            <a:lnRef idx="1">
+              <a:schemeClr val="accent1"/>
+            </a:lnRef>
+            <a:fillRef idx="0">
+              <a:schemeClr val="accent1"/>
+            </a:fillRef>
+            <a:effectRef idx="0">
+              <a:schemeClr val="accent1"/>
+            </a:effectRef>
+            <a:fontRef idx="minor">
+              <a:schemeClr val="tx1"/>
+            </a:fontRef>
+          </p:style>
+        </p:cxnSp>
+        <p:sp>
+          <p:nvSpPr>
+            <p:cNvPr id="23" name="Rectangle 22">
+              <a:extLst>
+                <a:ext uri="{FF2B5EF4-FFF2-40B4-BE49-F238E27FC236}">
+                  <a16:creationId xmlns:a16="http://schemas.microsoft.com/office/drawing/2014/main" id="{AD24F003-6CD5-ADEF-5E5D-EB7583944D4E}"/>
+                </a:ext>
+              </a:extLst>
+            </p:cNvPr>
+            <p:cNvSpPr/>
+            <p:nvPr/>
+          </p:nvSpPr>
+          <p:spPr bwMode="gray">
+            <a:xfrm>
+              <a:off x="6156199" y="2192393"/>
+              <a:ext cx="518474" cy="518474"/>
+            </a:xfrm>
+            <a:prstGeom prst="rect">
+              <a:avLst/>
+            </a:prstGeom>
+            <a:solidFill>
+              <a:schemeClr val="accent4"/>
+            </a:solidFill>
+            <a:ln w="25400" algn="ctr">
+              <a:solidFill>
+                <a:schemeClr val="tx1"/>
+              </a:solidFill>
+              <a:miter lim="800000"/>
+              <a:headEnd/>
+              <a:tailEnd/>
+            </a:ln>
+          </p:spPr>
+          <p:txBody>
+            <a:bodyPr lIns="90000" tIns="72000" rIns="90000" bIns="72000" rtlCol="0" anchor="ctr"/>
+            <a:lstStyle/>
+            <a:p>
+              <a:pPr marR="0" algn="ctr" defTabSz="914400" eaLnBrk="1" fontAlgn="base" latinLnBrk="0" hangingPunct="1">
+                <a:lnSpc>
+                  <a:spcPct val="100000"/>
+                </a:lnSpc>
+                <a:spcBef>
+                  <a:spcPct val="50000"/>
+                </a:spcBef>
+                <a:spcAft>
+                  <a:spcPct val="0"/>
+                </a:spcAft>
+                <a:buClr>
+                  <a:srgbClr val="F0AB00"/>
+                </a:buClr>
+                <a:buSzPct val="80000"/>
+                <a:tabLst/>
+              </a:pPr>
+              <a:r>
+                <a:rPr kumimoji="0" lang="en-CN" sz="1800" b="0" i="0" u="none" strike="noStrike" kern="0" cap="none" spc="0" normalizeH="0" baseline="0" noProof="0" dirty="0">
+                  <a:ln>
+                    <a:noFill/>
+                  </a:ln>
+                  <a:effectLst/>
+                  <a:uLnTx/>
+                  <a:uFillTx/>
+                  <a:ea typeface="Arial Unicode MS" pitchFamily="34" charset="-128"/>
+                  <a:cs typeface="Arial Unicode MS" pitchFamily="34" charset="-128"/>
+                </a:rPr>
+                <a:t>D2</a:t>
+              </a:r>
+            </a:p>
+          </p:txBody>
+        </p:sp>
+        <p:sp>
+          <p:nvSpPr>
+            <p:cNvPr id="24" name="Rectangle 23">
+              <a:extLst>
+                <a:ext uri="{FF2B5EF4-FFF2-40B4-BE49-F238E27FC236}">
+                  <a16:creationId xmlns:a16="http://schemas.microsoft.com/office/drawing/2014/main" id="{123EA70D-D6B5-8260-745A-0776D9DDB525}"/>
+                </a:ext>
+              </a:extLst>
+            </p:cNvPr>
+            <p:cNvSpPr/>
+            <p:nvPr/>
+          </p:nvSpPr>
+          <p:spPr bwMode="gray">
+            <a:xfrm>
+              <a:off x="5637725" y="2192393"/>
+              <a:ext cx="518474" cy="518474"/>
+            </a:xfrm>
+            <a:prstGeom prst="rect">
+              <a:avLst/>
+            </a:prstGeom>
+            <a:noFill/>
+            <a:ln w="25400" algn="ctr">
+              <a:solidFill>
+                <a:schemeClr val="tx1"/>
+              </a:solidFill>
+              <a:miter lim="800000"/>
+              <a:headEnd/>
+              <a:tailEnd/>
+            </a:ln>
+          </p:spPr>
+          <p:txBody>
+            <a:bodyPr lIns="90000" tIns="72000" rIns="90000" bIns="72000" rtlCol="0" anchor="ctr"/>
+            <a:lstStyle/>
+            <a:p>
+              <a:pPr marR="0" algn="ctr" defTabSz="914400" eaLnBrk="1" fontAlgn="base" latinLnBrk="0" hangingPunct="1">
+                <a:lnSpc>
+                  <a:spcPct val="100000"/>
+                </a:lnSpc>
+                <a:spcBef>
+                  <a:spcPct val="50000"/>
+                </a:spcBef>
+                <a:spcAft>
+                  <a:spcPct val="0"/>
+                </a:spcAft>
+                <a:buClr>
+                  <a:srgbClr val="F0AB00"/>
+                </a:buClr>
+                <a:buSzPct val="80000"/>
+                <a:tabLst/>
+              </a:pPr>
+              <a:endParaRPr kumimoji="0" lang="en-CN" sz="1800" b="0" i="0" u="none" strike="noStrike" kern="0" cap="none" spc="0" normalizeH="0" baseline="0" noProof="0" dirty="0">
+                <a:ln>
+                  <a:noFill/>
+                </a:ln>
+                <a:effectLst/>
+                <a:uLnTx/>
+                <a:uFillTx/>
+                <a:ea typeface="Arial Unicode MS" pitchFamily="34" charset="-128"/>
+                <a:cs typeface="Arial Unicode MS" pitchFamily="34" charset="-128"/>
+              </a:endParaRPr>
+            </a:p>
+          </p:txBody>
+        </p:sp>
+        <p:cxnSp>
+          <p:nvCxnSpPr>
+            <p:cNvPr id="25" name="Straight Arrow Connector 24">
+              <a:extLst>
+                <a:ext uri="{FF2B5EF4-FFF2-40B4-BE49-F238E27FC236}">
+                  <a16:creationId xmlns:a16="http://schemas.microsoft.com/office/drawing/2014/main" id="{9CD8BF79-71BC-9A65-BF37-63B58F54F4BE}"/>
+                </a:ext>
+              </a:extLst>
+            </p:cNvPr>
+            <p:cNvCxnSpPr>
+              <a:cxnSpLocks/>
+            </p:cNvCxnSpPr>
+            <p:nvPr/>
+          </p:nvCxnSpPr>
+          <p:spPr>
+            <a:xfrm flipV="1">
+              <a:off x="8326614" y="2720081"/>
+              <a:ext cx="0" cy="600969"/>
+            </a:xfrm>
+            <a:prstGeom prst="straightConnector1">
+              <a:avLst/>
+            </a:prstGeom>
+            <a:ln w="38100">
+              <a:solidFill>
+                <a:schemeClr val="tx1"/>
+              </a:solidFill>
+              <a:headEnd type="none" w="med" len="med"/>
+              <a:tailEnd type="triangle"/>
+            </a:ln>
+          </p:spPr>
+          <p:style>
+            <a:lnRef idx="1">
+              <a:schemeClr val="accent1"/>
+            </a:lnRef>
+            <a:fillRef idx="0">
+              <a:schemeClr val="accent1"/>
+            </a:fillRef>
+            <a:effectRef idx="0">
+              <a:schemeClr val="accent1"/>
+            </a:effectRef>
+            <a:fontRef idx="minor">
+              <a:schemeClr val="tx1"/>
+            </a:fontRef>
+          </p:style>
+        </p:cxnSp>
+        <p:sp>
+          <p:nvSpPr>
+            <p:cNvPr id="26" name="Rectangle 25">
+              <a:extLst>
+                <a:ext uri="{FF2B5EF4-FFF2-40B4-BE49-F238E27FC236}">
+                  <a16:creationId xmlns:a16="http://schemas.microsoft.com/office/drawing/2014/main" id="{F67DED19-18EE-79CC-1CB0-4BA6D10900DC}"/>
+                </a:ext>
+              </a:extLst>
+            </p:cNvPr>
+            <p:cNvSpPr/>
+            <p:nvPr/>
+          </p:nvSpPr>
+          <p:spPr bwMode="gray">
+            <a:xfrm>
+              <a:off x="8067377" y="2192393"/>
+              <a:ext cx="518474" cy="518474"/>
+            </a:xfrm>
+            <a:prstGeom prst="rect">
+              <a:avLst/>
+            </a:prstGeom>
+            <a:solidFill>
+              <a:schemeClr val="accent4"/>
+            </a:solidFill>
+            <a:ln w="25400" algn="ctr">
+              <a:solidFill>
+                <a:schemeClr val="tx1"/>
+              </a:solidFill>
+              <a:miter lim="800000"/>
+              <a:headEnd/>
+              <a:tailEnd/>
+            </a:ln>
+          </p:spPr>
+          <p:txBody>
+            <a:bodyPr lIns="90000" tIns="72000" rIns="90000" bIns="72000" rtlCol="0" anchor="ctr"/>
+            <a:lstStyle/>
+            <a:p>
+              <a:pPr marR="0" algn="ctr" defTabSz="914400" eaLnBrk="1" fontAlgn="base" latinLnBrk="0" hangingPunct="1">
+                <a:lnSpc>
+                  <a:spcPct val="100000"/>
+                </a:lnSpc>
+                <a:spcBef>
+                  <a:spcPct val="50000"/>
+                </a:spcBef>
+                <a:spcAft>
+                  <a:spcPct val="0"/>
+                </a:spcAft>
+                <a:buClr>
+                  <a:srgbClr val="F0AB00"/>
+                </a:buClr>
+                <a:buSzPct val="80000"/>
+                <a:tabLst/>
+              </a:pPr>
+              <a:r>
+                <a:rPr kumimoji="0" lang="en-CN" sz="1800" b="0" i="0" u="none" strike="noStrike" kern="0" cap="none" spc="0" normalizeH="0" baseline="0" noProof="0" dirty="0">
+                  <a:ln>
+                    <a:noFill/>
+                  </a:ln>
+                  <a:effectLst/>
+                  <a:uLnTx/>
+                  <a:uFillTx/>
+                  <a:ea typeface="Arial Unicode MS" pitchFamily="34" charset="-128"/>
+                  <a:cs typeface="Arial Unicode MS" pitchFamily="34" charset="-128"/>
+                </a:rPr>
+                <a:t>D3</a:t>
+              </a:r>
+            </a:p>
+          </p:txBody>
+        </p:sp>
+        <p:sp>
+          <p:nvSpPr>
+            <p:cNvPr id="27" name="Rectangle 26">
+              <a:extLst>
+                <a:ext uri="{FF2B5EF4-FFF2-40B4-BE49-F238E27FC236}">
+                  <a16:creationId xmlns:a16="http://schemas.microsoft.com/office/drawing/2014/main" id="{105E052D-25FA-5D67-A6B4-3F7268744D94}"/>
+                </a:ext>
+              </a:extLst>
+            </p:cNvPr>
+            <p:cNvSpPr/>
+            <p:nvPr/>
+          </p:nvSpPr>
+          <p:spPr bwMode="gray">
+            <a:xfrm>
+              <a:off x="3724207" y="2195535"/>
+              <a:ext cx="518474" cy="518474"/>
+            </a:xfrm>
+            <a:prstGeom prst="rect">
+              <a:avLst/>
+            </a:prstGeom>
+            <a:noFill/>
+            <a:ln w="25400" algn="ctr">
+              <a:solidFill>
+                <a:schemeClr val="tx1"/>
+              </a:solidFill>
+              <a:miter lim="800000"/>
+              <a:headEnd/>
+              <a:tailEnd/>
+            </a:ln>
+          </p:spPr>
+          <p:txBody>
+            <a:bodyPr lIns="90000" tIns="72000" rIns="90000" bIns="72000" rtlCol="0" anchor="ctr"/>
+            <a:lstStyle/>
+            <a:p>
+              <a:pPr marR="0" algn="ctr" defTabSz="914400" eaLnBrk="1" fontAlgn="base" latinLnBrk="0" hangingPunct="1">
+                <a:lnSpc>
+                  <a:spcPct val="100000"/>
+                </a:lnSpc>
+                <a:spcBef>
+                  <a:spcPct val="50000"/>
+                </a:spcBef>
+                <a:spcAft>
+                  <a:spcPct val="0"/>
+                </a:spcAft>
+                <a:buClr>
+                  <a:srgbClr val="F0AB00"/>
+                </a:buClr>
+                <a:buSzPct val="80000"/>
+                <a:tabLst/>
+              </a:pPr>
+              <a:endParaRPr kumimoji="0" lang="en-CN" sz="1800" b="0" i="0" u="none" strike="noStrike" kern="0" cap="none" spc="0" normalizeH="0" baseline="0" noProof="0" dirty="0">
+                <a:ln>
+                  <a:noFill/>
+                </a:ln>
+                <a:effectLst/>
+                <a:uLnTx/>
+                <a:uFillTx/>
+                <a:ea typeface="Arial Unicode MS" pitchFamily="34" charset="-128"/>
+                <a:cs typeface="Arial Unicode MS" pitchFamily="34" charset="-128"/>
+              </a:endParaRPr>
+            </a:p>
+          </p:txBody>
+        </p:sp>
+        <p:cxnSp>
+          <p:nvCxnSpPr>
+            <p:cNvPr id="28" name="Straight Connector 27">
+              <a:extLst>
+                <a:ext uri="{FF2B5EF4-FFF2-40B4-BE49-F238E27FC236}">
+                  <a16:creationId xmlns:a16="http://schemas.microsoft.com/office/drawing/2014/main" id="{BEE1E291-EFAF-2BE6-DCAA-03950123139D}"/>
+                </a:ext>
+              </a:extLst>
+            </p:cNvPr>
+            <p:cNvCxnSpPr/>
+            <p:nvPr/>
+          </p:nvCxnSpPr>
+          <p:spPr>
+            <a:xfrm>
+              <a:off x="3724207" y="2193964"/>
+              <a:ext cx="518474" cy="518474"/>
+            </a:xfrm>
+            <a:prstGeom prst="line">
+              <a:avLst/>
+            </a:prstGeom>
+            <a:ln w="25400">
+              <a:solidFill>
+                <a:schemeClr val="tx1"/>
+              </a:solidFill>
+              <a:headEnd type="none" w="med" len="med"/>
+              <a:tailEnd type="none" w="med" len="med"/>
+            </a:ln>
+          </p:spPr>
+          <p:style>
+            <a:lnRef idx="1">
+              <a:schemeClr val="accent1"/>
+            </a:lnRef>
+            <a:fillRef idx="0">
+              <a:schemeClr val="accent1"/>
+            </a:fillRef>
+            <a:effectRef idx="0">
+              <a:schemeClr val="accent1"/>
+            </a:effectRef>
+            <a:fontRef idx="minor">
+              <a:schemeClr val="tx1"/>
+            </a:fontRef>
+          </p:style>
+        </p:cxnSp>
+        <p:sp>
+          <p:nvSpPr>
+            <p:cNvPr id="29" name="Rectangle 28">
+              <a:extLst>
+                <a:ext uri="{FF2B5EF4-FFF2-40B4-BE49-F238E27FC236}">
+                  <a16:creationId xmlns:a16="http://schemas.microsoft.com/office/drawing/2014/main" id="{52E67845-454B-BA7E-6776-476F45C350D1}"/>
+                </a:ext>
+              </a:extLst>
+            </p:cNvPr>
+            <p:cNvSpPr/>
+            <p:nvPr/>
+          </p:nvSpPr>
+          <p:spPr bwMode="gray">
+            <a:xfrm>
+              <a:off x="2823798" y="2195535"/>
+              <a:ext cx="518474" cy="518474"/>
+            </a:xfrm>
+            <a:prstGeom prst="rect">
+              <a:avLst/>
+            </a:prstGeom>
+            <a:noFill/>
+            <a:ln w="25400" algn="ctr">
+              <a:solidFill>
+                <a:schemeClr val="tx1"/>
+              </a:solidFill>
+              <a:miter lim="800000"/>
+              <a:headEnd/>
+              <a:tailEnd/>
+            </a:ln>
+          </p:spPr>
+          <p:txBody>
+            <a:bodyPr lIns="90000" tIns="72000" rIns="90000" bIns="72000" rtlCol="0" anchor="ctr"/>
+            <a:lstStyle/>
+            <a:p>
+              <a:pPr marR="0" algn="ctr" defTabSz="914400" eaLnBrk="1" fontAlgn="base" latinLnBrk="0" hangingPunct="1">
+                <a:lnSpc>
+                  <a:spcPct val="100000"/>
+                </a:lnSpc>
+                <a:spcBef>
+                  <a:spcPct val="50000"/>
+                </a:spcBef>
+                <a:spcAft>
+                  <a:spcPct val="0"/>
+                </a:spcAft>
+                <a:buClr>
+                  <a:srgbClr val="F0AB00"/>
+                </a:buClr>
+                <a:buSzPct val="80000"/>
+                <a:tabLst/>
+              </a:pPr>
+              <a:endParaRPr kumimoji="0" lang="en-CN" sz="1800" b="0" i="0" u="none" strike="noStrike" kern="0" cap="none" spc="0" normalizeH="0" baseline="0" noProof="0" dirty="0">
+                <a:ln>
+                  <a:noFill/>
+                </a:ln>
+                <a:effectLst/>
+                <a:uLnTx/>
+                <a:uFillTx/>
+                <a:ea typeface="Arial Unicode MS" pitchFamily="34" charset="-128"/>
+                <a:cs typeface="Arial Unicode MS" pitchFamily="34" charset="-128"/>
+              </a:endParaRPr>
+            </a:p>
+          </p:txBody>
+        </p:sp>
+        <p:cxnSp>
+          <p:nvCxnSpPr>
+            <p:cNvPr id="30" name="Straight Arrow Connector 29">
+              <a:extLst>
+                <a:ext uri="{FF2B5EF4-FFF2-40B4-BE49-F238E27FC236}">
+                  <a16:creationId xmlns:a16="http://schemas.microsoft.com/office/drawing/2014/main" id="{DD7DB3AF-8A70-0A21-69A1-5B6CC82E3AE0}"/>
+                </a:ext>
+              </a:extLst>
+            </p:cNvPr>
+            <p:cNvCxnSpPr>
+              <a:cxnSpLocks/>
+            </p:cNvCxnSpPr>
+            <p:nvPr/>
+          </p:nvCxnSpPr>
+          <p:spPr>
+            <a:xfrm>
+              <a:off x="3106874" y="2320854"/>
+              <a:ext cx="617333" cy="0"/>
+            </a:xfrm>
+            <a:prstGeom prst="straightConnector1">
+              <a:avLst/>
+            </a:prstGeom>
+            <a:ln w="38100">
+              <a:solidFill>
+                <a:schemeClr val="tx1"/>
+              </a:solidFill>
+              <a:headEnd type="none" w="med" len="med"/>
+              <a:tailEnd type="triangle"/>
+            </a:ln>
+          </p:spPr>
+          <p:style>
+            <a:lnRef idx="1">
+              <a:schemeClr val="accent1"/>
+            </a:lnRef>
+            <a:fillRef idx="0">
+              <a:schemeClr val="accent1"/>
+            </a:fillRef>
+            <a:effectRef idx="0">
+              <a:schemeClr val="accent1"/>
+            </a:effectRef>
+            <a:fontRef idx="minor">
+              <a:schemeClr val="tx1"/>
+            </a:fontRef>
+          </p:style>
+        </p:cxnSp>
+        <p:cxnSp>
+          <p:nvCxnSpPr>
+            <p:cNvPr id="31" name="Straight Arrow Connector 30">
+              <a:extLst>
+                <a:ext uri="{FF2B5EF4-FFF2-40B4-BE49-F238E27FC236}">
+                  <a16:creationId xmlns:a16="http://schemas.microsoft.com/office/drawing/2014/main" id="{D84F7BCE-B1B6-762B-C2BD-E4A2D839F234}"/>
+                </a:ext>
+              </a:extLst>
+            </p:cNvPr>
+            <p:cNvCxnSpPr>
+              <a:cxnSpLocks/>
+            </p:cNvCxnSpPr>
+            <p:nvPr/>
+          </p:nvCxnSpPr>
+          <p:spPr>
+            <a:xfrm>
+              <a:off x="5020392" y="2320854"/>
+              <a:ext cx="617333" cy="0"/>
+            </a:xfrm>
+            <a:prstGeom prst="straightConnector1">
+              <a:avLst/>
+            </a:prstGeom>
+            <a:ln w="38100">
+              <a:solidFill>
+                <a:schemeClr val="tx1"/>
+              </a:solidFill>
+              <a:headEnd type="none" w="med" len="med"/>
+              <a:tailEnd type="triangle"/>
+            </a:ln>
+          </p:spPr>
+          <p:style>
+            <a:lnRef idx="1">
+              <a:schemeClr val="accent1"/>
+            </a:lnRef>
+            <a:fillRef idx="0">
+              <a:schemeClr val="accent1"/>
+            </a:fillRef>
+            <a:effectRef idx="0">
+              <a:schemeClr val="accent1"/>
+            </a:effectRef>
+            <a:fontRef idx="minor">
+              <a:schemeClr val="tx1"/>
+            </a:fontRef>
+          </p:style>
+        </p:cxnSp>
+        <p:sp>
+          <p:nvSpPr>
+            <p:cNvPr id="32" name="Rectangle 31">
+              <a:extLst>
+                <a:ext uri="{FF2B5EF4-FFF2-40B4-BE49-F238E27FC236}">
+                  <a16:creationId xmlns:a16="http://schemas.microsoft.com/office/drawing/2014/main" id="{B647C901-E35C-33A1-559E-B9E7FABCD4FB}"/>
+                </a:ext>
+              </a:extLst>
+            </p:cNvPr>
+            <p:cNvSpPr/>
+            <p:nvPr/>
+          </p:nvSpPr>
+          <p:spPr bwMode="gray">
+            <a:xfrm>
+              <a:off x="7549683" y="2192393"/>
+              <a:ext cx="518474" cy="518474"/>
+            </a:xfrm>
+            <a:prstGeom prst="rect">
+              <a:avLst/>
+            </a:prstGeom>
+            <a:noFill/>
+            <a:ln w="25400" algn="ctr">
+              <a:solidFill>
+                <a:schemeClr val="tx1"/>
+              </a:solidFill>
+              <a:miter lim="800000"/>
+              <a:headEnd/>
+              <a:tailEnd/>
+            </a:ln>
+          </p:spPr>
+          <p:txBody>
+            <a:bodyPr lIns="90000" tIns="72000" rIns="90000" bIns="72000" rtlCol="0" anchor="ctr"/>
+            <a:lstStyle/>
+            <a:p>
+              <a:pPr marR="0" algn="ctr" defTabSz="914400" eaLnBrk="1" fontAlgn="base" latinLnBrk="0" hangingPunct="1">
+                <a:lnSpc>
+                  <a:spcPct val="100000"/>
+                </a:lnSpc>
+                <a:spcBef>
+                  <a:spcPct val="50000"/>
+                </a:spcBef>
+                <a:spcAft>
+                  <a:spcPct val="0"/>
+                </a:spcAft>
+                <a:buClr>
+                  <a:srgbClr val="F0AB00"/>
+                </a:buClr>
+                <a:buSzPct val="80000"/>
+                <a:tabLst/>
+              </a:pPr>
+              <a:endParaRPr kumimoji="0" lang="en-CN" sz="1800" b="0" i="0" u="none" strike="noStrike" kern="0" cap="none" spc="0" normalizeH="0" baseline="0" noProof="0" dirty="0">
+                <a:ln>
+                  <a:noFill/>
+                </a:ln>
+                <a:effectLst/>
+                <a:uLnTx/>
+                <a:uFillTx/>
+                <a:ea typeface="Arial Unicode MS" pitchFamily="34" charset="-128"/>
+                <a:cs typeface="Arial Unicode MS" pitchFamily="34" charset="-128"/>
+              </a:endParaRPr>
+            </a:p>
+          </p:txBody>
+        </p:sp>
+        <p:sp>
+          <p:nvSpPr>
+            <p:cNvPr id="33" name="Rectangle 32">
+              <a:extLst>
+                <a:ext uri="{FF2B5EF4-FFF2-40B4-BE49-F238E27FC236}">
+                  <a16:creationId xmlns:a16="http://schemas.microsoft.com/office/drawing/2014/main" id="{4291E3DC-9195-0E8B-C183-75EAE253C1CC}"/>
+                </a:ext>
+              </a:extLst>
+            </p:cNvPr>
+            <p:cNvSpPr/>
+            <p:nvPr/>
+          </p:nvSpPr>
+          <p:spPr bwMode="gray">
+            <a:xfrm>
+              <a:off x="6673893" y="2194383"/>
+              <a:ext cx="518474" cy="518474"/>
+            </a:xfrm>
+            <a:prstGeom prst="rect">
+              <a:avLst/>
+            </a:prstGeom>
+            <a:noFill/>
+            <a:ln w="25400" algn="ctr">
+              <a:solidFill>
+                <a:schemeClr val="tx1"/>
+              </a:solidFill>
+              <a:miter lim="800000"/>
+              <a:headEnd/>
+              <a:tailEnd/>
+            </a:ln>
+          </p:spPr>
+          <p:txBody>
+            <a:bodyPr lIns="90000" tIns="72000" rIns="90000" bIns="72000" rtlCol="0" anchor="ctr"/>
+            <a:lstStyle/>
+            <a:p>
+              <a:pPr marR="0" algn="ctr" defTabSz="914400" eaLnBrk="1" fontAlgn="base" latinLnBrk="0" hangingPunct="1">
+                <a:lnSpc>
+                  <a:spcPct val="100000"/>
+                </a:lnSpc>
+                <a:spcBef>
+                  <a:spcPct val="50000"/>
+                </a:spcBef>
+                <a:spcAft>
+                  <a:spcPct val="0"/>
+                </a:spcAft>
+                <a:buClr>
+                  <a:srgbClr val="F0AB00"/>
+                </a:buClr>
+                <a:buSzPct val="80000"/>
+                <a:tabLst/>
+              </a:pPr>
+              <a:endParaRPr kumimoji="0" lang="en-CN" sz="1800" b="0" i="0" u="none" strike="noStrike" kern="0" cap="none" spc="0" normalizeH="0" baseline="0" noProof="0" dirty="0">
+                <a:ln>
+                  <a:noFill/>
+                </a:ln>
+                <a:effectLst/>
+                <a:uLnTx/>
+                <a:uFillTx/>
+                <a:ea typeface="Arial Unicode MS" pitchFamily="34" charset="-128"/>
+                <a:cs typeface="Arial Unicode MS" pitchFamily="34" charset="-128"/>
+              </a:endParaRPr>
+            </a:p>
+          </p:txBody>
+        </p:sp>
+        <p:cxnSp>
+          <p:nvCxnSpPr>
+            <p:cNvPr id="34" name="Straight Arrow Connector 33">
+              <a:extLst>
+                <a:ext uri="{FF2B5EF4-FFF2-40B4-BE49-F238E27FC236}">
+                  <a16:creationId xmlns:a16="http://schemas.microsoft.com/office/drawing/2014/main" id="{BED7AA6F-9E17-5B44-E65E-DE86B717142D}"/>
+                </a:ext>
+              </a:extLst>
+            </p:cNvPr>
+            <p:cNvCxnSpPr>
+              <a:cxnSpLocks/>
+            </p:cNvCxnSpPr>
+            <p:nvPr/>
+          </p:nvCxnSpPr>
+          <p:spPr>
+            <a:xfrm>
+              <a:off x="6933130" y="2322844"/>
+              <a:ext cx="617333" cy="0"/>
+            </a:xfrm>
+            <a:prstGeom prst="straightConnector1">
+              <a:avLst/>
+            </a:prstGeom>
+            <a:ln w="38100">
+              <a:solidFill>
+                <a:schemeClr val="tx1"/>
+              </a:solidFill>
+              <a:headEnd type="none" w="med" len="med"/>
+              <a:tailEnd type="triangle"/>
+            </a:ln>
+          </p:spPr>
+          <p:style>
+            <a:lnRef idx="1">
+              <a:schemeClr val="accent1"/>
+            </a:lnRef>
+            <a:fillRef idx="0">
+              <a:schemeClr val="accent1"/>
+            </a:fillRef>
+            <a:effectRef idx="0">
+              <a:schemeClr val="accent1"/>
+            </a:effectRef>
+            <a:fontRef idx="minor">
+              <a:schemeClr val="tx1"/>
+            </a:fontRef>
+          </p:style>
+        </p:cxnSp>
+        <p:sp>
+          <p:nvSpPr>
+            <p:cNvPr id="35" name="Rectangle 34">
+              <a:extLst>
+                <a:ext uri="{FF2B5EF4-FFF2-40B4-BE49-F238E27FC236}">
+                  <a16:creationId xmlns:a16="http://schemas.microsoft.com/office/drawing/2014/main" id="{0E6CA94D-65B8-B462-56C6-F2BBCA58C1A7}"/>
+                </a:ext>
+              </a:extLst>
+            </p:cNvPr>
+            <p:cNvSpPr/>
+            <p:nvPr/>
+          </p:nvSpPr>
+          <p:spPr bwMode="gray">
+            <a:xfrm>
+              <a:off x="8584291" y="2193964"/>
+              <a:ext cx="518474" cy="518474"/>
+            </a:xfrm>
+            <a:prstGeom prst="rect">
+              <a:avLst/>
+            </a:prstGeom>
+            <a:noFill/>
+            <a:ln w="25400" algn="ctr">
+              <a:solidFill>
+                <a:schemeClr val="tx1"/>
+              </a:solidFill>
+              <a:miter lim="800000"/>
+              <a:headEnd/>
+              <a:tailEnd/>
+            </a:ln>
+          </p:spPr>
+          <p:txBody>
+            <a:bodyPr lIns="90000" tIns="72000" rIns="90000" bIns="72000" rtlCol="0" anchor="ctr"/>
+            <a:lstStyle/>
+            <a:p>
+              <a:pPr marR="0" algn="ctr" defTabSz="914400" eaLnBrk="1" fontAlgn="base" latinLnBrk="0" hangingPunct="1">
+                <a:lnSpc>
+                  <a:spcPct val="100000"/>
+                </a:lnSpc>
+                <a:spcBef>
+                  <a:spcPct val="50000"/>
+                </a:spcBef>
+                <a:spcAft>
+                  <a:spcPct val="0"/>
+                </a:spcAft>
+                <a:buClr>
+                  <a:srgbClr val="F0AB00"/>
+                </a:buClr>
+                <a:buSzPct val="80000"/>
+                <a:tabLst/>
+              </a:pPr>
+              <a:endParaRPr kumimoji="0" lang="en-CN" sz="1800" b="0" i="0" u="none" strike="noStrike" kern="0" cap="none" spc="0" normalizeH="0" baseline="0" noProof="0" dirty="0">
+                <a:ln>
+                  <a:noFill/>
+                </a:ln>
+                <a:effectLst/>
+                <a:uLnTx/>
+                <a:uFillTx/>
+                <a:ea typeface="Arial Unicode MS" pitchFamily="34" charset="-128"/>
+                <a:cs typeface="Arial Unicode MS" pitchFamily="34" charset="-128"/>
+              </a:endParaRPr>
+            </a:p>
+          </p:txBody>
+        </p:sp>
+        <p:cxnSp>
+          <p:nvCxnSpPr>
+            <p:cNvPr id="36" name="Straight Connector 35">
+              <a:extLst>
+                <a:ext uri="{FF2B5EF4-FFF2-40B4-BE49-F238E27FC236}">
+                  <a16:creationId xmlns:a16="http://schemas.microsoft.com/office/drawing/2014/main" id="{28EE124B-6D13-78EE-1FE1-7FEF8189A108}"/>
+                </a:ext>
+              </a:extLst>
+            </p:cNvPr>
+            <p:cNvCxnSpPr/>
+            <p:nvPr/>
+          </p:nvCxnSpPr>
+          <p:spPr>
+            <a:xfrm>
+              <a:off x="8584291" y="2192393"/>
+              <a:ext cx="518474" cy="518474"/>
+            </a:xfrm>
+            <a:prstGeom prst="line">
+              <a:avLst/>
+            </a:prstGeom>
+            <a:ln w="25400">
+              <a:solidFill>
+                <a:schemeClr val="tx1"/>
+              </a:solidFill>
+              <a:headEnd type="none" w="med" len="med"/>
+              <a:tailEnd type="none" w="med" len="med"/>
+            </a:ln>
+          </p:spPr>
+          <p:style>
+            <a:lnRef idx="1">
+              <a:schemeClr val="accent1"/>
+            </a:lnRef>
+            <a:fillRef idx="0">
+              <a:schemeClr val="accent1"/>
+            </a:fillRef>
+            <a:effectRef idx="0">
+              <a:schemeClr val="accent1"/>
+            </a:effectRef>
+            <a:fontRef idx="minor">
+              <a:schemeClr val="tx1"/>
+            </a:fontRef>
+          </p:style>
+        </p:cxnSp>
+        <p:cxnSp>
+          <p:nvCxnSpPr>
+            <p:cNvPr id="40" name="Straight Arrow Connector 39">
+              <a:extLst>
+                <a:ext uri="{FF2B5EF4-FFF2-40B4-BE49-F238E27FC236}">
+                  <a16:creationId xmlns:a16="http://schemas.microsoft.com/office/drawing/2014/main" id="{BD1FFBDE-DD0F-ABBD-DB07-5066A325A1D1}"/>
+                </a:ext>
+              </a:extLst>
+            </p:cNvPr>
+            <p:cNvCxnSpPr>
+              <a:cxnSpLocks/>
+            </p:cNvCxnSpPr>
+            <p:nvPr/>
+          </p:nvCxnSpPr>
+          <p:spPr>
+            <a:xfrm flipH="1">
+              <a:off x="7192367" y="2546783"/>
+              <a:ext cx="615497" cy="0"/>
+            </a:xfrm>
+            <a:prstGeom prst="straightConnector1">
+              <a:avLst/>
+            </a:prstGeom>
+            <a:ln w="38100">
+              <a:solidFill>
+                <a:schemeClr val="tx1"/>
+              </a:solidFill>
+              <a:headEnd type="none" w="med" len="med"/>
+              <a:tailEnd type="triangle"/>
+            </a:ln>
+          </p:spPr>
+          <p:style>
+            <a:lnRef idx="1">
+              <a:schemeClr val="accent1"/>
+            </a:lnRef>
+            <a:fillRef idx="0">
+              <a:schemeClr val="accent1"/>
+            </a:fillRef>
+            <a:effectRef idx="0">
+              <a:schemeClr val="accent1"/>
+            </a:effectRef>
+            <a:fontRef idx="minor">
+              <a:schemeClr val="tx1"/>
+            </a:fontRef>
+          </p:style>
+        </p:cxnSp>
+        <p:sp>
+          <p:nvSpPr>
+            <p:cNvPr id="41" name="Rectangle 40">
+              <a:extLst>
+                <a:ext uri="{FF2B5EF4-FFF2-40B4-BE49-F238E27FC236}">
+                  <a16:creationId xmlns:a16="http://schemas.microsoft.com/office/drawing/2014/main" id="{40B90B6B-13E9-1583-13A8-787B865C120F}"/>
+                </a:ext>
+              </a:extLst>
+            </p:cNvPr>
+            <p:cNvSpPr/>
+            <p:nvPr/>
+          </p:nvSpPr>
+          <p:spPr bwMode="gray">
+            <a:xfrm>
+              <a:off x="2823798" y="3039192"/>
+              <a:ext cx="518474" cy="518474"/>
+            </a:xfrm>
+            <a:prstGeom prst="rect">
+              <a:avLst/>
+            </a:prstGeom>
+            <a:noFill/>
+            <a:ln w="25400" algn="ctr">
+              <a:solidFill>
+                <a:schemeClr val="tx1"/>
+              </a:solidFill>
+              <a:miter lim="800000"/>
+              <a:headEnd/>
+              <a:tailEnd/>
+            </a:ln>
+          </p:spPr>
+          <p:txBody>
+            <a:bodyPr lIns="90000" tIns="72000" rIns="90000" bIns="72000" rtlCol="0" anchor="ctr"/>
+            <a:lstStyle/>
+            <a:p>
+              <a:pPr marR="0" algn="ctr" defTabSz="914400" eaLnBrk="1" fontAlgn="base" latinLnBrk="0" hangingPunct="1">
+                <a:lnSpc>
+                  <a:spcPct val="100000"/>
+                </a:lnSpc>
+                <a:spcBef>
+                  <a:spcPct val="50000"/>
+                </a:spcBef>
+                <a:spcAft>
+                  <a:spcPct val="0"/>
+                </a:spcAft>
+                <a:buClr>
+                  <a:srgbClr val="F0AB00"/>
+                </a:buClr>
+                <a:buSzPct val="80000"/>
+                <a:tabLst/>
+              </a:pPr>
+              <a:endParaRPr kumimoji="0" lang="en-CN" sz="1800" b="0" i="0" u="none" strike="noStrike" kern="0" cap="none" spc="0" normalizeH="0" baseline="0" noProof="0" dirty="0">
+                <a:ln>
+                  <a:noFill/>
+                </a:ln>
+                <a:effectLst/>
+                <a:uLnTx/>
+                <a:uFillTx/>
+                <a:ea typeface="Arial Unicode MS" pitchFamily="34" charset="-128"/>
+                <a:cs typeface="Arial Unicode MS" pitchFamily="34" charset="-128"/>
+              </a:endParaRPr>
+            </a:p>
+          </p:txBody>
+        </p:sp>
+        <p:cxnSp>
+          <p:nvCxnSpPr>
+            <p:cNvPr id="43" name="Straight Connector 42">
+              <a:extLst>
+                <a:ext uri="{FF2B5EF4-FFF2-40B4-BE49-F238E27FC236}">
+                  <a16:creationId xmlns:a16="http://schemas.microsoft.com/office/drawing/2014/main" id="{262D109C-DC42-1A97-400A-611187F057DC}"/>
+                </a:ext>
+              </a:extLst>
+            </p:cNvPr>
+            <p:cNvCxnSpPr>
+              <a:cxnSpLocks/>
+            </p:cNvCxnSpPr>
+            <p:nvPr/>
+          </p:nvCxnSpPr>
+          <p:spPr>
+            <a:xfrm>
+              <a:off x="3342419" y="3298429"/>
+              <a:ext cx="4984342" cy="0"/>
+            </a:xfrm>
+            <a:prstGeom prst="line">
+              <a:avLst/>
+            </a:prstGeom>
+            <a:ln w="38100">
+              <a:solidFill>
+                <a:schemeClr val="tx1"/>
+              </a:solidFill>
+              <a:headEnd type="none" w="med" len="med"/>
+              <a:tailEnd type="none" w="med" len="med"/>
+            </a:ln>
+          </p:spPr>
+          <p:style>
+            <a:lnRef idx="1">
+              <a:schemeClr val="accent1"/>
+            </a:lnRef>
+            <a:fillRef idx="0">
+              <a:schemeClr val="accent1"/>
+            </a:fillRef>
+            <a:effectRef idx="0">
+              <a:schemeClr val="accent1"/>
+            </a:effectRef>
+            <a:fontRef idx="minor">
+              <a:schemeClr val="tx1"/>
+            </a:fontRef>
+          </p:style>
+        </p:cxnSp>
+        <p:sp>
+          <p:nvSpPr>
+            <p:cNvPr id="49" name="TextBox 48">
+              <a:extLst>
+                <a:ext uri="{FF2B5EF4-FFF2-40B4-BE49-F238E27FC236}">
+                  <a16:creationId xmlns:a16="http://schemas.microsoft.com/office/drawing/2014/main" id="{D002A299-A052-559E-C7F6-AB6A2C2F6096}"/>
+                </a:ext>
+              </a:extLst>
+            </p:cNvPr>
+            <p:cNvSpPr txBox="1"/>
+            <p:nvPr/>
+          </p:nvSpPr>
+          <p:spPr>
+            <a:xfrm>
+              <a:off x="2184003" y="2313130"/>
+              <a:ext cx="461665" cy="276999"/>
+            </a:xfrm>
+            <a:prstGeom prst="rect">
+              <a:avLst/>
+            </a:prstGeom>
+            <a:noFill/>
+          </p:spPr>
+          <p:txBody>
+            <a:bodyPr wrap="none" lIns="0" tIns="0" rIns="0" bIns="0" rtlCol="0">
+              <a:spAutoFit/>
+            </a:bodyPr>
+            <a:lstStyle/>
+            <a:p>
+              <a:pPr fontAlgn="base">
+                <a:spcBef>
+                  <a:spcPct val="50000"/>
+                </a:spcBef>
+                <a:spcAft>
+                  <a:spcPct val="0"/>
+                </a:spcAft>
+                <a:buClr>
+                  <a:srgbClr val="F0AB00"/>
+                </a:buClr>
+                <a:buSzPct val="80000"/>
+              </a:pPr>
+              <a:r>
+                <a:rPr lang="en-CN" sz="1800" kern="0" dirty="0">
+                  <a:ea typeface="Arial Unicode MS" pitchFamily="34" charset="-128"/>
+                  <a:cs typeface="Arial Unicode MS" pitchFamily="34" charset="-128"/>
+                </a:rPr>
+                <a:t>头部</a:t>
+              </a:r>
+            </a:p>
+          </p:txBody>
+        </p:sp>
+        <p:sp>
+          <p:nvSpPr>
+            <p:cNvPr id="50" name="TextBox 49">
+              <a:extLst>
+                <a:ext uri="{FF2B5EF4-FFF2-40B4-BE49-F238E27FC236}">
+                  <a16:creationId xmlns:a16="http://schemas.microsoft.com/office/drawing/2014/main" id="{E87E5621-38E0-DB3B-366A-2F858B85313B}"/>
+                </a:ext>
+              </a:extLst>
+            </p:cNvPr>
+            <p:cNvSpPr txBox="1"/>
+            <p:nvPr/>
+          </p:nvSpPr>
+          <p:spPr>
+            <a:xfrm>
+              <a:off x="2184003" y="3159929"/>
+              <a:ext cx="461665" cy="276999"/>
+            </a:xfrm>
+            <a:prstGeom prst="rect">
+              <a:avLst/>
+            </a:prstGeom>
+            <a:noFill/>
+          </p:spPr>
+          <p:txBody>
+            <a:bodyPr wrap="none" lIns="0" tIns="0" rIns="0" bIns="0" rtlCol="0">
+              <a:spAutoFit/>
+            </a:bodyPr>
+            <a:lstStyle/>
+            <a:p>
+              <a:pPr fontAlgn="base">
+                <a:spcBef>
+                  <a:spcPct val="50000"/>
+                </a:spcBef>
+                <a:spcAft>
+                  <a:spcPct val="0"/>
+                </a:spcAft>
+                <a:buClr>
+                  <a:srgbClr val="F0AB00"/>
+                </a:buClr>
+                <a:buSzPct val="80000"/>
+              </a:pPr>
+              <a:r>
+                <a:rPr lang="en-CN" sz="1800" kern="0" dirty="0">
+                  <a:ea typeface="Arial Unicode MS" pitchFamily="34" charset="-128"/>
+                  <a:cs typeface="Arial Unicode MS" pitchFamily="34" charset="-128"/>
+                </a:rPr>
+                <a:t>尾部</a:t>
+              </a:r>
+            </a:p>
+          </p:txBody>
+        </p:sp>
+      </p:grpSp>
+      <p:sp>
+        <p:nvSpPr>
+          <p:cNvPr id="51" name="TextBox 50">
+            <a:extLst>
+              <a:ext uri="{FF2B5EF4-FFF2-40B4-BE49-F238E27FC236}">
+                <a16:creationId xmlns:a16="http://schemas.microsoft.com/office/drawing/2014/main" id="{EC28AAD6-CA90-F76D-0CE4-7E7380CD1190}"/>
+              </a:ext>
+            </a:extLst>
+          </p:cNvPr>
+          <p:cNvSpPr txBox="1"/>
+          <p:nvPr/>
+        </p:nvSpPr>
+        <p:spPr>
+          <a:xfrm>
+            <a:off x="1672971" y="1092641"/>
+            <a:ext cx="1025922" cy="615553"/>
+          </a:xfrm>
+          <a:prstGeom prst="rect">
+            <a:avLst/>
+          </a:prstGeom>
+          <a:noFill/>
+        </p:spPr>
+        <p:txBody>
+          <a:bodyPr wrap="none" lIns="0" tIns="0" rIns="0" bIns="0" rtlCol="0">
+            <a:spAutoFit/>
+          </a:bodyPr>
+          <a:lstStyle/>
+          <a:p>
+            <a:pPr algn="ctr" fontAlgn="base">
+              <a:spcAft>
+                <a:spcPct val="0"/>
+              </a:spcAft>
+              <a:buClr>
+                <a:srgbClr val="F0AB00"/>
+              </a:buClr>
+              <a:buSzPct val="80000"/>
+            </a:pPr>
+            <a:r>
+              <a:rPr lang="en-CN" sz="2000" kern="0" dirty="0">
+                <a:solidFill>
+                  <a:schemeClr val="accent3"/>
+                </a:solidFill>
+                <a:ea typeface="Arial Unicode MS" pitchFamily="34" charset="-128"/>
+                <a:cs typeface="Arial Unicode MS" pitchFamily="34" charset="-128"/>
+              </a:rPr>
+              <a:t>单向</a:t>
+            </a:r>
+          </a:p>
+          <a:p>
+            <a:pPr algn="ctr" fontAlgn="base">
+              <a:spcAft>
+                <a:spcPct val="0"/>
+              </a:spcAft>
+              <a:buClr>
+                <a:srgbClr val="F0AB00"/>
+              </a:buClr>
+              <a:buSzPct val="80000"/>
+            </a:pPr>
+            <a:r>
+              <a:rPr lang="en-CN" sz="2000" kern="0" dirty="0">
+                <a:solidFill>
+                  <a:schemeClr val="accent3"/>
+                </a:solidFill>
+                <a:ea typeface="Arial Unicode MS" pitchFamily="34" charset="-128"/>
+                <a:cs typeface="Arial Unicode MS" pitchFamily="34" charset="-128"/>
+              </a:rPr>
+              <a:t>链接结构</a:t>
+            </a:r>
+          </a:p>
+        </p:txBody>
+      </p:sp>
+      <p:sp>
+        <p:nvSpPr>
+          <p:cNvPr id="54" name="TextBox 53">
+            <a:extLst>
+              <a:ext uri="{FF2B5EF4-FFF2-40B4-BE49-F238E27FC236}">
+                <a16:creationId xmlns:a16="http://schemas.microsoft.com/office/drawing/2014/main" id="{72871E2C-3B3F-BDF6-8947-C70F23F6FEA2}"/>
+              </a:ext>
+            </a:extLst>
+          </p:cNvPr>
+          <p:cNvSpPr txBox="1"/>
+          <p:nvPr/>
+        </p:nvSpPr>
+        <p:spPr>
+          <a:xfrm>
+            <a:off x="1672971" y="2543154"/>
+            <a:ext cx="1025922" cy="615553"/>
+          </a:xfrm>
+          <a:prstGeom prst="rect">
+            <a:avLst/>
+          </a:prstGeom>
+          <a:noFill/>
+        </p:spPr>
+        <p:txBody>
+          <a:bodyPr wrap="none" lIns="0" tIns="0" rIns="0" bIns="0" rtlCol="0">
+            <a:spAutoFit/>
+          </a:bodyPr>
+          <a:lstStyle/>
+          <a:p>
+            <a:pPr algn="ctr" fontAlgn="base">
+              <a:spcAft>
+                <a:spcPct val="0"/>
+              </a:spcAft>
+              <a:buClr>
+                <a:srgbClr val="F0AB00"/>
+              </a:buClr>
+              <a:buSzPct val="80000"/>
+            </a:pPr>
+            <a:r>
+              <a:rPr lang="en-CN" sz="2000" kern="0" dirty="0">
+                <a:solidFill>
+                  <a:schemeClr val="accent3"/>
+                </a:solidFill>
+                <a:ea typeface="Arial Unicode MS" pitchFamily="34" charset="-128"/>
+                <a:cs typeface="Arial Unicode MS" pitchFamily="34" charset="-128"/>
+              </a:rPr>
+              <a:t>双向</a:t>
+            </a:r>
+          </a:p>
+          <a:p>
+            <a:pPr algn="ctr" fontAlgn="base">
+              <a:spcAft>
+                <a:spcPct val="0"/>
+              </a:spcAft>
+              <a:buClr>
+                <a:srgbClr val="F0AB00"/>
+              </a:buClr>
+              <a:buSzPct val="80000"/>
+            </a:pPr>
+            <a:r>
+              <a:rPr lang="en-CN" sz="2000" kern="0" dirty="0">
+                <a:solidFill>
+                  <a:schemeClr val="accent3"/>
+                </a:solidFill>
+                <a:ea typeface="Arial Unicode MS" pitchFamily="34" charset="-128"/>
+                <a:cs typeface="Arial Unicode MS" pitchFamily="34" charset="-128"/>
+              </a:rPr>
+              <a:t>链接结构</a:t>
+            </a:r>
+          </a:p>
+        </p:txBody>
+      </p:sp>
+    </p:spTree>
+    <p:extLst>
+      <p:ext uri="{BB962C8B-B14F-4D97-AF65-F5344CB8AC3E}">
+        <p14:creationId xmlns:p14="http://schemas.microsoft.com/office/powerpoint/2010/main" val="4027211847"/>
+      </p:ext>
+    </p:extLst>
+  </p:cSld>
+  <p:clrMapOvr>
+    <a:masterClrMapping/>
+  </p:clrMapOvr>
+</p:sld>
+</file>
+
 <file path=ppt/tags/tag1.xml><?xml version="1.0" encoding="utf-8"?>
 <p:tagLst xmlns:a="http://schemas.openxmlformats.org/drawingml/2006/main" xmlns:r="http://schemas.openxmlformats.org/officeDocument/2006/relationships" xmlns:p="http://schemas.openxmlformats.org/presentationml/2006/main">
   <p:tag name="SP_AGENDA" val="TOC TOCShowsSubsections Dividers SectionNumber SlideNumber"/>
@@ -20915,6 +23002,20 @@
 </file>
 
 <file path=customXml/item1.xml><?xml version="1.0" encoding="utf-8"?>
+<p:properties xmlns:p="http://schemas.microsoft.com/office/2006/metadata/properties" xmlns:xsi="http://www.w3.org/2001/XMLSchema-instance" xmlns:pc="http://schemas.microsoft.com/office/infopath/2007/PartnerControls">
+  <documentManagement>
+    <ResponsibleContact xmlns="47fc58d8-9f4b-4bc8-b278-c3cb6f298023">
+      <UserInfo>
+        <DisplayName/>
+        <AccountId xsi:nil="true"/>
+        <AccountType/>
+      </UserInfo>
+    </ResponsibleContact>
+  </documentManagement>
+</p:properties>
+</file>
+
+<file path=customXml/item2.xml><?xml version="1.0" encoding="utf-8"?>
 <ct:contentTypeSchema xmlns:ct="http://schemas.microsoft.com/office/2006/metadata/contentType" xmlns:ma="http://schemas.microsoft.com/office/2006/metadata/properties/metaAttributes" ct:_="" ma:_="" ma:contentTypeName="Document" ma:contentTypeID="0x010100615F0F9DCBF1E94796646FCF98A7C072" ma:contentTypeVersion="13" ma:contentTypeDescription="Create a new document." ma:contentTypeScope="" ma:versionID="5b306df2387467d165757eb5a8cdddaa">
   <xsd:schema xmlns:xsd="http://www.w3.org/2001/XMLSchema" xmlns:xs="http://www.w3.org/2001/XMLSchema" xmlns:p="http://schemas.microsoft.com/office/2006/metadata/properties" xmlns:ns2="0e00d59e-b0d2-4e67-be34-67e465b0fbed" xmlns:ns3="47fc58d8-9f4b-4bc8-b278-c3cb6f298023" targetNamespace="http://schemas.microsoft.com/office/2006/metadata/properties" ma:root="true" ma:fieldsID="eebd9c38828bcd412c0ba6e1c1867684" ns2:_="" ns3:_="">
     <xsd:import namespace="0e00d59e-b0d2-4e67-be34-67e465b0fbed"/>
@@ -21151,21 +23252,19 @@
 </ct:contentTypeSchema>
 </file>
 
-<file path=customXml/item2.xml><?xml version="1.0" encoding="utf-8"?>
-<p:properties xmlns:p="http://schemas.microsoft.com/office/2006/metadata/properties" xmlns:xsi="http://www.w3.org/2001/XMLSchema-instance" xmlns:pc="http://schemas.microsoft.com/office/infopath/2007/PartnerControls">
-  <documentManagement>
-    <ResponsibleContact xmlns="47fc58d8-9f4b-4bc8-b278-c3cb6f298023">
-      <UserInfo>
-        <DisplayName/>
-        <AccountId xsi:nil="true"/>
-        <AccountType/>
-      </UserInfo>
-    </ResponsibleContact>
-  </documentManagement>
-</p:properties>
+<file path=customXml/item3.xml><?xml version="1.0" encoding="utf-8"?>
+<TemplafySlideFormConfiguration><![CDATA[{"formFields":[],"formDataEntries":[]}]]></TemplafySlideFormConfiguration>
 </file>
 
-<file path=customXml/item3.xml><?xml version="1.0" encoding="utf-8"?>
+<file path=customXml/item4.xml><?xml version="1.0" encoding="utf-8"?>
+<TemplafySlideTemplateConfiguration><![CDATA[{"slideVersion":1,"isValidatorEnabled":false,"isLocked":false,"elementsMetadata":[],"slideId":"638265661923438196","enableDocumentContentUpdater":false,"version":"2.0"}]]></TemplafySlideTemplateConfiguration>
+</file>
+
+<file path=customXml/item5.xml><?xml version="1.0" encoding="utf-8"?>
+<TemplafyTemplateConfiguration><![CDATA[{"elementsMetadata":[{"type":"shape","id":"08b84b80-e163-4c17-82cd-a9abe93f8840","elementConfiguration":{"binding":"{{Form.SelectClassification.Name}}","visibility":"","type":"text","disableUpdates":false}}],"transformationConfigurations":[],"templateName":"Blank-PowerPoint-NewDesign-260723","templateDescription":"","enableDocumentContentUpdater":true,"version":"2.0"}]]></TemplafyTemplateConfiguration>
+</file>
+
+<file path=customXml/item6.xml><?xml version="1.0" encoding="utf-8"?>
 <?mso-contentType ?>
 <FormTemplates xmlns="http://schemas.microsoft.com/sharepoint/v3/contenttype/forms">
   <Display>DocumentLibraryForm</Display>
@@ -21174,23 +23273,28 @@
 </FormTemplates>
 </file>
 
-<file path=customXml/item4.xml><?xml version="1.0" encoding="utf-8"?>
-<TemplafyTemplateConfiguration><![CDATA[{"elementsMetadata":[{"type":"shape","id":"08b84b80-e163-4c17-82cd-a9abe93f8840","elementConfiguration":{"binding":"{{Form.SelectClassification.Name}}","visibility":"","type":"text","disableUpdates":false}}],"transformationConfigurations":[],"templateName":"Blank-PowerPoint-NewDesign-260723","templateDescription":"","enableDocumentContentUpdater":true,"version":"2.0"}]]></TemplafyTemplateConfiguration>
-</file>
-
-<file path=customXml/item5.xml><?xml version="1.0" encoding="utf-8"?>
-<TemplafySlideTemplateConfiguration><![CDATA[{"slideVersion":1,"isValidatorEnabled":false,"isLocked":false,"elementsMetadata":[],"slideId":"638265661923438196","enableDocumentContentUpdater":false,"version":"2.0"}]]></TemplafySlideTemplateConfiguration>
-</file>
-
-<file path=customXml/item6.xml><?xml version="1.0" encoding="utf-8"?>
-<TemplafySlideFormConfiguration><![CDATA[{"formFields":[],"formDataEntries":[]}]]></TemplafySlideFormConfiguration>
-</file>
-
 <file path=customXml/item7.xml><?xml version="1.0" encoding="utf-8"?>
 <TemplafyFormConfiguration><![CDATA[{"formFields":[{"distinct":false,"hideIfNoUserInteractionRequired":false,"required":false,"defaultValue":"INTERNAL – SAP and Partners Only","autoSelectFirstOption":false,"shareValue":false,"type":"dropDown","dataSourceName":"Classification","dataSourceFieldName":"Name","name":"SelectClassification","label":"Select Classification"}],"formDataEntries":[{"name":"SelectClassification","value":"OmrOP8d402txjl1Zr787gUA6bTWeMdaxGEF9U5BKD64="}]}]]></TemplafyFormConfiguration>
 </file>
 
 <file path=customXml/itemProps1.xml><?xml version="1.0" encoding="utf-8"?>
+<ds:datastoreItem xmlns:ds="http://schemas.openxmlformats.org/officeDocument/2006/customXml" ds:itemID="{C1422F45-04DB-421D-8796-270006657806}">
+  <ds:schemaRefs>
+    <ds:schemaRef ds:uri="http://www.w3.org/XML/1998/namespace"/>
+    <ds:schemaRef ds:uri="http://purl.org/dc/elements/1.1/"/>
+    <ds:schemaRef ds:uri="http://purl.org/dc/terms/"/>
+    <ds:schemaRef ds:uri="http://schemas.microsoft.com/office/infopath/2007/PartnerControls"/>
+    <ds:schemaRef ds:uri="0e00d59e-b0d2-4e67-be34-67e465b0fbed"/>
+    <ds:schemaRef ds:uri="47fc58d8-9f4b-4bc8-b278-c3cb6f298023"/>
+    <ds:schemaRef ds:uri="http://purl.org/dc/dcmitype/"/>
+    <ds:schemaRef ds:uri="http://schemas.microsoft.com/office/2006/documentManagement/types"/>
+    <ds:schemaRef ds:uri="http://schemas.openxmlformats.org/package/2006/metadata/core-properties"/>
+    <ds:schemaRef ds:uri="http://schemas.microsoft.com/office/2006/metadata/properties"/>
+  </ds:schemaRefs>
+</ds:datastoreItem>
+</file>
+
+<file path=customXml/itemProps2.xml><?xml version="1.0" encoding="utf-8"?>
 <ds:datastoreItem xmlns:ds="http://schemas.openxmlformats.org/officeDocument/2006/customXml" ds:itemID="{B3812128-B7DF-461F-A8F2-831754A1D2F6}">
   <ds:schemaRefs>
     <ds:schemaRef ds:uri="http://schemas.microsoft.com/office/2006/metadata/contentType"/>
@@ -21209,46 +23313,29 @@
 </ds:datastoreItem>
 </file>
 
-<file path=customXml/itemProps2.xml><?xml version="1.0" encoding="utf-8"?>
-<ds:datastoreItem xmlns:ds="http://schemas.openxmlformats.org/officeDocument/2006/customXml" ds:itemID="{C1422F45-04DB-421D-8796-270006657806}">
-  <ds:schemaRefs>
-    <ds:schemaRef ds:uri="http://www.w3.org/XML/1998/namespace"/>
-    <ds:schemaRef ds:uri="http://purl.org/dc/elements/1.1/"/>
-    <ds:schemaRef ds:uri="http://purl.org/dc/terms/"/>
-    <ds:schemaRef ds:uri="http://schemas.microsoft.com/office/infopath/2007/PartnerControls"/>
-    <ds:schemaRef ds:uri="0e00d59e-b0d2-4e67-be34-67e465b0fbed"/>
-    <ds:schemaRef ds:uri="47fc58d8-9f4b-4bc8-b278-c3cb6f298023"/>
-    <ds:schemaRef ds:uri="http://purl.org/dc/dcmitype/"/>
-    <ds:schemaRef ds:uri="http://schemas.microsoft.com/office/2006/documentManagement/types"/>
-    <ds:schemaRef ds:uri="http://schemas.openxmlformats.org/package/2006/metadata/core-properties"/>
-    <ds:schemaRef ds:uri="http://schemas.microsoft.com/office/2006/metadata/properties"/>
-  </ds:schemaRefs>
-</ds:datastoreItem>
-</file>
-
 <file path=customXml/itemProps3.xml><?xml version="1.0" encoding="utf-8"?>
-<ds:datastoreItem xmlns:ds="http://schemas.openxmlformats.org/officeDocument/2006/customXml" ds:itemID="{291DCB28-1C52-4C0E-804A-6BD2D3F0FB8D}">
-  <ds:schemaRefs>
-    <ds:schemaRef ds:uri="http://schemas.microsoft.com/sharepoint/v3/contenttype/forms"/>
-  </ds:schemaRefs>
+<ds:datastoreItem xmlns:ds="http://schemas.openxmlformats.org/officeDocument/2006/customXml" ds:itemID="{8D60027D-B63E-433E-BB56-64F598DA4B11}">
+  <ds:schemaRefs/>
 </ds:datastoreItem>
 </file>
 
 <file path=customXml/itemProps4.xml><?xml version="1.0" encoding="utf-8"?>
+<ds:datastoreItem xmlns:ds="http://schemas.openxmlformats.org/officeDocument/2006/customXml" ds:itemID="{FB3CBE98-0F50-4DCC-AB6D-9CE0DBAA75FF}">
+  <ds:schemaRefs/>
+</ds:datastoreItem>
+</file>
+
+<file path=customXml/itemProps5.xml><?xml version="1.0" encoding="utf-8"?>
 <ds:datastoreItem xmlns:ds="http://schemas.openxmlformats.org/officeDocument/2006/customXml" ds:itemID="{626BBCBB-1894-4E66-BA48-9E91CE3ACBA0}">
   <ds:schemaRefs/>
 </ds:datastoreItem>
 </file>
 
-<file path=customXml/itemProps5.xml><?xml version="1.0" encoding="utf-8"?>
-<ds:datastoreItem xmlns:ds="http://schemas.openxmlformats.org/officeDocument/2006/customXml" ds:itemID="{FB3CBE98-0F50-4DCC-AB6D-9CE0DBAA75FF}">
-  <ds:schemaRefs/>
-</ds:datastoreItem>
-</file>
-
 <file path=customXml/itemProps6.xml><?xml version="1.0" encoding="utf-8"?>
-<ds:datastoreItem xmlns:ds="http://schemas.openxmlformats.org/officeDocument/2006/customXml" ds:itemID="{8D60027D-B63E-433E-BB56-64F598DA4B11}">
-  <ds:schemaRefs/>
+<ds:datastoreItem xmlns:ds="http://schemas.openxmlformats.org/officeDocument/2006/customXml" ds:itemID="{291DCB28-1C52-4C0E-804A-6BD2D3F0FB8D}">
+  <ds:schemaRefs>
+    <ds:schemaRef ds:uri="http://schemas.microsoft.com/sharepoint/v3/contenttype/forms"/>
+  </ds:schemaRefs>
 </ds:datastoreItem>
 </file>
 

</xml_diff>